<commit_message>
class02: add more references about pagecache & writeback.
</commit_message>
<xml_diff>
--- a/talks/src/class02.pptx
+++ b/talks/src/class02.pptx
@@ -6,10 +6,10 @@
     <p:sldMasterId id="2147483660" r:id="rId2"/>
   </p:sldMasterIdLst>
   <p:notesMasterIdLst>
-    <p:notesMasterId r:id="rId44"/>
+    <p:notesMasterId r:id="rId45"/>
   </p:notesMasterIdLst>
   <p:handoutMasterIdLst>
-    <p:handoutMasterId r:id="rId45"/>
+    <p:handoutMasterId r:id="rId46"/>
   </p:handoutMasterIdLst>
   <p:sldIdLst>
     <p:sldId id="398" r:id="rId3"/>
@@ -36,23 +36,24 @@
     <p:sldId id="405" r:id="rId24"/>
     <p:sldId id="404" r:id="rId25"/>
     <p:sldId id="402" r:id="rId26"/>
-    <p:sldId id="407" r:id="rId27"/>
-    <p:sldId id="329" r:id="rId28"/>
-    <p:sldId id="302" r:id="rId29"/>
-    <p:sldId id="350" r:id="rId30"/>
-    <p:sldId id="408" r:id="rId31"/>
-    <p:sldId id="378" r:id="rId32"/>
-    <p:sldId id="374" r:id="rId33"/>
-    <p:sldId id="375" r:id="rId34"/>
-    <p:sldId id="377" r:id="rId35"/>
-    <p:sldId id="381" r:id="rId36"/>
-    <p:sldId id="409" r:id="rId37"/>
-    <p:sldId id="337" r:id="rId38"/>
-    <p:sldId id="410" r:id="rId39"/>
-    <p:sldId id="384" r:id="rId40"/>
-    <p:sldId id="387" r:id="rId41"/>
-    <p:sldId id="385" r:id="rId42"/>
-    <p:sldId id="386" r:id="rId43"/>
+    <p:sldId id="417" r:id="rId27"/>
+    <p:sldId id="407" r:id="rId28"/>
+    <p:sldId id="329" r:id="rId29"/>
+    <p:sldId id="302" r:id="rId30"/>
+    <p:sldId id="350" r:id="rId31"/>
+    <p:sldId id="408" r:id="rId32"/>
+    <p:sldId id="378" r:id="rId33"/>
+    <p:sldId id="374" r:id="rId34"/>
+    <p:sldId id="375" r:id="rId35"/>
+    <p:sldId id="377" r:id="rId36"/>
+    <p:sldId id="381" r:id="rId37"/>
+    <p:sldId id="409" r:id="rId38"/>
+    <p:sldId id="337" r:id="rId39"/>
+    <p:sldId id="410" r:id="rId40"/>
+    <p:sldId id="384" r:id="rId41"/>
+    <p:sldId id="387" r:id="rId42"/>
+    <p:sldId id="385" r:id="rId43"/>
+    <p:sldId id="386" r:id="rId44"/>
   </p:sldIdLst>
   <p:sldSz cx="12192000" cy="6858000"/>
   <p:notesSz cx="6858000" cy="9144000"/>
@@ -244,7 +245,7 @@
           <a:p>
             <a:fld id="{56C6788E-680A-49E5-BB93-D456A9D23A29}" type="datetimeFigureOut">
               <a:rPr lang="ru-RU" smtClean="0"/>
-              <a:t>14.10.2024</a:t>
+              <a:t>23.10.2025</a:t>
             </a:fld>
             <a:endParaRPr lang="ru-RU"/>
           </a:p>
@@ -413,7 +414,7 @@
           <a:p>
             <a:fld id="{C4DF4945-C160-4CD5-B124-49B9BE14C0AB}" type="datetimeFigureOut">
               <a:rPr lang="ru-RU" smtClean="0"/>
-              <a:t>14.10.2024</a:t>
+              <a:t>23.10.2025</a:t>
             </a:fld>
             <a:endParaRPr lang="ru-RU"/>
           </a:p>
@@ -2822,6 +2823,142 @@
         <p:cNvPr id="1" name="">
           <a:extLst>
             <a:ext uri="{FF2B5EF4-FFF2-40B4-BE49-F238E27FC236}">
+              <a16:creationId xmlns:a16="http://schemas.microsoft.com/office/drawing/2014/main" id="{CEDF4690-BF34-CB57-5383-6C1C3C81BE38}"/>
+            </a:ext>
+          </a:extLst>
+        </p:cNvPr>
+        <p:cNvGrpSpPr/>
+        <p:nvPr/>
+      </p:nvGrpSpPr>
+      <p:grpSpPr>
+        <a:xfrm>
+          <a:off x="0" y="0"/>
+          <a:ext cx="0" cy="0"/>
+          <a:chOff x="0" y="0"/>
+          <a:chExt cx="0" cy="0"/>
+        </a:xfrm>
+      </p:grpSpPr>
+      <p:sp>
+        <p:nvSpPr>
+          <p:cNvPr id="2" name="Slide Image Placeholder 1">
+            <a:extLst>
+              <a:ext uri="{FF2B5EF4-FFF2-40B4-BE49-F238E27FC236}">
+                <a16:creationId xmlns:a16="http://schemas.microsoft.com/office/drawing/2014/main" id="{EB27F7BE-F74B-BF46-7CEE-B41D20C0563B}"/>
+              </a:ext>
+            </a:extLst>
+          </p:cNvPr>
+          <p:cNvSpPr>
+            <a:spLocks noGrp="1" noRot="1" noChangeAspect="1"/>
+          </p:cNvSpPr>
+          <p:nvPr>
+            <p:ph type="sldImg"/>
+          </p:nvPr>
+        </p:nvSpPr>
+        <p:spPr/>
+      </p:sp>
+      <p:sp>
+        <p:nvSpPr>
+          <p:cNvPr id="3" name="Notes Placeholder 2">
+            <a:extLst>
+              <a:ext uri="{FF2B5EF4-FFF2-40B4-BE49-F238E27FC236}">
+                <a16:creationId xmlns:a16="http://schemas.microsoft.com/office/drawing/2014/main" id="{677C345D-6474-3C66-EC53-CDA261792E84}"/>
+              </a:ext>
+            </a:extLst>
+          </p:cNvPr>
+          <p:cNvSpPr>
+            <a:spLocks noGrp="1"/>
+          </p:cNvSpPr>
+          <p:nvPr>
+            <p:ph type="body" idx="1"/>
+          </p:nvPr>
+        </p:nvSpPr>
+        <p:spPr/>
+        <p:txBody>
+          <a:bodyPr/>
+          <a:lstStyle/>
+          <a:p>
+            <a:endParaRPr lang="ru-RU" dirty="0"/>
+          </a:p>
+        </p:txBody>
+      </p:sp>
+      <p:sp>
+        <p:nvSpPr>
+          <p:cNvPr id="4" name="Slide Number Placeholder 3">
+            <a:extLst>
+              <a:ext uri="{FF2B5EF4-FFF2-40B4-BE49-F238E27FC236}">
+                <a16:creationId xmlns:a16="http://schemas.microsoft.com/office/drawing/2014/main" id="{A1E58CEE-E850-1CDA-F34C-6EC3DBC5190B}"/>
+              </a:ext>
+            </a:extLst>
+          </p:cNvPr>
+          <p:cNvSpPr>
+            <a:spLocks noGrp="1"/>
+          </p:cNvSpPr>
+          <p:nvPr>
+            <p:ph type="sldNum" sz="quarter" idx="10"/>
+          </p:nvPr>
+        </p:nvSpPr>
+        <p:spPr/>
+        <p:txBody>
+          <a:bodyPr/>
+          <a:lstStyle/>
+          <a:p>
+            <a:fld id="{7F33120B-582B-4354-977D-A474A534F6B9}" type="slidenum">
+              <a:rPr lang="ru-RU" smtClean="0"/>
+              <a:t>25</a:t>
+            </a:fld>
+            <a:endParaRPr lang="ru-RU"/>
+          </a:p>
+        </p:txBody>
+      </p:sp>
+      <p:sp>
+        <p:nvSpPr>
+          <p:cNvPr id="5" name="Header Placeholder 4">
+            <a:extLst>
+              <a:ext uri="{FF2B5EF4-FFF2-40B4-BE49-F238E27FC236}">
+                <a16:creationId xmlns:a16="http://schemas.microsoft.com/office/drawing/2014/main" id="{E695308D-BE2A-CCCF-10A5-3874AD8B4045}"/>
+              </a:ext>
+            </a:extLst>
+          </p:cNvPr>
+          <p:cNvSpPr>
+            <a:spLocks noGrp="1"/>
+          </p:cNvSpPr>
+          <p:nvPr>
+            <p:ph type="hdr" sz="quarter" idx="11"/>
+          </p:nvPr>
+        </p:nvSpPr>
+        <p:spPr/>
+        <p:txBody>
+          <a:bodyPr/>
+          <a:lstStyle/>
+          <a:p>
+            <a:r>
+              <a:rPr lang="ru-RU"/>
+              <a:t>Основы построения файловых систем</a:t>
+            </a:r>
+          </a:p>
+        </p:txBody>
+      </p:sp>
+    </p:spTree>
+    <p:extLst>
+      <p:ext uri="{BB962C8B-B14F-4D97-AF65-F5344CB8AC3E}">
+        <p14:creationId xmlns:p14="http://schemas.microsoft.com/office/powerpoint/2010/main" val="661380241"/>
+      </p:ext>
+    </p:extLst>
+  </p:cSld>
+  <p:clrMapOvr>
+    <a:masterClrMapping/>
+  </p:clrMapOvr>
+</p:notes>
+</file>
+
+<file path=ppt/notesSlides/notesSlide26.xml><?xml version="1.0" encoding="utf-8"?>
+<p:notes xmlns:a="http://schemas.openxmlformats.org/drawingml/2006/main" xmlns:r="http://schemas.openxmlformats.org/officeDocument/2006/relationships" xmlns:p="http://schemas.openxmlformats.org/presentationml/2006/main">
+  <p:cSld>
+    <p:spTree>
+      <p:nvGrpSpPr>
+        <p:cNvPr id="1" name="">
+          <a:extLst>
+            <a:ext uri="{FF2B5EF4-FFF2-40B4-BE49-F238E27FC236}">
               <a16:creationId xmlns:a16="http://schemas.microsoft.com/office/drawing/2014/main" id="{5BA4E098-E9CD-717B-E0C2-9859BC61745B}"/>
             </a:ext>
           </a:extLst>
@@ -2903,7 +3040,7 @@
           <a:p>
             <a:fld id="{7F33120B-582B-4354-977D-A474A534F6B9}" type="slidenum">
               <a:rPr lang="ru-RU" smtClean="0"/>
-              <a:t>25</a:t>
+              <a:t>26</a:t>
             </a:fld>
             <a:endParaRPr lang="ru-RU"/>
           </a:p>
@@ -2950,7 +3087,7 @@
 </p:notes>
 </file>
 
-<file path=ppt/notesSlides/notesSlide26.xml><?xml version="1.0" encoding="utf-8"?>
+<file path=ppt/notesSlides/notesSlide27.xml><?xml version="1.0" encoding="utf-8"?>
 <p:notes xmlns:a="http://schemas.openxmlformats.org/drawingml/2006/main" xmlns:r="http://schemas.openxmlformats.org/officeDocument/2006/relationships" xmlns:p="http://schemas.openxmlformats.org/presentationml/2006/main">
   <p:cSld>
     <p:spTree>
@@ -3015,7 +3152,7 @@
           <a:p>
             <a:fld id="{7F33120B-582B-4354-977D-A474A534F6B9}" type="slidenum">
               <a:rPr lang="ru-RU" smtClean="0"/>
-              <a:t>26</a:t>
+              <a:t>27</a:t>
             </a:fld>
             <a:endParaRPr lang="ru-RU"/>
           </a:p>
@@ -3047,112 +3184,6 @@
     <p:extLst>
       <p:ext uri="{BB962C8B-B14F-4D97-AF65-F5344CB8AC3E}">
         <p14:creationId xmlns:p14="http://schemas.microsoft.com/office/powerpoint/2010/main" val="938715785"/>
-      </p:ext>
-    </p:extLst>
-  </p:cSld>
-  <p:clrMapOvr>
-    <a:masterClrMapping/>
-  </p:clrMapOvr>
-</p:notes>
-</file>
-
-<file path=ppt/notesSlides/notesSlide27.xml><?xml version="1.0" encoding="utf-8"?>
-<p:notes xmlns:a="http://schemas.openxmlformats.org/drawingml/2006/main" xmlns:r="http://schemas.openxmlformats.org/officeDocument/2006/relationships" xmlns:p="http://schemas.openxmlformats.org/presentationml/2006/main">
-  <p:cSld>
-    <p:spTree>
-      <p:nvGrpSpPr>
-        <p:cNvPr id="1" name=""/>
-        <p:cNvGrpSpPr/>
-        <p:nvPr/>
-      </p:nvGrpSpPr>
-      <p:grpSpPr>
-        <a:xfrm>
-          <a:off x="0" y="0"/>
-          <a:ext cx="0" cy="0"/>
-          <a:chOff x="0" y="0"/>
-          <a:chExt cx="0" cy="0"/>
-        </a:xfrm>
-      </p:grpSpPr>
-      <p:sp>
-        <p:nvSpPr>
-          <p:cNvPr id="2" name="Slide Image Placeholder 1"/>
-          <p:cNvSpPr>
-            <a:spLocks noGrp="1" noRot="1" noChangeAspect="1"/>
-          </p:cNvSpPr>
-          <p:nvPr>
-            <p:ph type="sldImg"/>
-          </p:nvPr>
-        </p:nvSpPr>
-        <p:spPr/>
-      </p:sp>
-      <p:sp>
-        <p:nvSpPr>
-          <p:cNvPr id="3" name="Notes Placeholder 2"/>
-          <p:cNvSpPr>
-            <a:spLocks noGrp="1"/>
-          </p:cNvSpPr>
-          <p:nvPr>
-            <p:ph type="body" idx="1"/>
-          </p:nvPr>
-        </p:nvSpPr>
-        <p:spPr/>
-        <p:txBody>
-          <a:bodyPr/>
-          <a:lstStyle/>
-          <a:p>
-            <a:endParaRPr lang="ru-RU"/>
-          </a:p>
-        </p:txBody>
-      </p:sp>
-      <p:sp>
-        <p:nvSpPr>
-          <p:cNvPr id="4" name="Slide Number Placeholder 3"/>
-          <p:cNvSpPr>
-            <a:spLocks noGrp="1"/>
-          </p:cNvSpPr>
-          <p:nvPr>
-            <p:ph type="sldNum" sz="quarter" idx="10"/>
-          </p:nvPr>
-        </p:nvSpPr>
-        <p:spPr/>
-        <p:txBody>
-          <a:bodyPr/>
-          <a:lstStyle/>
-          <a:p>
-            <a:fld id="{7F33120B-582B-4354-977D-A474A534F6B9}" type="slidenum">
-              <a:rPr lang="ru-RU" smtClean="0"/>
-              <a:t>27</a:t>
-            </a:fld>
-            <a:endParaRPr lang="ru-RU"/>
-          </a:p>
-        </p:txBody>
-      </p:sp>
-      <p:sp>
-        <p:nvSpPr>
-          <p:cNvPr id="5" name="Header Placeholder 4"/>
-          <p:cNvSpPr>
-            <a:spLocks noGrp="1"/>
-          </p:cNvSpPr>
-          <p:nvPr>
-            <p:ph type="hdr" sz="quarter" idx="11"/>
-          </p:nvPr>
-        </p:nvSpPr>
-        <p:spPr/>
-        <p:txBody>
-          <a:bodyPr/>
-          <a:lstStyle/>
-          <a:p>
-            <a:r>
-              <a:rPr lang="ru-RU"/>
-              <a:t>Основы построения файловых систем</a:t>
-            </a:r>
-          </a:p>
-        </p:txBody>
-      </p:sp>
-    </p:spTree>
-    <p:extLst>
-      <p:ext uri="{BB962C8B-B14F-4D97-AF65-F5344CB8AC3E}">
-        <p14:creationId xmlns:p14="http://schemas.microsoft.com/office/powerpoint/2010/main" val="4279028054"/>
       </p:ext>
     </p:extLst>
   </p:cSld>
@@ -3258,7 +3289,7 @@
     </p:spTree>
     <p:extLst>
       <p:ext uri="{BB962C8B-B14F-4D97-AF65-F5344CB8AC3E}">
-        <p14:creationId xmlns:p14="http://schemas.microsoft.com/office/powerpoint/2010/main" val="1833144585"/>
+        <p14:creationId xmlns:p14="http://schemas.microsoft.com/office/powerpoint/2010/main" val="4279028054"/>
       </p:ext>
     </p:extLst>
   </p:cSld>
@@ -3273,13 +3304,7 @@
   <p:cSld>
     <p:spTree>
       <p:nvGrpSpPr>
-        <p:cNvPr id="1" name="">
-          <a:extLst>
-            <a:ext uri="{FF2B5EF4-FFF2-40B4-BE49-F238E27FC236}">
-              <a16:creationId xmlns:a16="http://schemas.microsoft.com/office/drawing/2014/main" id="{AB1655B1-79D1-4B0C-C82B-50E2990F3B50}"/>
-            </a:ext>
-          </a:extLst>
-        </p:cNvPr>
+        <p:cNvPr id="1" name=""/>
         <p:cNvGrpSpPr/>
         <p:nvPr/>
       </p:nvGrpSpPr>
@@ -3293,13 +3318,7 @@
       </p:grpSpPr>
       <p:sp>
         <p:nvSpPr>
-          <p:cNvPr id="2" name="Slide Image Placeholder 1">
-            <a:extLst>
-              <a:ext uri="{FF2B5EF4-FFF2-40B4-BE49-F238E27FC236}">
-                <a16:creationId xmlns:a16="http://schemas.microsoft.com/office/drawing/2014/main" id="{51A3A825-833E-C733-C528-F8B4278EE977}"/>
-              </a:ext>
-            </a:extLst>
-          </p:cNvPr>
+          <p:cNvPr id="2" name="Slide Image Placeholder 1"/>
           <p:cNvSpPr>
             <a:spLocks noGrp="1" noRot="1" noChangeAspect="1"/>
           </p:cNvSpPr>
@@ -3311,13 +3330,7 @@
       </p:sp>
       <p:sp>
         <p:nvSpPr>
-          <p:cNvPr id="3" name="Notes Placeholder 2">
-            <a:extLst>
-              <a:ext uri="{FF2B5EF4-FFF2-40B4-BE49-F238E27FC236}">
-                <a16:creationId xmlns:a16="http://schemas.microsoft.com/office/drawing/2014/main" id="{6511184B-249F-2B1C-CD6B-AA5F104A3F6F}"/>
-              </a:ext>
-            </a:extLst>
-          </p:cNvPr>
+          <p:cNvPr id="3" name="Notes Placeholder 2"/>
           <p:cNvSpPr>
             <a:spLocks noGrp="1"/>
           </p:cNvSpPr>
@@ -3336,13 +3349,7 @@
       </p:sp>
       <p:sp>
         <p:nvSpPr>
-          <p:cNvPr id="4" name="Slide Number Placeholder 3">
-            <a:extLst>
-              <a:ext uri="{FF2B5EF4-FFF2-40B4-BE49-F238E27FC236}">
-                <a16:creationId xmlns:a16="http://schemas.microsoft.com/office/drawing/2014/main" id="{490B33E7-7F63-2F00-E0A7-2E5337B5B4E5}"/>
-              </a:ext>
-            </a:extLst>
-          </p:cNvPr>
+          <p:cNvPr id="4" name="Slide Number Placeholder 3"/>
           <p:cNvSpPr>
             <a:spLocks noGrp="1"/>
           </p:cNvSpPr>
@@ -3365,13 +3372,7 @@
       </p:sp>
       <p:sp>
         <p:nvSpPr>
-          <p:cNvPr id="5" name="Header Placeholder 4">
-            <a:extLst>
-              <a:ext uri="{FF2B5EF4-FFF2-40B4-BE49-F238E27FC236}">
-                <a16:creationId xmlns:a16="http://schemas.microsoft.com/office/drawing/2014/main" id="{27E9F4B9-6E3C-5977-EB0D-579A41F0875F}"/>
-              </a:ext>
-            </a:extLst>
-          </p:cNvPr>
+          <p:cNvPr id="5" name="Header Placeholder 4"/>
           <p:cNvSpPr>
             <a:spLocks noGrp="1"/>
           </p:cNvSpPr>
@@ -3394,7 +3395,7 @@
     </p:spTree>
     <p:extLst>
       <p:ext uri="{BB962C8B-B14F-4D97-AF65-F5344CB8AC3E}">
-        <p14:creationId xmlns:p14="http://schemas.microsoft.com/office/powerpoint/2010/main" val="2092188002"/>
+        <p14:creationId xmlns:p14="http://schemas.microsoft.com/office/powerpoint/2010/main" val="1833144585"/>
       </p:ext>
     </p:extLst>
   </p:cSld>
@@ -3515,7 +3516,13 @@
   <p:cSld>
     <p:spTree>
       <p:nvGrpSpPr>
-        <p:cNvPr id="1" name=""/>
+        <p:cNvPr id="1" name="">
+          <a:extLst>
+            <a:ext uri="{FF2B5EF4-FFF2-40B4-BE49-F238E27FC236}">
+              <a16:creationId xmlns:a16="http://schemas.microsoft.com/office/drawing/2014/main" id="{AB1655B1-79D1-4B0C-C82B-50E2990F3B50}"/>
+            </a:ext>
+          </a:extLst>
+        </p:cNvPr>
         <p:cNvGrpSpPr/>
         <p:nvPr/>
       </p:nvGrpSpPr>
@@ -3529,7 +3536,13 @@
       </p:grpSpPr>
       <p:sp>
         <p:nvSpPr>
-          <p:cNvPr id="2" name="Slide Image Placeholder 1"/>
+          <p:cNvPr id="2" name="Slide Image Placeholder 1">
+            <a:extLst>
+              <a:ext uri="{FF2B5EF4-FFF2-40B4-BE49-F238E27FC236}">
+                <a16:creationId xmlns:a16="http://schemas.microsoft.com/office/drawing/2014/main" id="{51A3A825-833E-C733-C528-F8B4278EE977}"/>
+              </a:ext>
+            </a:extLst>
+          </p:cNvPr>
           <p:cNvSpPr>
             <a:spLocks noGrp="1" noRot="1" noChangeAspect="1"/>
           </p:cNvSpPr>
@@ -3541,7 +3554,13 @@
       </p:sp>
       <p:sp>
         <p:nvSpPr>
-          <p:cNvPr id="3" name="Notes Placeholder 2"/>
+          <p:cNvPr id="3" name="Notes Placeholder 2">
+            <a:extLst>
+              <a:ext uri="{FF2B5EF4-FFF2-40B4-BE49-F238E27FC236}">
+                <a16:creationId xmlns:a16="http://schemas.microsoft.com/office/drawing/2014/main" id="{6511184B-249F-2B1C-CD6B-AA5F104A3F6F}"/>
+              </a:ext>
+            </a:extLst>
+          </p:cNvPr>
           <p:cNvSpPr>
             <a:spLocks noGrp="1"/>
           </p:cNvSpPr>
@@ -3560,7 +3579,13 @@
       </p:sp>
       <p:sp>
         <p:nvSpPr>
-          <p:cNvPr id="4" name="Slide Number Placeholder 3"/>
+          <p:cNvPr id="4" name="Slide Number Placeholder 3">
+            <a:extLst>
+              <a:ext uri="{FF2B5EF4-FFF2-40B4-BE49-F238E27FC236}">
+                <a16:creationId xmlns:a16="http://schemas.microsoft.com/office/drawing/2014/main" id="{490B33E7-7F63-2F00-E0A7-2E5337B5B4E5}"/>
+              </a:ext>
+            </a:extLst>
+          </p:cNvPr>
           <p:cNvSpPr>
             <a:spLocks noGrp="1"/>
           </p:cNvSpPr>
@@ -3583,7 +3608,13 @@
       </p:sp>
       <p:sp>
         <p:nvSpPr>
-          <p:cNvPr id="5" name="Header Placeholder 4"/>
+          <p:cNvPr id="5" name="Header Placeholder 4">
+            <a:extLst>
+              <a:ext uri="{FF2B5EF4-FFF2-40B4-BE49-F238E27FC236}">
+                <a16:creationId xmlns:a16="http://schemas.microsoft.com/office/drawing/2014/main" id="{27E9F4B9-6E3C-5977-EB0D-579A41F0875F}"/>
+              </a:ext>
+            </a:extLst>
+          </p:cNvPr>
           <p:cNvSpPr>
             <a:spLocks noGrp="1"/>
           </p:cNvSpPr>
@@ -3606,7 +3637,7 @@
     </p:spTree>
     <p:extLst>
       <p:ext uri="{BB962C8B-B14F-4D97-AF65-F5344CB8AC3E}">
-        <p14:creationId xmlns:p14="http://schemas.microsoft.com/office/powerpoint/2010/main" val="1239992121"/>
+        <p14:creationId xmlns:p14="http://schemas.microsoft.com/office/powerpoint/2010/main" val="2092188002"/>
       </p:ext>
     </p:extLst>
   </p:cSld>
@@ -3712,7 +3743,7 @@
     </p:spTree>
     <p:extLst>
       <p:ext uri="{BB962C8B-B14F-4D97-AF65-F5344CB8AC3E}">
-        <p14:creationId xmlns:p14="http://schemas.microsoft.com/office/powerpoint/2010/main" val="4075224564"/>
+        <p14:creationId xmlns:p14="http://schemas.microsoft.com/office/powerpoint/2010/main" val="1239992121"/>
       </p:ext>
     </p:extLst>
   </p:cSld>
@@ -3818,7 +3849,7 @@
     </p:spTree>
     <p:extLst>
       <p:ext uri="{BB962C8B-B14F-4D97-AF65-F5344CB8AC3E}">
-        <p14:creationId xmlns:p14="http://schemas.microsoft.com/office/powerpoint/2010/main" val="1626932421"/>
+        <p14:creationId xmlns:p14="http://schemas.microsoft.com/office/powerpoint/2010/main" val="4075224564"/>
       </p:ext>
     </p:extLst>
   </p:cSld>
@@ -3924,7 +3955,7 @@
     </p:spTree>
     <p:extLst>
       <p:ext uri="{BB962C8B-B14F-4D97-AF65-F5344CB8AC3E}">
-        <p14:creationId xmlns:p14="http://schemas.microsoft.com/office/powerpoint/2010/main" val="639422980"/>
+        <p14:creationId xmlns:p14="http://schemas.microsoft.com/office/powerpoint/2010/main" val="1626932421"/>
       </p:ext>
     </p:extLst>
   </p:cSld>
@@ -4030,6 +4061,112 @@
     </p:spTree>
     <p:extLst>
       <p:ext uri="{BB962C8B-B14F-4D97-AF65-F5344CB8AC3E}">
+        <p14:creationId xmlns:p14="http://schemas.microsoft.com/office/powerpoint/2010/main" val="639422980"/>
+      </p:ext>
+    </p:extLst>
+  </p:cSld>
+  <p:clrMapOvr>
+    <a:masterClrMapping/>
+  </p:clrMapOvr>
+</p:notes>
+</file>
+
+<file path=ppt/notesSlides/notesSlide35.xml><?xml version="1.0" encoding="utf-8"?>
+<p:notes xmlns:a="http://schemas.openxmlformats.org/drawingml/2006/main" xmlns:r="http://schemas.openxmlformats.org/officeDocument/2006/relationships" xmlns:p="http://schemas.openxmlformats.org/presentationml/2006/main">
+  <p:cSld>
+    <p:spTree>
+      <p:nvGrpSpPr>
+        <p:cNvPr id="1" name=""/>
+        <p:cNvGrpSpPr/>
+        <p:nvPr/>
+      </p:nvGrpSpPr>
+      <p:grpSpPr>
+        <a:xfrm>
+          <a:off x="0" y="0"/>
+          <a:ext cx="0" cy="0"/>
+          <a:chOff x="0" y="0"/>
+          <a:chExt cx="0" cy="0"/>
+        </a:xfrm>
+      </p:grpSpPr>
+      <p:sp>
+        <p:nvSpPr>
+          <p:cNvPr id="2" name="Slide Image Placeholder 1"/>
+          <p:cNvSpPr>
+            <a:spLocks noGrp="1" noRot="1" noChangeAspect="1"/>
+          </p:cNvSpPr>
+          <p:nvPr>
+            <p:ph type="sldImg"/>
+          </p:nvPr>
+        </p:nvSpPr>
+        <p:spPr/>
+      </p:sp>
+      <p:sp>
+        <p:nvSpPr>
+          <p:cNvPr id="3" name="Notes Placeholder 2"/>
+          <p:cNvSpPr>
+            <a:spLocks noGrp="1"/>
+          </p:cNvSpPr>
+          <p:nvPr>
+            <p:ph type="body" idx="1"/>
+          </p:nvPr>
+        </p:nvSpPr>
+        <p:spPr/>
+        <p:txBody>
+          <a:bodyPr/>
+          <a:lstStyle/>
+          <a:p>
+            <a:endParaRPr lang="ru-RU"/>
+          </a:p>
+        </p:txBody>
+      </p:sp>
+      <p:sp>
+        <p:nvSpPr>
+          <p:cNvPr id="4" name="Slide Number Placeholder 3"/>
+          <p:cNvSpPr>
+            <a:spLocks noGrp="1"/>
+          </p:cNvSpPr>
+          <p:nvPr>
+            <p:ph type="sldNum" sz="quarter" idx="10"/>
+          </p:nvPr>
+        </p:nvSpPr>
+        <p:spPr/>
+        <p:txBody>
+          <a:bodyPr/>
+          <a:lstStyle/>
+          <a:p>
+            <a:fld id="{7F33120B-582B-4354-977D-A474A534F6B9}" type="slidenum">
+              <a:rPr lang="ru-RU" smtClean="0"/>
+              <a:t>35</a:t>
+            </a:fld>
+            <a:endParaRPr lang="ru-RU"/>
+          </a:p>
+        </p:txBody>
+      </p:sp>
+      <p:sp>
+        <p:nvSpPr>
+          <p:cNvPr id="5" name="Header Placeholder 4"/>
+          <p:cNvSpPr>
+            <a:spLocks noGrp="1"/>
+          </p:cNvSpPr>
+          <p:nvPr>
+            <p:ph type="hdr" sz="quarter" idx="11"/>
+          </p:nvPr>
+        </p:nvSpPr>
+        <p:spPr/>
+        <p:txBody>
+          <a:bodyPr/>
+          <a:lstStyle/>
+          <a:p>
+            <a:r>
+              <a:rPr lang="ru-RU"/>
+              <a:t>Основы построения файловых систем</a:t>
+            </a:r>
+          </a:p>
+        </p:txBody>
+      </p:sp>
+    </p:spTree>
+    <p:extLst>
+      <p:ext uri="{BB962C8B-B14F-4D97-AF65-F5344CB8AC3E}">
         <p14:creationId xmlns:p14="http://schemas.microsoft.com/office/powerpoint/2010/main" val="180795610"/>
       </p:ext>
     </p:extLst>
@@ -4040,7 +4177,7 @@
 </p:notes>
 </file>
 
-<file path=ppt/notesSlides/notesSlide35.xml><?xml version="1.0" encoding="utf-8"?>
+<file path=ppt/notesSlides/notesSlide36.xml><?xml version="1.0" encoding="utf-8"?>
 <p:notes xmlns:a="http://schemas.openxmlformats.org/drawingml/2006/main" xmlns:r="http://schemas.openxmlformats.org/officeDocument/2006/relationships" xmlns:p="http://schemas.openxmlformats.org/presentationml/2006/main">
   <p:cSld>
     <p:spTree>
@@ -4129,7 +4266,7 @@
           <a:p>
             <a:fld id="{7F33120B-582B-4354-977D-A474A534F6B9}" type="slidenum">
               <a:rPr lang="ru-RU" smtClean="0"/>
-              <a:t>35</a:t>
+              <a:t>36</a:t>
             </a:fld>
             <a:endParaRPr lang="ru-RU"/>
           </a:p>
@@ -4176,7 +4313,7 @@
 </p:notes>
 </file>
 
-<file path=ppt/notesSlides/notesSlide36.xml><?xml version="1.0" encoding="utf-8"?>
+<file path=ppt/notesSlides/notesSlide37.xml><?xml version="1.0" encoding="utf-8"?>
 <p:notes xmlns:a="http://schemas.openxmlformats.org/drawingml/2006/main" xmlns:r="http://schemas.openxmlformats.org/officeDocument/2006/relationships" xmlns:p="http://schemas.openxmlformats.org/presentationml/2006/main">
   <p:cSld>
     <p:spTree>
@@ -4241,7 +4378,7 @@
           <a:p>
             <a:fld id="{7F33120B-582B-4354-977D-A474A534F6B9}" type="slidenum">
               <a:rPr lang="ru-RU" smtClean="0"/>
-              <a:t>36</a:t>
+              <a:t>37</a:t>
             </a:fld>
             <a:endParaRPr lang="ru-RU"/>
           </a:p>
@@ -4282,7 +4419,7 @@
 </p:notes>
 </file>
 
-<file path=ppt/notesSlides/notesSlide37.xml><?xml version="1.0" encoding="utf-8"?>
+<file path=ppt/notesSlides/notesSlide38.xml><?xml version="1.0" encoding="utf-8"?>
 <p:notes xmlns:a="http://schemas.openxmlformats.org/drawingml/2006/main" xmlns:r="http://schemas.openxmlformats.org/officeDocument/2006/relationships" xmlns:p="http://schemas.openxmlformats.org/presentationml/2006/main">
   <p:cSld>
     <p:spTree>
@@ -4371,7 +4508,7 @@
           <a:p>
             <a:fld id="{7F33120B-582B-4354-977D-A474A534F6B9}" type="slidenum">
               <a:rPr lang="ru-RU" smtClean="0"/>
-              <a:t>37</a:t>
+              <a:t>38</a:t>
             </a:fld>
             <a:endParaRPr lang="ru-RU"/>
           </a:p>
@@ -4409,112 +4546,6 @@
     <p:extLst>
       <p:ext uri="{BB962C8B-B14F-4D97-AF65-F5344CB8AC3E}">
         <p14:creationId xmlns:p14="http://schemas.microsoft.com/office/powerpoint/2010/main" val="959136079"/>
-      </p:ext>
-    </p:extLst>
-  </p:cSld>
-  <p:clrMapOvr>
-    <a:masterClrMapping/>
-  </p:clrMapOvr>
-</p:notes>
-</file>
-
-<file path=ppt/notesSlides/notesSlide38.xml><?xml version="1.0" encoding="utf-8"?>
-<p:notes xmlns:a="http://schemas.openxmlformats.org/drawingml/2006/main" xmlns:r="http://schemas.openxmlformats.org/officeDocument/2006/relationships" xmlns:p="http://schemas.openxmlformats.org/presentationml/2006/main">
-  <p:cSld>
-    <p:spTree>
-      <p:nvGrpSpPr>
-        <p:cNvPr id="1" name=""/>
-        <p:cNvGrpSpPr/>
-        <p:nvPr/>
-      </p:nvGrpSpPr>
-      <p:grpSpPr>
-        <a:xfrm>
-          <a:off x="0" y="0"/>
-          <a:ext cx="0" cy="0"/>
-          <a:chOff x="0" y="0"/>
-          <a:chExt cx="0" cy="0"/>
-        </a:xfrm>
-      </p:grpSpPr>
-      <p:sp>
-        <p:nvSpPr>
-          <p:cNvPr id="2" name="Slide Image Placeholder 1"/>
-          <p:cNvSpPr>
-            <a:spLocks noGrp="1" noRot="1" noChangeAspect="1"/>
-          </p:cNvSpPr>
-          <p:nvPr>
-            <p:ph type="sldImg"/>
-          </p:nvPr>
-        </p:nvSpPr>
-        <p:spPr/>
-      </p:sp>
-      <p:sp>
-        <p:nvSpPr>
-          <p:cNvPr id="3" name="Notes Placeholder 2"/>
-          <p:cNvSpPr>
-            <a:spLocks noGrp="1"/>
-          </p:cNvSpPr>
-          <p:nvPr>
-            <p:ph type="body" idx="1"/>
-          </p:nvPr>
-        </p:nvSpPr>
-        <p:spPr/>
-        <p:txBody>
-          <a:bodyPr/>
-          <a:lstStyle/>
-          <a:p>
-            <a:endParaRPr lang="ru-RU"/>
-          </a:p>
-        </p:txBody>
-      </p:sp>
-      <p:sp>
-        <p:nvSpPr>
-          <p:cNvPr id="4" name="Slide Number Placeholder 3"/>
-          <p:cNvSpPr>
-            <a:spLocks noGrp="1"/>
-          </p:cNvSpPr>
-          <p:nvPr>
-            <p:ph type="sldNum" sz="quarter" idx="10"/>
-          </p:nvPr>
-        </p:nvSpPr>
-        <p:spPr/>
-        <p:txBody>
-          <a:bodyPr/>
-          <a:lstStyle/>
-          <a:p>
-            <a:fld id="{7F33120B-582B-4354-977D-A474A534F6B9}" type="slidenum">
-              <a:rPr lang="ru-RU" smtClean="0"/>
-              <a:t>38</a:t>
-            </a:fld>
-            <a:endParaRPr lang="ru-RU"/>
-          </a:p>
-        </p:txBody>
-      </p:sp>
-      <p:sp>
-        <p:nvSpPr>
-          <p:cNvPr id="5" name="Header Placeholder 4"/>
-          <p:cNvSpPr>
-            <a:spLocks noGrp="1"/>
-          </p:cNvSpPr>
-          <p:nvPr>
-            <p:ph type="hdr" sz="quarter" idx="11"/>
-          </p:nvPr>
-        </p:nvSpPr>
-        <p:spPr/>
-        <p:txBody>
-          <a:bodyPr/>
-          <a:lstStyle/>
-          <a:p>
-            <a:r>
-              <a:rPr lang="ru-RU"/>
-              <a:t>Основы построения файловых систем</a:t>
-            </a:r>
-          </a:p>
-        </p:txBody>
-      </p:sp>
-    </p:spTree>
-    <p:extLst>
-      <p:ext uri="{BB962C8B-B14F-4D97-AF65-F5344CB8AC3E}">
-        <p14:creationId xmlns:p14="http://schemas.microsoft.com/office/powerpoint/2010/main" val="3232107595"/>
       </p:ext>
     </p:extLst>
   </p:cSld>
@@ -4620,7 +4651,7 @@
     </p:spTree>
     <p:extLst>
       <p:ext uri="{BB962C8B-B14F-4D97-AF65-F5344CB8AC3E}">
-        <p14:creationId xmlns:p14="http://schemas.microsoft.com/office/powerpoint/2010/main" val="1429130162"/>
+        <p14:creationId xmlns:p14="http://schemas.microsoft.com/office/powerpoint/2010/main" val="3232107595"/>
       </p:ext>
     </p:extLst>
   </p:cSld>
@@ -4832,7 +4863,7 @@
     </p:spTree>
     <p:extLst>
       <p:ext uri="{BB962C8B-B14F-4D97-AF65-F5344CB8AC3E}">
-        <p14:creationId xmlns:p14="http://schemas.microsoft.com/office/powerpoint/2010/main" val="3931420251"/>
+        <p14:creationId xmlns:p14="http://schemas.microsoft.com/office/powerpoint/2010/main" val="1429130162"/>
       </p:ext>
     </p:extLst>
   </p:cSld>
@@ -4908,6 +4939,112 @@
             <a:fld id="{7F33120B-582B-4354-977D-A474A534F6B9}" type="slidenum">
               <a:rPr lang="ru-RU" smtClean="0"/>
               <a:t>41</a:t>
+            </a:fld>
+            <a:endParaRPr lang="ru-RU"/>
+          </a:p>
+        </p:txBody>
+      </p:sp>
+      <p:sp>
+        <p:nvSpPr>
+          <p:cNvPr id="5" name="Header Placeholder 4"/>
+          <p:cNvSpPr>
+            <a:spLocks noGrp="1"/>
+          </p:cNvSpPr>
+          <p:nvPr>
+            <p:ph type="hdr" sz="quarter" idx="11"/>
+          </p:nvPr>
+        </p:nvSpPr>
+        <p:spPr/>
+        <p:txBody>
+          <a:bodyPr/>
+          <a:lstStyle/>
+          <a:p>
+            <a:r>
+              <a:rPr lang="ru-RU"/>
+              <a:t>Основы построения файловых систем</a:t>
+            </a:r>
+          </a:p>
+        </p:txBody>
+      </p:sp>
+    </p:spTree>
+    <p:extLst>
+      <p:ext uri="{BB962C8B-B14F-4D97-AF65-F5344CB8AC3E}">
+        <p14:creationId xmlns:p14="http://schemas.microsoft.com/office/powerpoint/2010/main" val="3931420251"/>
+      </p:ext>
+    </p:extLst>
+  </p:cSld>
+  <p:clrMapOvr>
+    <a:masterClrMapping/>
+  </p:clrMapOvr>
+</p:notes>
+</file>
+
+<file path=ppt/notesSlides/notesSlide42.xml><?xml version="1.0" encoding="utf-8"?>
+<p:notes xmlns:a="http://schemas.openxmlformats.org/drawingml/2006/main" xmlns:r="http://schemas.openxmlformats.org/officeDocument/2006/relationships" xmlns:p="http://schemas.openxmlformats.org/presentationml/2006/main">
+  <p:cSld>
+    <p:spTree>
+      <p:nvGrpSpPr>
+        <p:cNvPr id="1" name=""/>
+        <p:cNvGrpSpPr/>
+        <p:nvPr/>
+      </p:nvGrpSpPr>
+      <p:grpSpPr>
+        <a:xfrm>
+          <a:off x="0" y="0"/>
+          <a:ext cx="0" cy="0"/>
+          <a:chOff x="0" y="0"/>
+          <a:chExt cx="0" cy="0"/>
+        </a:xfrm>
+      </p:grpSpPr>
+      <p:sp>
+        <p:nvSpPr>
+          <p:cNvPr id="2" name="Slide Image Placeholder 1"/>
+          <p:cNvSpPr>
+            <a:spLocks noGrp="1" noRot="1" noChangeAspect="1"/>
+          </p:cNvSpPr>
+          <p:nvPr>
+            <p:ph type="sldImg"/>
+          </p:nvPr>
+        </p:nvSpPr>
+        <p:spPr/>
+      </p:sp>
+      <p:sp>
+        <p:nvSpPr>
+          <p:cNvPr id="3" name="Notes Placeholder 2"/>
+          <p:cNvSpPr>
+            <a:spLocks noGrp="1"/>
+          </p:cNvSpPr>
+          <p:nvPr>
+            <p:ph type="body" idx="1"/>
+          </p:nvPr>
+        </p:nvSpPr>
+        <p:spPr/>
+        <p:txBody>
+          <a:bodyPr/>
+          <a:lstStyle/>
+          <a:p>
+            <a:endParaRPr lang="ru-RU"/>
+          </a:p>
+        </p:txBody>
+      </p:sp>
+      <p:sp>
+        <p:nvSpPr>
+          <p:cNvPr id="4" name="Slide Number Placeholder 3"/>
+          <p:cNvSpPr>
+            <a:spLocks noGrp="1"/>
+          </p:cNvSpPr>
+          <p:nvPr>
+            <p:ph type="sldNum" sz="quarter" idx="10"/>
+          </p:nvPr>
+        </p:nvSpPr>
+        <p:spPr/>
+        <p:txBody>
+          <a:bodyPr/>
+          <a:lstStyle/>
+          <a:p>
+            <a:fld id="{7F33120B-582B-4354-977D-A474A534F6B9}" type="slidenum">
+              <a:rPr lang="ru-RU" smtClean="0"/>
+              <a:t>42</a:t>
             </a:fld>
             <a:endParaRPr lang="ru-RU"/>
           </a:p>
@@ -5699,7 +5836,7 @@
           <a:p>
             <a:fld id="{12C63722-5D9F-4E99-9720-9B6A0C7BB1C9}" type="datetimeFigureOut">
               <a:rPr lang="ru-RU" smtClean="0"/>
-              <a:t>14.10.2024</a:t>
+              <a:t>23.10.2025</a:t>
             </a:fld>
             <a:endParaRPr lang="ru-RU"/>
           </a:p>
@@ -5869,7 +6006,7 @@
           <a:p>
             <a:fld id="{12C63722-5D9F-4E99-9720-9B6A0C7BB1C9}" type="datetimeFigureOut">
               <a:rPr lang="ru-RU" smtClean="0"/>
-              <a:t>14.10.2024</a:t>
+              <a:t>23.10.2025</a:t>
             </a:fld>
             <a:endParaRPr lang="ru-RU"/>
           </a:p>
@@ -6049,7 +6186,7 @@
           <a:p>
             <a:fld id="{12C63722-5D9F-4E99-9720-9B6A0C7BB1C9}" type="datetimeFigureOut">
               <a:rPr lang="ru-RU" smtClean="0"/>
-              <a:t>14.10.2024</a:t>
+              <a:t>23.10.2025</a:t>
             </a:fld>
             <a:endParaRPr lang="ru-RU"/>
           </a:p>
@@ -6241,7 +6378,7 @@
           <a:p>
             <a:fld id="{8C218C88-2408-4CFC-B25C-07450930B282}" type="datetimeFigureOut">
               <a:rPr lang="ru-RU" smtClean="0"/>
-              <a:t>14.10.2024</a:t>
+              <a:t>23.10.2025</a:t>
             </a:fld>
             <a:endParaRPr lang="ru-RU"/>
           </a:p>
@@ -6411,7 +6548,7 @@
           <a:p>
             <a:fld id="{8C218C88-2408-4CFC-B25C-07450930B282}" type="datetimeFigureOut">
               <a:rPr lang="ru-RU" smtClean="0"/>
-              <a:t>14.10.2024</a:t>
+              <a:t>23.10.2025</a:t>
             </a:fld>
             <a:endParaRPr lang="ru-RU"/>
           </a:p>
@@ -6657,7 +6794,7 @@
           <a:p>
             <a:fld id="{8C218C88-2408-4CFC-B25C-07450930B282}" type="datetimeFigureOut">
               <a:rPr lang="ru-RU" smtClean="0"/>
-              <a:t>14.10.2024</a:t>
+              <a:t>23.10.2025</a:t>
             </a:fld>
             <a:endParaRPr lang="ru-RU"/>
           </a:p>
@@ -6889,7 +7026,7 @@
           <a:p>
             <a:fld id="{8C218C88-2408-4CFC-B25C-07450930B282}" type="datetimeFigureOut">
               <a:rPr lang="ru-RU" smtClean="0"/>
-              <a:t>14.10.2024</a:t>
+              <a:t>23.10.2025</a:t>
             </a:fld>
             <a:endParaRPr lang="ru-RU"/>
           </a:p>
@@ -7256,7 +7393,7 @@
           <a:p>
             <a:fld id="{8C218C88-2408-4CFC-B25C-07450930B282}" type="datetimeFigureOut">
               <a:rPr lang="ru-RU" smtClean="0"/>
-              <a:t>14.10.2024</a:t>
+              <a:t>23.10.2025</a:t>
             </a:fld>
             <a:endParaRPr lang="ru-RU"/>
           </a:p>
@@ -7374,7 +7511,7 @@
           <a:p>
             <a:fld id="{8C218C88-2408-4CFC-B25C-07450930B282}" type="datetimeFigureOut">
               <a:rPr lang="ru-RU" smtClean="0"/>
-              <a:t>14.10.2024</a:t>
+              <a:t>23.10.2025</a:t>
             </a:fld>
             <a:endParaRPr lang="ru-RU"/>
           </a:p>
@@ -7469,7 +7606,7 @@
           <a:p>
             <a:fld id="{8C218C88-2408-4CFC-B25C-07450930B282}" type="datetimeFigureOut">
               <a:rPr lang="ru-RU" smtClean="0"/>
-              <a:t>14.10.2024</a:t>
+              <a:t>23.10.2025</a:t>
             </a:fld>
             <a:endParaRPr lang="ru-RU"/>
           </a:p>
@@ -7746,7 +7883,7 @@
           <a:p>
             <a:fld id="{8C218C88-2408-4CFC-B25C-07450930B282}" type="datetimeFigureOut">
               <a:rPr lang="ru-RU" smtClean="0"/>
-              <a:t>14.10.2024</a:t>
+              <a:t>23.10.2025</a:t>
             </a:fld>
             <a:endParaRPr lang="ru-RU"/>
           </a:p>
@@ -7916,7 +8053,7 @@
           <a:p>
             <a:fld id="{12C63722-5D9F-4E99-9720-9B6A0C7BB1C9}" type="datetimeFigureOut">
               <a:rPr lang="ru-RU" smtClean="0"/>
-              <a:t>14.10.2024</a:t>
+              <a:t>23.10.2025</a:t>
             </a:fld>
             <a:endParaRPr lang="ru-RU"/>
           </a:p>
@@ -8169,7 +8306,7 @@
           <a:p>
             <a:fld id="{8C218C88-2408-4CFC-B25C-07450930B282}" type="datetimeFigureOut">
               <a:rPr lang="ru-RU" smtClean="0"/>
-              <a:t>14.10.2024</a:t>
+              <a:t>23.10.2025</a:t>
             </a:fld>
             <a:endParaRPr lang="ru-RU"/>
           </a:p>
@@ -8339,7 +8476,7 @@
           <a:p>
             <a:fld id="{8C218C88-2408-4CFC-B25C-07450930B282}" type="datetimeFigureOut">
               <a:rPr lang="ru-RU" smtClean="0"/>
-              <a:t>14.10.2024</a:t>
+              <a:t>23.10.2025</a:t>
             </a:fld>
             <a:endParaRPr lang="ru-RU"/>
           </a:p>
@@ -8519,7 +8656,7 @@
           <a:p>
             <a:fld id="{8C218C88-2408-4CFC-B25C-07450930B282}" type="datetimeFigureOut">
               <a:rPr lang="ru-RU" smtClean="0"/>
-              <a:t>14.10.2024</a:t>
+              <a:t>23.10.2025</a:t>
             </a:fld>
             <a:endParaRPr lang="ru-RU"/>
           </a:p>
@@ -8765,7 +8902,7 @@
           <a:p>
             <a:fld id="{12C63722-5D9F-4E99-9720-9B6A0C7BB1C9}" type="datetimeFigureOut">
               <a:rPr lang="ru-RU" smtClean="0"/>
-              <a:t>14.10.2024</a:t>
+              <a:t>23.10.2025</a:t>
             </a:fld>
             <a:endParaRPr lang="ru-RU"/>
           </a:p>
@@ -9005,7 +9142,7 @@
           <a:p>
             <a:fld id="{12C63722-5D9F-4E99-9720-9B6A0C7BB1C9}" type="datetimeFigureOut">
               <a:rPr lang="ru-RU" smtClean="0"/>
-              <a:t>14.10.2024</a:t>
+              <a:t>23.10.2025</a:t>
             </a:fld>
             <a:endParaRPr lang="ru-RU"/>
           </a:p>
@@ -9372,7 +9509,7 @@
           <a:p>
             <a:fld id="{12C63722-5D9F-4E99-9720-9B6A0C7BB1C9}" type="datetimeFigureOut">
               <a:rPr lang="ru-RU" smtClean="0"/>
-              <a:t>14.10.2024</a:t>
+              <a:t>23.10.2025</a:t>
             </a:fld>
             <a:endParaRPr lang="ru-RU"/>
           </a:p>
@@ -9490,7 +9627,7 @@
           <a:p>
             <a:fld id="{12C63722-5D9F-4E99-9720-9B6A0C7BB1C9}" type="datetimeFigureOut">
               <a:rPr lang="ru-RU" smtClean="0"/>
-              <a:t>14.10.2024</a:t>
+              <a:t>23.10.2025</a:t>
             </a:fld>
             <a:endParaRPr lang="ru-RU"/>
           </a:p>
@@ -9585,7 +9722,7 @@
           <a:p>
             <a:fld id="{12C63722-5D9F-4E99-9720-9B6A0C7BB1C9}" type="datetimeFigureOut">
               <a:rPr lang="ru-RU" smtClean="0"/>
-              <a:t>14.10.2024</a:t>
+              <a:t>23.10.2025</a:t>
             </a:fld>
             <a:endParaRPr lang="ru-RU"/>
           </a:p>
@@ -9862,7 +9999,7 @@
           <a:p>
             <a:fld id="{12C63722-5D9F-4E99-9720-9B6A0C7BB1C9}" type="datetimeFigureOut">
               <a:rPr lang="ru-RU" smtClean="0"/>
-              <a:t>14.10.2024</a:t>
+              <a:t>23.10.2025</a:t>
             </a:fld>
             <a:endParaRPr lang="ru-RU"/>
           </a:p>
@@ -10115,7 +10252,7 @@
           <a:p>
             <a:fld id="{12C63722-5D9F-4E99-9720-9B6A0C7BB1C9}" type="datetimeFigureOut">
               <a:rPr lang="ru-RU" smtClean="0"/>
-              <a:t>14.10.2024</a:t>
+              <a:t>23.10.2025</a:t>
             </a:fld>
             <a:endParaRPr lang="ru-RU"/>
           </a:p>
@@ -10328,7 +10465,7 @@
           <a:p>
             <a:fld id="{12C63722-5D9F-4E99-9720-9B6A0C7BB1C9}" type="datetimeFigureOut">
               <a:rPr lang="ru-RU" smtClean="0"/>
-              <a:t>14.10.2024</a:t>
+              <a:t>23.10.2025</a:t>
             </a:fld>
             <a:endParaRPr lang="ru-RU"/>
           </a:p>
@@ -10868,7 +11005,7 @@
           <a:p>
             <a:fld id="{8C218C88-2408-4CFC-B25C-07450930B282}" type="datetimeFigureOut">
               <a:rPr lang="ru-RU" smtClean="0"/>
-              <a:t>14.10.2024</a:t>
+              <a:t>23.10.2025</a:t>
             </a:fld>
             <a:endParaRPr lang="ru-RU"/>
           </a:p>
@@ -20106,14 +20243,14 @@
           <p:nvPr>
             <p:extLst>
               <p:ext uri="{D42A27DB-BD31-4B8C-83A1-F6EECF244321}">
-                <p14:modId xmlns:p14="http://schemas.microsoft.com/office/powerpoint/2010/main" val="1183210263"/>
+                <p14:modId xmlns:p14="http://schemas.microsoft.com/office/powerpoint/2010/main" val="3205141675"/>
               </p:ext>
             </p:extLst>
           </p:nvPr>
         </p:nvGraphicFramePr>
         <p:xfrm>
           <a:off x="0" y="365760"/>
-          <a:ext cx="12192000" cy="4754880"/>
+          <a:ext cx="12192000" cy="5029200"/>
         </p:xfrm>
         <a:graphic>
           <a:graphicData uri="http://schemas.openxmlformats.org/drawingml/2006/table">
@@ -20492,6 +20629,13 @@
                         <a:rPr lang="en-US" baseline="0" dirty="0"/>
                         <a:t>.</a:t>
                       </a:r>
+                    </a:p>
+                    <a:p>
+                      <a:pPr marL="0" indent="0">
+                        <a:buFont typeface="Arial" panose="020B0604020202020204" pitchFamily="34" charset="0"/>
+                        <a:buNone/>
+                      </a:pPr>
+                      <a:endParaRPr lang="en-US" baseline="0" dirty="0"/>
                     </a:p>
                   </a:txBody>
                   <a:tcPr/>
@@ -20632,6 +20776,694 @@
         <p:cNvPr id="1" name="">
           <a:extLst>
             <a:ext uri="{FF2B5EF4-FFF2-40B4-BE49-F238E27FC236}">
+              <a16:creationId xmlns:a16="http://schemas.microsoft.com/office/drawing/2014/main" id="{0CC491D0-7C51-FFBC-08CF-7F8F403A3AF8}"/>
+            </a:ext>
+          </a:extLst>
+        </p:cNvPr>
+        <p:cNvGrpSpPr/>
+        <p:nvPr/>
+      </p:nvGrpSpPr>
+      <p:grpSpPr>
+        <a:xfrm>
+          <a:off x="0" y="0"/>
+          <a:ext cx="0" cy="0"/>
+          <a:chOff x="0" y="0"/>
+          <a:chExt cx="0" cy="0"/>
+        </a:xfrm>
+      </p:grpSpPr>
+      <p:graphicFrame>
+        <p:nvGraphicFramePr>
+          <p:cNvPr id="5" name="Table 4">
+            <a:extLst>
+              <a:ext uri="{FF2B5EF4-FFF2-40B4-BE49-F238E27FC236}">
+                <a16:creationId xmlns:a16="http://schemas.microsoft.com/office/drawing/2014/main" id="{93638D5E-1566-4BEB-3526-720F1A204B62}"/>
+              </a:ext>
+            </a:extLst>
+          </p:cNvPr>
+          <p:cNvGraphicFramePr>
+            <a:graphicFrameLocks noGrp="1"/>
+          </p:cNvGraphicFramePr>
+          <p:nvPr/>
+        </p:nvGraphicFramePr>
+        <p:xfrm>
+          <a:off x="0" y="1"/>
+          <a:ext cx="12192000" cy="365760"/>
+        </p:xfrm>
+        <a:graphic>
+          <a:graphicData uri="http://schemas.openxmlformats.org/drawingml/2006/table">
+            <a:tbl>
+              <a:tblPr firstRow="1" bandRow="1">
+                <a:tableStyleId>{5C22544A-7EE6-4342-B048-85BDC9FD1C3A}</a:tableStyleId>
+              </a:tblPr>
+              <a:tblGrid>
+                <a:gridCol w="12192000">
+                  <a:extLst>
+                    <a:ext uri="{9D8B030D-6E8A-4147-A177-3AD203B41FA5}">
+                      <a16:colId xmlns:a16="http://schemas.microsoft.com/office/drawing/2014/main" val="20000"/>
+                    </a:ext>
+                  </a:extLst>
+                </a:gridCol>
+              </a:tblGrid>
+              <a:tr h="321276">
+                <a:tc>
+                  <a:txBody>
+                    <a:bodyPr/>
+                    <a:lstStyle/>
+                    <a:p>
+                      <a:r>
+                        <a:rPr lang="en-US" sz="1800" dirty="0"/>
+                        <a:t>The basics of file systems</a:t>
+                      </a:r>
+                      <a:endParaRPr lang="ru-RU" dirty="0"/>
+                    </a:p>
+                  </a:txBody>
+                  <a:tcPr/>
+                </a:tc>
+                <a:extLst>
+                  <a:ext uri="{0D108BD9-81ED-4DB2-BD59-A6C34878D82A}">
+                    <a16:rowId xmlns:a16="http://schemas.microsoft.com/office/drawing/2014/main" val="10000"/>
+                  </a:ext>
+                </a:extLst>
+              </a:tr>
+            </a:tbl>
+          </a:graphicData>
+        </a:graphic>
+      </p:graphicFrame>
+      <p:graphicFrame>
+        <p:nvGraphicFramePr>
+          <p:cNvPr id="6" name="Table 5">
+            <a:extLst>
+              <a:ext uri="{FF2B5EF4-FFF2-40B4-BE49-F238E27FC236}">
+                <a16:creationId xmlns:a16="http://schemas.microsoft.com/office/drawing/2014/main" id="{82920E81-5D03-CD3B-833C-F75E0DE7999D}"/>
+              </a:ext>
+            </a:extLst>
+          </p:cNvPr>
+          <p:cNvGraphicFramePr>
+            <a:graphicFrameLocks noGrp="1"/>
+          </p:cNvGraphicFramePr>
+          <p:nvPr/>
+        </p:nvGraphicFramePr>
+        <p:xfrm>
+          <a:off x="0" y="6532604"/>
+          <a:ext cx="12192000" cy="365760"/>
+        </p:xfrm>
+        <a:graphic>
+          <a:graphicData uri="http://schemas.openxmlformats.org/drawingml/2006/table">
+            <a:tbl>
+              <a:tblPr firstRow="1" bandRow="1">
+                <a:tableStyleId>{5C22544A-7EE6-4342-B048-85BDC9FD1C3A}</a:tableStyleId>
+              </a:tblPr>
+              <a:tblGrid>
+                <a:gridCol w="12192000">
+                  <a:extLst>
+                    <a:ext uri="{9D8B030D-6E8A-4147-A177-3AD203B41FA5}">
+                      <a16:colId xmlns:a16="http://schemas.microsoft.com/office/drawing/2014/main" val="20000"/>
+                    </a:ext>
+                  </a:extLst>
+                </a:gridCol>
+              </a:tblGrid>
+              <a:tr h="308094">
+                <a:tc>
+                  <a:txBody>
+                    <a:bodyPr/>
+                    <a:lstStyle/>
+                    <a:p>
+                      <a:endParaRPr lang="ru-RU" dirty="0"/>
+                    </a:p>
+                  </a:txBody>
+                  <a:tcPr/>
+                </a:tc>
+                <a:extLst>
+                  <a:ext uri="{0D108BD9-81ED-4DB2-BD59-A6C34878D82A}">
+                    <a16:rowId xmlns:a16="http://schemas.microsoft.com/office/drawing/2014/main" val="10000"/>
+                  </a:ext>
+                </a:extLst>
+              </a:tr>
+            </a:tbl>
+          </a:graphicData>
+        </a:graphic>
+      </p:graphicFrame>
+      <p:graphicFrame>
+        <p:nvGraphicFramePr>
+          <p:cNvPr id="2" name="Table 1">
+            <a:extLst>
+              <a:ext uri="{FF2B5EF4-FFF2-40B4-BE49-F238E27FC236}">
+                <a16:creationId xmlns:a16="http://schemas.microsoft.com/office/drawing/2014/main" id="{88D24D21-CE86-E9E5-DEDB-A485C296338B}"/>
+              </a:ext>
+            </a:extLst>
+          </p:cNvPr>
+          <p:cNvGraphicFramePr>
+            <a:graphicFrameLocks noGrp="1"/>
+          </p:cNvGraphicFramePr>
+          <p:nvPr>
+            <p:extLst>
+              <p:ext uri="{D42A27DB-BD31-4B8C-83A1-F6EECF244321}">
+                <p14:modId xmlns:p14="http://schemas.microsoft.com/office/powerpoint/2010/main" val="936725087"/>
+              </p:ext>
+            </p:extLst>
+          </p:nvPr>
+        </p:nvGraphicFramePr>
+        <p:xfrm>
+          <a:off x="0" y="365760"/>
+          <a:ext cx="12192000" cy="5029200"/>
+        </p:xfrm>
+        <a:graphic>
+          <a:graphicData uri="http://schemas.openxmlformats.org/drawingml/2006/table">
+            <a:tbl>
+              <a:tblPr firstRow="1" bandRow="1">
+                <a:tableStyleId>{3B4B98B0-60AC-42C2-AFA5-B58CD77FA1E5}</a:tableStyleId>
+              </a:tblPr>
+              <a:tblGrid>
+                <a:gridCol w="12192000">
+                  <a:extLst>
+                    <a:ext uri="{9D8B030D-6E8A-4147-A177-3AD203B41FA5}">
+                      <a16:colId xmlns:a16="http://schemas.microsoft.com/office/drawing/2014/main" val="20000"/>
+                    </a:ext>
+                  </a:extLst>
+                </a:gridCol>
+              </a:tblGrid>
+              <a:tr h="216655">
+                <a:tc>
+                  <a:txBody>
+                    <a:bodyPr/>
+                    <a:lstStyle/>
+                    <a:p>
+                      <a:r>
+                        <a:rPr lang="en-US" dirty="0"/>
+                        <a:t>Page cache and </a:t>
+                      </a:r>
+                      <a:r>
+                        <a:rPr lang="en-US" baseline="0" dirty="0"/>
+                        <a:t>writeback</a:t>
+                      </a:r>
+                      <a:endParaRPr lang="ru-RU" dirty="0"/>
+                    </a:p>
+                  </a:txBody>
+                  <a:tcPr/>
+                </a:tc>
+                <a:extLst>
+                  <a:ext uri="{0D108BD9-81ED-4DB2-BD59-A6C34878D82A}">
+                    <a16:rowId xmlns:a16="http://schemas.microsoft.com/office/drawing/2014/main" val="10000"/>
+                  </a:ext>
+                </a:extLst>
+              </a:tr>
+              <a:tr h="433310">
+                <a:tc>
+                  <a:txBody>
+                    <a:bodyPr/>
+                    <a:lstStyle/>
+                    <a:p>
+                      <a:pPr marL="285750" indent="-285750">
+                        <a:buFont typeface="Arial" panose="020B0604020202020204" pitchFamily="34" charset="0"/>
+                        <a:buChar char="•"/>
+                      </a:pPr>
+                      <a:r>
+                        <a:rPr lang="en-US" baseline="0" dirty="0"/>
+                        <a:t>System calls like </a:t>
+                      </a:r>
+                      <a:r>
+                        <a:rPr lang="en-US" baseline="0" dirty="0">
+                          <a:latin typeface="Consolas" panose="020B0609020204030204" pitchFamily="49" charset="0"/>
+                          <a:cs typeface="Consolas" panose="020B0609020204030204" pitchFamily="49" charset="0"/>
+                        </a:rPr>
+                        <a:t>read()</a:t>
+                      </a:r>
+                      <a:r>
+                        <a:rPr lang="en-US" baseline="0" dirty="0"/>
+                        <a:t> and </a:t>
+                      </a:r>
+                      <a:r>
+                        <a:rPr lang="en-US" baseline="0" dirty="0">
+                          <a:latin typeface="Consolas" panose="020B0609020204030204" pitchFamily="49" charset="0"/>
+                          <a:cs typeface="Consolas" panose="020B0609020204030204" pitchFamily="49" charset="0"/>
+                        </a:rPr>
+                        <a:t>write()</a:t>
+                      </a:r>
+                      <a:r>
+                        <a:rPr lang="en-US" baseline="0" dirty="0"/>
+                        <a:t> copy data between application buffers and the page cache in the kernel. The page cache works like a memory-mapped file. File pages are faulted into the page cache when accessed.</a:t>
+                      </a:r>
+                    </a:p>
+                    <a:p>
+                      <a:pPr marL="285750" indent="-285750">
+                        <a:buFont typeface="Arial" panose="020B0604020202020204" pitchFamily="34" charset="0"/>
+                        <a:buChar char="•"/>
+                      </a:pPr>
+                      <a:r>
+                        <a:rPr lang="en-US" baseline="0" dirty="0"/>
+                        <a:t>Unlike CPU instruction that load and store values, system calls have a return value and can signal IO errors.</a:t>
+                      </a:r>
+                      <a:endParaRPr lang="ru-RU" baseline="0" dirty="0"/>
+                    </a:p>
+                    <a:p>
+                      <a:pPr marL="285750" indent="-285750">
+                        <a:buFont typeface="Arial" panose="020B0604020202020204" pitchFamily="34" charset="0"/>
+                        <a:buChar char="•"/>
+                      </a:pPr>
+                      <a:r>
+                        <a:rPr lang="en-US" baseline="0" dirty="0"/>
+                        <a:t>By calling</a:t>
+                      </a:r>
+                      <a:r>
+                        <a:rPr lang="ru-RU" baseline="0" dirty="0"/>
+                        <a:t> </a:t>
+                      </a:r>
+                      <a:r>
+                        <a:rPr lang="en-US" baseline="0" dirty="0" err="1">
+                          <a:latin typeface="Consolas" panose="020B0609020204030204" pitchFamily="49" charset="0"/>
+                          <a:cs typeface="Consolas" panose="020B0609020204030204" pitchFamily="49" charset="0"/>
+                        </a:rPr>
+                        <a:t>fsync</a:t>
+                      </a:r>
+                      <a:r>
+                        <a:rPr lang="en-US" baseline="0" dirty="0">
+                          <a:latin typeface="Consolas" panose="020B0609020204030204" pitchFamily="49" charset="0"/>
+                          <a:cs typeface="Consolas" panose="020B0609020204030204" pitchFamily="49" charset="0"/>
+                        </a:rPr>
+                        <a:t>()</a:t>
+                      </a:r>
+                      <a:r>
+                        <a:rPr lang="en-US" baseline="0" dirty="0"/>
+                        <a:t>, an application requests the page cache to write all dirty (modified) pages to the disk.</a:t>
+                      </a:r>
+                    </a:p>
+                  </a:txBody>
+                  <a:tcPr/>
+                </a:tc>
+                <a:extLst>
+                  <a:ext uri="{0D108BD9-81ED-4DB2-BD59-A6C34878D82A}">
+                    <a16:rowId xmlns:a16="http://schemas.microsoft.com/office/drawing/2014/main" val="10001"/>
+                  </a:ext>
+                </a:extLst>
+              </a:tr>
+              <a:tr h="433310">
+                <a:tc>
+                  <a:txBody>
+                    <a:bodyPr/>
+                    <a:lstStyle/>
+                    <a:p>
+                      <a:pPr marL="0" indent="0">
+                        <a:buFont typeface="Arial" panose="020B0604020202020204" pitchFamily="34" charset="0"/>
+                        <a:buNone/>
+                      </a:pPr>
+                      <a:r>
+                        <a:rPr lang="en-US" baseline="0" dirty="0"/>
+                        <a:t>When can an application detect a write error</a:t>
+                      </a:r>
+                      <a:r>
+                        <a:rPr lang="ru-RU" baseline="0" dirty="0"/>
+                        <a:t>?</a:t>
+                      </a:r>
+                      <a:endParaRPr lang="en-US" baseline="0" dirty="0"/>
+                    </a:p>
+                    <a:p>
+                      <a:pPr marL="285750" indent="-285750">
+                        <a:buFont typeface="Arial" panose="020B0604020202020204" pitchFamily="34" charset="0"/>
+                        <a:buChar char="•"/>
+                      </a:pPr>
+                      <a:r>
+                        <a:rPr lang="en-US" baseline="0" dirty="0"/>
+                        <a:t>When calling</a:t>
+                      </a:r>
+                      <a:r>
+                        <a:rPr lang="ru-RU" baseline="0" dirty="0"/>
+                        <a:t> </a:t>
+                      </a:r>
+                      <a:r>
+                        <a:rPr lang="en-US" baseline="0" dirty="0" err="1">
+                          <a:latin typeface="Consolas" panose="020B0609020204030204" pitchFamily="49" charset="0"/>
+                          <a:cs typeface="Consolas" panose="020B0609020204030204" pitchFamily="49" charset="0"/>
+                        </a:rPr>
+                        <a:t>fsync</a:t>
+                      </a:r>
+                      <a:r>
+                        <a:rPr lang="en-US" baseline="0" dirty="0">
+                          <a:latin typeface="Consolas" panose="020B0609020204030204" pitchFamily="49" charset="0"/>
+                          <a:cs typeface="Consolas" panose="020B0609020204030204" pitchFamily="49" charset="0"/>
+                        </a:rPr>
+                        <a:t>()</a:t>
+                      </a:r>
+                      <a:r>
+                        <a:rPr lang="en-US" baseline="0" dirty="0"/>
+                        <a:t>,</a:t>
+                      </a:r>
+                    </a:p>
+                    <a:p>
+                      <a:pPr marL="285750" indent="-285750">
+                        <a:buFont typeface="Arial" panose="020B0604020202020204" pitchFamily="34" charset="0"/>
+                        <a:buChar char="•"/>
+                      </a:pPr>
+                      <a:r>
+                        <a:rPr lang="en-US" baseline="0" dirty="0"/>
+                        <a:t>When calling</a:t>
+                      </a:r>
+                      <a:r>
+                        <a:rPr lang="ru-RU" baseline="0" dirty="0"/>
+                        <a:t> </a:t>
+                      </a:r>
+                      <a:r>
+                        <a:rPr lang="en-US" baseline="0" dirty="0">
+                          <a:latin typeface="Consolas" panose="020B0609020204030204" pitchFamily="49" charset="0"/>
+                          <a:cs typeface="Consolas" panose="020B0609020204030204" pitchFamily="49" charset="0"/>
+                        </a:rPr>
+                        <a:t>write()</a:t>
+                      </a:r>
+                      <a:r>
+                        <a:rPr lang="ru-RU" baseline="0" dirty="0"/>
+                        <a:t>, </a:t>
+                      </a:r>
+                      <a:r>
+                        <a:rPr lang="en-US" baseline="0" dirty="0"/>
+                        <a:t>if the system is low on RAM and</a:t>
+                      </a:r>
+                      <a:r>
+                        <a:rPr lang="ru-RU" baseline="0" dirty="0"/>
+                        <a:t> </a:t>
+                      </a:r>
+                      <a:r>
+                        <a:rPr lang="en-US" baseline="0" dirty="0">
+                          <a:latin typeface="Consolas" panose="020B0609020204030204" pitchFamily="49" charset="0"/>
+                          <a:cs typeface="Consolas" panose="020B0609020204030204" pitchFamily="49" charset="0"/>
+                        </a:rPr>
+                        <a:t>write()</a:t>
+                      </a:r>
+                      <a:r>
+                        <a:rPr lang="en-US" baseline="0" dirty="0"/>
+                        <a:t> triggers</a:t>
+                      </a:r>
+                      <a:r>
+                        <a:rPr lang="ru-RU" baseline="0" dirty="0"/>
+                        <a:t> </a:t>
+                      </a:r>
+                      <a:r>
+                        <a:rPr lang="en-US" baseline="0" dirty="0"/>
+                        <a:t>writeback,</a:t>
+                      </a:r>
+                    </a:p>
+                    <a:p>
+                      <a:pPr marL="285750" indent="-285750">
+                        <a:buFont typeface="Arial" panose="020B0604020202020204" pitchFamily="34" charset="0"/>
+                        <a:buChar char="•"/>
+                      </a:pPr>
+                      <a:r>
+                        <a:rPr lang="en-US" baseline="0" dirty="0"/>
+                        <a:t>(Possibly) when calling*</a:t>
+                      </a:r>
+                      <a:r>
+                        <a:rPr lang="ru-RU" baseline="0" dirty="0"/>
+                        <a:t> </a:t>
+                      </a:r>
+                      <a:r>
+                        <a:rPr lang="en-US" baseline="0" dirty="0">
+                          <a:latin typeface="Consolas" panose="020B0609020204030204" pitchFamily="49" charset="0"/>
+                          <a:cs typeface="Consolas" panose="020B0609020204030204" pitchFamily="49" charset="0"/>
+                        </a:rPr>
+                        <a:t>close()</a:t>
+                      </a:r>
+                      <a:r>
+                        <a:rPr lang="en-US" baseline="0" dirty="0"/>
+                        <a:t>.</a:t>
+                      </a:r>
+                    </a:p>
+                  </a:txBody>
+                  <a:tcPr/>
+                </a:tc>
+                <a:extLst>
+                  <a:ext uri="{0D108BD9-81ED-4DB2-BD59-A6C34878D82A}">
+                    <a16:rowId xmlns:a16="http://schemas.microsoft.com/office/drawing/2014/main" val="2001293846"/>
+                  </a:ext>
+                </a:extLst>
+              </a:tr>
+              <a:tr h="433310">
+                <a:tc>
+                  <a:txBody>
+                    <a:bodyPr/>
+                    <a:lstStyle/>
+                    <a:p>
+                      <a:pPr marL="0" indent="0">
+                        <a:buFont typeface="Arial" panose="020B0604020202020204" pitchFamily="34" charset="0"/>
+                        <a:buNone/>
+                      </a:pPr>
+                      <a:r>
+                        <a:rPr lang="en-US" baseline="0" dirty="0"/>
+                        <a:t>Why do OSes not do IO immediately in</a:t>
+                      </a:r>
+                      <a:r>
+                        <a:rPr lang="ru-RU" baseline="0" dirty="0"/>
+                        <a:t> </a:t>
+                      </a:r>
+                      <a:r>
+                        <a:rPr lang="en-US" baseline="0" dirty="0">
+                          <a:latin typeface="Consolas" panose="020B0609020204030204" pitchFamily="49" charset="0"/>
+                          <a:cs typeface="Consolas" panose="020B0609020204030204" pitchFamily="49" charset="0"/>
+                        </a:rPr>
+                        <a:t>write()</a:t>
+                      </a:r>
+                      <a:r>
+                        <a:rPr lang="en-US" baseline="0" dirty="0"/>
+                        <a:t> itself?</a:t>
+                      </a:r>
+                    </a:p>
+                    <a:p>
+                      <a:pPr marL="285750" indent="-285750">
+                        <a:buFont typeface="Arial" panose="020B0604020202020204" pitchFamily="34" charset="0"/>
+                        <a:buChar char="•"/>
+                      </a:pPr>
+                      <a:r>
+                        <a:rPr lang="en-US" baseline="0" dirty="0"/>
+                        <a:t>Multiple writes or re-writes to a file may be coalesced into a single write to a disk,</a:t>
+                      </a:r>
+                    </a:p>
+                    <a:p>
+                      <a:pPr marL="285750" indent="-285750">
+                        <a:buFont typeface="Arial" panose="020B0604020202020204" pitchFamily="34" charset="0"/>
+                        <a:buChar char="•"/>
+                      </a:pPr>
+                      <a:r>
+                        <a:rPr lang="en-US" baseline="0" dirty="0"/>
+                        <a:t>It becomes possible to issue fewer IO requests to a disk, and make them longer,</a:t>
+                      </a:r>
+                      <a:endParaRPr lang="ru-RU" baseline="0" dirty="0"/>
+                    </a:p>
+                    <a:p>
+                      <a:pPr marL="285750" indent="-285750">
+                        <a:buFont typeface="Arial" panose="020B0604020202020204" pitchFamily="34" charset="0"/>
+                        <a:buChar char="•"/>
+                      </a:pPr>
+                      <a:r>
+                        <a:rPr lang="en-US" baseline="0" dirty="0"/>
+                        <a:t>File systems can do “delayed allocation” to decrease the fragmentation of files.</a:t>
+                      </a:r>
+                    </a:p>
+                    <a:p>
+                      <a:pPr marL="285750" indent="-285750">
+                        <a:buFont typeface="Arial" panose="020B0604020202020204" pitchFamily="34" charset="0"/>
+                        <a:buChar char="•"/>
+                      </a:pPr>
+                      <a:endParaRPr lang="en-US" baseline="0" dirty="0"/>
+                    </a:p>
+                    <a:p>
+                      <a:pPr marL="0" indent="0">
+                        <a:buFont typeface="Arial" panose="020B0604020202020204" pitchFamily="34" charset="0"/>
+                        <a:buNone/>
+                      </a:pPr>
+                      <a:r>
+                        <a:rPr lang="en-US" baseline="0" dirty="0"/>
+                        <a:t>Delaying the IO also has downsides. For example, it may introduce thrashing and make it impossible to control the time it takes to call </a:t>
+                      </a:r>
+                      <a:r>
+                        <a:rPr lang="en-US" baseline="0" dirty="0">
+                          <a:latin typeface="Consolas" panose="020B0609020204030204" pitchFamily="49" charset="0"/>
+                          <a:cs typeface="Consolas" panose="020B0609020204030204" pitchFamily="49" charset="0"/>
+                        </a:rPr>
+                        <a:t>write()</a:t>
+                      </a:r>
+                      <a:r>
+                        <a:rPr lang="en-US" baseline="0" dirty="0"/>
+                        <a:t> and</a:t>
+                      </a:r>
+                      <a:r>
+                        <a:rPr lang="ru-RU" baseline="0" dirty="0"/>
+                        <a:t> </a:t>
+                      </a:r>
+                      <a:r>
+                        <a:rPr lang="en-US" baseline="0" dirty="0" err="1">
+                          <a:latin typeface="Consolas" panose="020B0609020204030204" pitchFamily="49" charset="0"/>
+                          <a:cs typeface="Consolas" panose="020B0609020204030204" pitchFamily="49" charset="0"/>
+                        </a:rPr>
+                        <a:t>fsync</a:t>
+                      </a:r>
+                      <a:r>
+                        <a:rPr lang="en-US" baseline="0" dirty="0">
+                          <a:latin typeface="Consolas" panose="020B0609020204030204" pitchFamily="49" charset="0"/>
+                          <a:cs typeface="Consolas" panose="020B0609020204030204" pitchFamily="49" charset="0"/>
+                        </a:rPr>
+                        <a:t>()</a:t>
+                      </a:r>
+                      <a:r>
+                        <a:rPr lang="en-US" baseline="0" dirty="0"/>
+                        <a:t>. As of Linux 6.15, the page cache has 1 thread per a file system to do the writeback.</a:t>
+                      </a:r>
+                    </a:p>
+                    <a:p>
+                      <a:pPr marL="0" indent="0">
+                        <a:buFont typeface="Arial" panose="020B0604020202020204" pitchFamily="34" charset="0"/>
+                        <a:buNone/>
+                      </a:pPr>
+                      <a:r>
+                        <a:rPr lang="en-US" baseline="0" dirty="0"/>
+                        <a:t>See also: </a:t>
+                      </a:r>
+                      <a:r>
+                        <a:rPr lang="en-US" baseline="0" dirty="0">
+                          <a:hlinkClick r:id="rId3"/>
+                        </a:rPr>
+                        <a:t>https://lwn.net/Articles/976856/</a:t>
+                      </a:r>
+                      <a:r>
+                        <a:rPr lang="en-US" baseline="0" dirty="0"/>
+                        <a:t>.</a:t>
+                      </a:r>
+                    </a:p>
+                  </a:txBody>
+                  <a:tcPr/>
+                </a:tc>
+                <a:extLst>
+                  <a:ext uri="{0D108BD9-81ED-4DB2-BD59-A6C34878D82A}">
+                    <a16:rowId xmlns:a16="http://schemas.microsoft.com/office/drawing/2014/main" val="2418925043"/>
+                  </a:ext>
+                </a:extLst>
+              </a:tr>
+            </a:tbl>
+          </a:graphicData>
+        </a:graphic>
+      </p:graphicFrame>
+      <p:sp>
+        <p:nvSpPr>
+          <p:cNvPr id="3" name="TextBox 2">
+            <a:extLst>
+              <a:ext uri="{FF2B5EF4-FFF2-40B4-BE49-F238E27FC236}">
+                <a16:creationId xmlns:a16="http://schemas.microsoft.com/office/drawing/2014/main" id="{731DC416-A91B-F2D4-3D81-2D1CD1FF0419}"/>
+              </a:ext>
+            </a:extLst>
+          </p:cNvPr>
+          <p:cNvSpPr txBox="1"/>
+          <p:nvPr/>
+        </p:nvSpPr>
+        <p:spPr>
+          <a:xfrm>
+            <a:off x="0" y="6092846"/>
+            <a:ext cx="12192000" cy="369332"/>
+          </a:xfrm>
+          <a:prstGeom prst="rect">
+            <a:avLst/>
+          </a:prstGeom>
+          <a:noFill/>
+        </p:spPr>
+        <p:txBody>
+          <a:bodyPr wrap="square" rtlCol="0">
+            <a:spAutoFit/>
+          </a:bodyPr>
+          <a:lstStyle/>
+          <a:p>
+            <a:r>
+              <a:rPr lang="en-CY" i="1" dirty="0">
+                <a:solidFill>
+                  <a:schemeClr val="bg1">
+                    <a:lumMod val="75000"/>
+                  </a:schemeClr>
+                </a:solidFill>
+              </a:rPr>
+              <a:t>* </a:t>
+            </a:r>
+            <a:r>
+              <a:rPr lang="en-GB" i="1" dirty="0">
+                <a:solidFill>
+                  <a:schemeClr val="bg1">
+                    <a:lumMod val="75000"/>
+                  </a:schemeClr>
+                </a:solidFill>
+              </a:rPr>
+              <a:t>T</a:t>
+            </a:r>
+            <a:r>
+              <a:rPr lang="en-CY" i="1" dirty="0">
+                <a:solidFill>
+                  <a:schemeClr val="bg1">
+                    <a:lumMod val="75000"/>
+                  </a:schemeClr>
+                </a:solidFill>
+              </a:rPr>
+              <a:t>his is a very unfortunate API design. The only sure way is to call </a:t>
+            </a:r>
+            <a:r>
+              <a:rPr lang="en-CY" i="1" dirty="0">
+                <a:solidFill>
+                  <a:schemeClr val="bg1">
+                    <a:lumMod val="75000"/>
+                  </a:schemeClr>
+                </a:solidFill>
+                <a:latin typeface="Consolas" panose="020B0609020204030204" pitchFamily="49" charset="0"/>
+                <a:cs typeface="Consolas" panose="020B0609020204030204" pitchFamily="49" charset="0"/>
+              </a:rPr>
+              <a:t>fsync()</a:t>
+            </a:r>
+            <a:r>
+              <a:rPr lang="en-CY" i="1" dirty="0">
+                <a:solidFill>
+                  <a:schemeClr val="bg1">
+                    <a:lumMod val="75000"/>
+                  </a:schemeClr>
+                </a:solidFill>
+              </a:rPr>
+              <a:t> before </a:t>
+            </a:r>
+            <a:r>
+              <a:rPr lang="en-CY" i="1" dirty="0">
+                <a:solidFill>
+                  <a:schemeClr val="bg1">
+                    <a:lumMod val="75000"/>
+                  </a:schemeClr>
+                </a:solidFill>
+                <a:latin typeface="Consolas" panose="020B0609020204030204" pitchFamily="49" charset="0"/>
+                <a:cs typeface="Consolas" panose="020B0609020204030204" pitchFamily="49" charset="0"/>
+              </a:rPr>
+              <a:t>close()</a:t>
+            </a:r>
+            <a:r>
+              <a:rPr lang="en-CY" i="1" dirty="0">
+                <a:solidFill>
+                  <a:schemeClr val="bg1">
+                    <a:lumMod val="75000"/>
+                  </a:schemeClr>
+                </a:solidFill>
+              </a:rPr>
+              <a:t>.</a:t>
+            </a:r>
+          </a:p>
+        </p:txBody>
+      </p:sp>
+    </p:spTree>
+    <p:extLst>
+      <p:ext uri="{BB962C8B-B14F-4D97-AF65-F5344CB8AC3E}">
+        <p14:creationId xmlns:p14="http://schemas.microsoft.com/office/powerpoint/2010/main" val="168242623"/>
+      </p:ext>
+    </p:extLst>
+  </p:cSld>
+  <p:clrMapOvr>
+    <a:masterClrMapping/>
+  </p:clrMapOvr>
+</p:sld>
+</file>
+
+<file path=ppt/slides/slide26.xml><?xml version="1.0" encoding="utf-8"?>
+<p:sld xmlns:a="http://schemas.openxmlformats.org/drawingml/2006/main" xmlns:r="http://schemas.openxmlformats.org/officeDocument/2006/relationships" xmlns:p="http://schemas.openxmlformats.org/presentationml/2006/main">
+  <p:cSld>
+    <p:spTree>
+      <p:nvGrpSpPr>
+        <p:cNvPr id="1" name="">
+          <a:extLst>
+            <a:ext uri="{FF2B5EF4-FFF2-40B4-BE49-F238E27FC236}">
               <a16:creationId xmlns:a16="http://schemas.microsoft.com/office/drawing/2014/main" id="{3DDA3E7D-8C5E-448A-A97C-E6E7F12A505D}"/>
             </a:ext>
           </a:extLst>
@@ -21060,7 +21892,7 @@
 </p:sld>
 </file>
 
-<file path=ppt/slides/slide26.xml><?xml version="1.0" encoding="utf-8"?>
+<file path=ppt/slides/slide27.xml><?xml version="1.0" encoding="utf-8"?>
 <p:sld xmlns:a="http://schemas.openxmlformats.org/drawingml/2006/main" xmlns:r="http://schemas.openxmlformats.org/officeDocument/2006/relationships" xmlns:p="http://schemas.openxmlformats.org/presentationml/2006/main">
   <p:cSld>
     <p:spTree>
@@ -21509,7 +22341,7 @@
 </p:sld>
 </file>
 
-<file path=ppt/slides/slide27.xml><?xml version="1.0" encoding="utf-8"?>
+<file path=ppt/slides/slide28.xml><?xml version="1.0" encoding="utf-8"?>
 <p:sld xmlns:a="http://schemas.openxmlformats.org/drawingml/2006/main" xmlns:r="http://schemas.openxmlformats.org/officeDocument/2006/relationships" xmlns:p="http://schemas.openxmlformats.org/presentationml/2006/main">
   <p:cSld>
     <p:spTree>
@@ -21730,7 +22562,7 @@
 </p:sld>
 </file>
 
-<file path=ppt/slides/slide28.xml><?xml version="1.0" encoding="utf-8"?>
+<file path=ppt/slides/slide29.xml><?xml version="1.0" encoding="utf-8"?>
 <p:sld xmlns:a="http://schemas.openxmlformats.org/drawingml/2006/main" xmlns:r="http://schemas.openxmlformats.org/officeDocument/2006/relationships" xmlns:p="http://schemas.openxmlformats.org/presentationml/2006/main">
   <p:cSld>
     <p:spTree>
@@ -21868,7 +22700,7 @@
           <p:nvPr>
             <p:extLst>
               <p:ext uri="{D42A27DB-BD31-4B8C-83A1-F6EECF244321}">
-                <p14:modId xmlns:p14="http://schemas.microsoft.com/office/powerpoint/2010/main" val="263691619"/>
+                <p14:modId xmlns:p14="http://schemas.microsoft.com/office/powerpoint/2010/main" val="2753587560"/>
               </p:ext>
             </p:extLst>
           </p:nvPr>
@@ -21994,7 +22826,7 @@
                           <a:latin typeface="Consolas" panose="020B0609020204030204" pitchFamily="49" charset="0"/>
                           <a:cs typeface="Consolas" panose="020B0609020204030204" pitchFamily="49" charset="0"/>
                         </a:rPr>
-                        <a:t> count)</a:t>
+                        <a:t> count);</a:t>
                       </a:r>
                       <a:endParaRPr lang="ru-RU" sz="1600" dirty="0">
                         <a:latin typeface="Consolas" panose="020B0609020204030204" pitchFamily="49" charset="0"/>
@@ -22260,7 +23092,7 @@
                           <a:latin typeface="Consolas" panose="020B0609020204030204" pitchFamily="49" charset="0"/>
                           <a:cs typeface="Consolas" panose="020B0609020204030204" pitchFamily="49" charset="0"/>
                         </a:rPr>
-                        <a:t> count)</a:t>
+                        <a:t> count);</a:t>
                       </a:r>
                       <a:endParaRPr lang="ru-RU" sz="1600" dirty="0">
                         <a:latin typeface="Consolas" panose="020B0609020204030204" pitchFamily="49" charset="0"/>
@@ -22467,794 +23299,6 @@
     <p:extLst>
       <p:ext uri="{BB962C8B-B14F-4D97-AF65-F5344CB8AC3E}">
         <p14:creationId xmlns:p14="http://schemas.microsoft.com/office/powerpoint/2010/main" val="3014771138"/>
-      </p:ext>
-    </p:extLst>
-  </p:cSld>
-  <p:clrMapOvr>
-    <a:masterClrMapping/>
-  </p:clrMapOvr>
-</p:sld>
-</file>
-
-<file path=ppt/slides/slide29.xml><?xml version="1.0" encoding="utf-8"?>
-<p:sld xmlns:a="http://schemas.openxmlformats.org/drawingml/2006/main" xmlns:r="http://schemas.openxmlformats.org/officeDocument/2006/relationships" xmlns:p="http://schemas.openxmlformats.org/presentationml/2006/main">
-  <p:cSld>
-    <p:spTree>
-      <p:nvGrpSpPr>
-        <p:cNvPr id="1" name="">
-          <a:extLst>
-            <a:ext uri="{FF2B5EF4-FFF2-40B4-BE49-F238E27FC236}">
-              <a16:creationId xmlns:a16="http://schemas.microsoft.com/office/drawing/2014/main" id="{E92840F4-412D-A71F-35CD-80E260DAA68B}"/>
-            </a:ext>
-          </a:extLst>
-        </p:cNvPr>
-        <p:cNvGrpSpPr/>
-        <p:nvPr/>
-      </p:nvGrpSpPr>
-      <p:grpSpPr>
-        <a:xfrm>
-          <a:off x="0" y="0"/>
-          <a:ext cx="0" cy="0"/>
-          <a:chOff x="0" y="0"/>
-          <a:chExt cx="0" cy="0"/>
-        </a:xfrm>
-      </p:grpSpPr>
-      <p:graphicFrame>
-        <p:nvGraphicFramePr>
-          <p:cNvPr id="5" name="Table 4">
-            <a:extLst>
-              <a:ext uri="{FF2B5EF4-FFF2-40B4-BE49-F238E27FC236}">
-                <a16:creationId xmlns:a16="http://schemas.microsoft.com/office/drawing/2014/main" id="{64B8E5E4-A187-D693-5AEE-8697A942E73B}"/>
-              </a:ext>
-            </a:extLst>
-          </p:cNvPr>
-          <p:cNvGraphicFramePr>
-            <a:graphicFrameLocks noGrp="1"/>
-          </p:cNvGraphicFramePr>
-          <p:nvPr/>
-        </p:nvGraphicFramePr>
-        <p:xfrm>
-          <a:off x="0" y="1"/>
-          <a:ext cx="12192000" cy="365760"/>
-        </p:xfrm>
-        <a:graphic>
-          <a:graphicData uri="http://schemas.openxmlformats.org/drawingml/2006/table">
-            <a:tbl>
-              <a:tblPr firstRow="1" bandRow="1">
-                <a:tableStyleId>{5C22544A-7EE6-4342-B048-85BDC9FD1C3A}</a:tableStyleId>
-              </a:tblPr>
-              <a:tblGrid>
-                <a:gridCol w="12192000">
-                  <a:extLst>
-                    <a:ext uri="{9D8B030D-6E8A-4147-A177-3AD203B41FA5}">
-                      <a16:colId xmlns:a16="http://schemas.microsoft.com/office/drawing/2014/main" val="20000"/>
-                    </a:ext>
-                  </a:extLst>
-                </a:gridCol>
-              </a:tblGrid>
-              <a:tr h="321276">
-                <a:tc>
-                  <a:txBody>
-                    <a:bodyPr/>
-                    <a:lstStyle/>
-                    <a:p>
-                      <a:r>
-                        <a:rPr lang="en-US" sz="1800" dirty="0"/>
-                        <a:t>The basics of file systems</a:t>
-                      </a:r>
-                      <a:endParaRPr lang="ru-RU" dirty="0"/>
-                    </a:p>
-                  </a:txBody>
-                  <a:tcPr/>
-                </a:tc>
-                <a:extLst>
-                  <a:ext uri="{0D108BD9-81ED-4DB2-BD59-A6C34878D82A}">
-                    <a16:rowId xmlns:a16="http://schemas.microsoft.com/office/drawing/2014/main" val="10000"/>
-                  </a:ext>
-                </a:extLst>
-              </a:tr>
-            </a:tbl>
-          </a:graphicData>
-        </a:graphic>
-      </p:graphicFrame>
-      <p:graphicFrame>
-        <p:nvGraphicFramePr>
-          <p:cNvPr id="6" name="Table 5">
-            <a:extLst>
-              <a:ext uri="{FF2B5EF4-FFF2-40B4-BE49-F238E27FC236}">
-                <a16:creationId xmlns:a16="http://schemas.microsoft.com/office/drawing/2014/main" id="{30527680-A395-0614-80B9-BB101906D9ED}"/>
-              </a:ext>
-            </a:extLst>
-          </p:cNvPr>
-          <p:cNvGraphicFramePr>
-            <a:graphicFrameLocks noGrp="1"/>
-          </p:cNvGraphicFramePr>
-          <p:nvPr/>
-        </p:nvGraphicFramePr>
-        <p:xfrm>
-          <a:off x="0" y="6532604"/>
-          <a:ext cx="12192000" cy="365760"/>
-        </p:xfrm>
-        <a:graphic>
-          <a:graphicData uri="http://schemas.openxmlformats.org/drawingml/2006/table">
-            <a:tbl>
-              <a:tblPr firstRow="1" bandRow="1">
-                <a:tableStyleId>{5C22544A-7EE6-4342-B048-85BDC9FD1C3A}</a:tableStyleId>
-              </a:tblPr>
-              <a:tblGrid>
-                <a:gridCol w="12192000">
-                  <a:extLst>
-                    <a:ext uri="{9D8B030D-6E8A-4147-A177-3AD203B41FA5}">
-                      <a16:colId xmlns:a16="http://schemas.microsoft.com/office/drawing/2014/main" val="20000"/>
-                    </a:ext>
-                  </a:extLst>
-                </a:gridCol>
-              </a:tblGrid>
-              <a:tr h="308094">
-                <a:tc>
-                  <a:txBody>
-                    <a:bodyPr/>
-                    <a:lstStyle/>
-                    <a:p>
-                      <a:endParaRPr lang="ru-RU" dirty="0"/>
-                    </a:p>
-                  </a:txBody>
-                  <a:tcPr/>
-                </a:tc>
-                <a:extLst>
-                  <a:ext uri="{0D108BD9-81ED-4DB2-BD59-A6C34878D82A}">
-                    <a16:rowId xmlns:a16="http://schemas.microsoft.com/office/drawing/2014/main" val="10000"/>
-                  </a:ext>
-                </a:extLst>
-              </a:tr>
-            </a:tbl>
-          </a:graphicData>
-        </a:graphic>
-      </p:graphicFrame>
-      <p:graphicFrame>
-        <p:nvGraphicFramePr>
-          <p:cNvPr id="2" name="Table 1">
-            <a:extLst>
-              <a:ext uri="{FF2B5EF4-FFF2-40B4-BE49-F238E27FC236}">
-                <a16:creationId xmlns:a16="http://schemas.microsoft.com/office/drawing/2014/main" id="{AA4DDA63-0F37-9963-11F7-C8A6F906703C}"/>
-              </a:ext>
-            </a:extLst>
-          </p:cNvPr>
-          <p:cNvGraphicFramePr>
-            <a:graphicFrameLocks noGrp="1"/>
-          </p:cNvGraphicFramePr>
-          <p:nvPr>
-            <p:extLst>
-              <p:ext uri="{D42A27DB-BD31-4B8C-83A1-F6EECF244321}">
-                <p14:modId xmlns:p14="http://schemas.microsoft.com/office/powerpoint/2010/main" val="4066870851"/>
-              </p:ext>
-            </p:extLst>
-          </p:nvPr>
-        </p:nvGraphicFramePr>
-        <p:xfrm>
-          <a:off x="-2" y="365761"/>
-          <a:ext cx="12192002" cy="3733461"/>
-        </p:xfrm>
-        <a:graphic>
-          <a:graphicData uri="http://schemas.openxmlformats.org/drawingml/2006/table">
-            <a:tbl>
-              <a:tblPr firstRow="1" bandRow="1">
-                <a:tableStyleId>{3B4B98B0-60AC-42C2-AFA5-B58CD77FA1E5}</a:tableStyleId>
-              </a:tblPr>
-              <a:tblGrid>
-                <a:gridCol w="6096001">
-                  <a:extLst>
-                    <a:ext uri="{9D8B030D-6E8A-4147-A177-3AD203B41FA5}">
-                      <a16:colId xmlns:a16="http://schemas.microsoft.com/office/drawing/2014/main" val="20000"/>
-                    </a:ext>
-                  </a:extLst>
-                </a:gridCol>
-                <a:gridCol w="6096001">
-                  <a:extLst>
-                    <a:ext uri="{9D8B030D-6E8A-4147-A177-3AD203B41FA5}">
-                      <a16:colId xmlns:a16="http://schemas.microsoft.com/office/drawing/2014/main" val="20001"/>
-                    </a:ext>
-                  </a:extLst>
-                </a:gridCol>
-              </a:tblGrid>
-              <a:tr h="441621">
-                <a:tc>
-                  <a:txBody>
-                    <a:bodyPr/>
-                    <a:lstStyle/>
-                    <a:p>
-                      <a:r>
-                        <a:rPr lang="en-US" dirty="0"/>
-                        <a:t>POSIX API</a:t>
-                      </a:r>
-                      <a:endParaRPr lang="ru-RU" dirty="0"/>
-                    </a:p>
-                  </a:txBody>
-                  <a:tcPr/>
-                </a:tc>
-                <a:tc>
-                  <a:txBody>
-                    <a:bodyPr/>
-                    <a:lstStyle/>
-                    <a:p>
-                      <a:r>
-                        <a:rPr lang="en-US" dirty="0"/>
-                        <a:t>Windows API</a:t>
-                      </a:r>
-                      <a:endParaRPr lang="ru-RU" dirty="0"/>
-                    </a:p>
-                  </a:txBody>
-                  <a:tcPr/>
-                </a:tc>
-                <a:extLst>
-                  <a:ext uri="{0D108BD9-81ED-4DB2-BD59-A6C34878D82A}">
-                    <a16:rowId xmlns:a16="http://schemas.microsoft.com/office/drawing/2014/main" val="10000"/>
-                  </a:ext>
-                </a:extLst>
-              </a:tr>
-              <a:tr h="441621">
-                <a:tc>
-                  <a:txBody>
-                    <a:bodyPr/>
-                    <a:lstStyle/>
-                    <a:p>
-                      <a:r>
-                        <a:rPr lang="en-US" sz="1600" dirty="0" err="1">
-                          <a:latin typeface="Consolas" panose="020B0609020204030204" pitchFamily="49" charset="0"/>
-                          <a:cs typeface="Consolas" panose="020B0609020204030204" pitchFamily="49" charset="0"/>
-                        </a:rPr>
-                        <a:t>size_t</a:t>
-                      </a:r>
-                      <a:r>
-                        <a:rPr lang="en-US" sz="1600" dirty="0">
-                          <a:latin typeface="Consolas" panose="020B0609020204030204" pitchFamily="49" charset="0"/>
-                          <a:cs typeface="Consolas" panose="020B0609020204030204" pitchFamily="49" charset="0"/>
-                        </a:rPr>
-                        <a:t> read(int </a:t>
-                      </a:r>
-                      <a:r>
-                        <a:rPr lang="en-US" sz="1600" dirty="0" err="1">
-                          <a:latin typeface="Consolas" panose="020B0609020204030204" pitchFamily="49" charset="0"/>
-                          <a:cs typeface="Consolas" panose="020B0609020204030204" pitchFamily="49" charset="0"/>
-                        </a:rPr>
-                        <a:t>fd</a:t>
-                      </a:r>
-                      <a:r>
-                        <a:rPr lang="en-US" sz="1600" dirty="0">
-                          <a:latin typeface="Consolas" panose="020B0609020204030204" pitchFamily="49" charset="0"/>
-                          <a:cs typeface="Consolas" panose="020B0609020204030204" pitchFamily="49" charset="0"/>
-                        </a:rPr>
-                        <a:t>, void *</a:t>
-                      </a:r>
-                      <a:r>
-                        <a:rPr lang="en-US" sz="1600" dirty="0" err="1">
-                          <a:latin typeface="Consolas" panose="020B0609020204030204" pitchFamily="49" charset="0"/>
-                          <a:cs typeface="Consolas" panose="020B0609020204030204" pitchFamily="49" charset="0"/>
-                        </a:rPr>
-                        <a:t>buf</a:t>
-                      </a:r>
-                      <a:r>
-                        <a:rPr lang="en-US" sz="1600" dirty="0">
-                          <a:latin typeface="Consolas" panose="020B0609020204030204" pitchFamily="49" charset="0"/>
-                          <a:cs typeface="Consolas" panose="020B0609020204030204" pitchFamily="49" charset="0"/>
-                        </a:rPr>
-                        <a:t>, </a:t>
-                      </a:r>
-                      <a:r>
-                        <a:rPr lang="en-US" sz="1600" dirty="0" err="1">
-                          <a:latin typeface="Consolas" panose="020B0609020204030204" pitchFamily="49" charset="0"/>
-                          <a:cs typeface="Consolas" panose="020B0609020204030204" pitchFamily="49" charset="0"/>
-                        </a:rPr>
-                        <a:t>size_t</a:t>
-                      </a:r>
-                      <a:r>
-                        <a:rPr lang="en-US" sz="1600" dirty="0">
-                          <a:latin typeface="Consolas" panose="020B0609020204030204" pitchFamily="49" charset="0"/>
-                          <a:cs typeface="Consolas" panose="020B0609020204030204" pitchFamily="49" charset="0"/>
-                        </a:rPr>
-                        <a:t> count)</a:t>
-                      </a:r>
-                      <a:endParaRPr lang="ru-RU" sz="1600" dirty="0">
-                        <a:latin typeface="Consolas" panose="020B0609020204030204" pitchFamily="49" charset="0"/>
-                        <a:cs typeface="Consolas" panose="020B0609020204030204" pitchFamily="49" charset="0"/>
-                      </a:endParaRPr>
-                    </a:p>
-                  </a:txBody>
-                  <a:tcPr/>
-                </a:tc>
-                <a:tc>
-                  <a:txBody>
-                    <a:bodyPr/>
-                    <a:lstStyle/>
-                    <a:p>
-                      <a:r>
-                        <a:rPr lang="en-US" sz="1400" dirty="0">
-                          <a:latin typeface="Consolas" panose="020B0609020204030204" pitchFamily="49" charset="0"/>
-                          <a:cs typeface="Consolas" panose="020B0609020204030204" pitchFamily="49" charset="0"/>
-                        </a:rPr>
-                        <a:t>BOOL WINAPI </a:t>
-                      </a:r>
-                      <a:r>
-                        <a:rPr lang="en-US" sz="1400" dirty="0" err="1">
-                          <a:latin typeface="Consolas" panose="020B0609020204030204" pitchFamily="49" charset="0"/>
-                          <a:cs typeface="Consolas" panose="020B0609020204030204" pitchFamily="49" charset="0"/>
-                        </a:rPr>
-                        <a:t>ReadFile</a:t>
-                      </a:r>
-                      <a:r>
-                        <a:rPr lang="en-US" sz="1400" dirty="0">
-                          <a:latin typeface="Consolas" panose="020B0609020204030204" pitchFamily="49" charset="0"/>
-                          <a:cs typeface="Consolas" panose="020B0609020204030204" pitchFamily="49" charset="0"/>
-                        </a:rPr>
-                        <a:t>(</a:t>
-                      </a:r>
-                    </a:p>
-                    <a:p>
-                      <a:r>
-                        <a:rPr lang="en-US" sz="1400" dirty="0">
-                          <a:latin typeface="Consolas" panose="020B0609020204030204" pitchFamily="49" charset="0"/>
-                          <a:cs typeface="Consolas" panose="020B0609020204030204" pitchFamily="49" charset="0"/>
-                        </a:rPr>
-                        <a:t>  _In_        HANDLE          </a:t>
-                      </a:r>
-                      <a:r>
-                        <a:rPr lang="en-US" sz="1400" dirty="0" err="1">
-                          <a:latin typeface="Consolas" panose="020B0609020204030204" pitchFamily="49" charset="0"/>
-                          <a:cs typeface="Consolas" panose="020B0609020204030204" pitchFamily="49" charset="0"/>
-                        </a:rPr>
-                        <a:t>hFile</a:t>
-                      </a:r>
-                      <a:r>
-                        <a:rPr lang="en-US" sz="1400" dirty="0">
-                          <a:latin typeface="Consolas" panose="020B0609020204030204" pitchFamily="49" charset="0"/>
-                          <a:cs typeface="Consolas" panose="020B0609020204030204" pitchFamily="49" charset="0"/>
-                        </a:rPr>
-                        <a:t>,</a:t>
-                      </a:r>
-                    </a:p>
-                    <a:p>
-                      <a:r>
-                        <a:rPr lang="en-US" sz="1400" dirty="0">
-                          <a:latin typeface="Consolas" panose="020B0609020204030204" pitchFamily="49" charset="0"/>
-                          <a:cs typeface="Consolas" panose="020B0609020204030204" pitchFamily="49" charset="0"/>
-                        </a:rPr>
-                        <a:t>  _Out_       LPVOID          </a:t>
-                      </a:r>
-                      <a:r>
-                        <a:rPr lang="en-US" sz="1400" dirty="0" err="1">
-                          <a:latin typeface="Consolas" panose="020B0609020204030204" pitchFamily="49" charset="0"/>
-                          <a:cs typeface="Consolas" panose="020B0609020204030204" pitchFamily="49" charset="0"/>
-                        </a:rPr>
-                        <a:t>lpBuffer</a:t>
-                      </a:r>
-                      <a:r>
-                        <a:rPr lang="en-US" sz="1400" dirty="0">
-                          <a:latin typeface="Consolas" panose="020B0609020204030204" pitchFamily="49" charset="0"/>
-                          <a:cs typeface="Consolas" panose="020B0609020204030204" pitchFamily="49" charset="0"/>
-                        </a:rPr>
-                        <a:t>,</a:t>
-                      </a:r>
-                    </a:p>
-                    <a:p>
-                      <a:r>
-                        <a:rPr lang="en-US" sz="1400" dirty="0">
-                          <a:latin typeface="Consolas" panose="020B0609020204030204" pitchFamily="49" charset="0"/>
-                          <a:cs typeface="Consolas" panose="020B0609020204030204" pitchFamily="49" charset="0"/>
-                        </a:rPr>
-                        <a:t>  _In_        DWORD           </a:t>
-                      </a:r>
-                      <a:r>
-                        <a:rPr lang="en-US" sz="1400" dirty="0" err="1">
-                          <a:latin typeface="Consolas" panose="020B0609020204030204" pitchFamily="49" charset="0"/>
-                          <a:cs typeface="Consolas" panose="020B0609020204030204" pitchFamily="49" charset="0"/>
-                        </a:rPr>
-                        <a:t>nNumberOfBytesToRead</a:t>
-                      </a:r>
-                      <a:r>
-                        <a:rPr lang="en-US" sz="1400" dirty="0">
-                          <a:latin typeface="Consolas" panose="020B0609020204030204" pitchFamily="49" charset="0"/>
-                          <a:cs typeface="Consolas" panose="020B0609020204030204" pitchFamily="49" charset="0"/>
-                        </a:rPr>
-                        <a:t>,</a:t>
-                      </a:r>
-                    </a:p>
-                    <a:p>
-                      <a:r>
-                        <a:rPr lang="en-US" sz="1400" dirty="0">
-                          <a:latin typeface="Consolas" panose="020B0609020204030204" pitchFamily="49" charset="0"/>
-                          <a:cs typeface="Consolas" panose="020B0609020204030204" pitchFamily="49" charset="0"/>
-                        </a:rPr>
-                        <a:t>  _</a:t>
-                      </a:r>
-                      <a:r>
-                        <a:rPr lang="en-US" sz="1400" dirty="0" err="1">
-                          <a:latin typeface="Consolas" panose="020B0609020204030204" pitchFamily="49" charset="0"/>
-                          <a:cs typeface="Consolas" panose="020B0609020204030204" pitchFamily="49" charset="0"/>
-                        </a:rPr>
-                        <a:t>Out_opt</a:t>
-                      </a:r>
-                      <a:r>
-                        <a:rPr lang="en-US" sz="1400" dirty="0">
-                          <a:latin typeface="Consolas" panose="020B0609020204030204" pitchFamily="49" charset="0"/>
-                          <a:cs typeface="Consolas" panose="020B0609020204030204" pitchFamily="49" charset="0"/>
-                        </a:rPr>
-                        <a:t>_   LPDWORD         </a:t>
-                      </a:r>
-                      <a:r>
-                        <a:rPr lang="en-US" sz="1400" dirty="0" err="1">
-                          <a:latin typeface="Consolas" panose="020B0609020204030204" pitchFamily="49" charset="0"/>
-                          <a:cs typeface="Consolas" panose="020B0609020204030204" pitchFamily="49" charset="0"/>
-                        </a:rPr>
-                        <a:t>lpNumberOfBytesRead</a:t>
-                      </a:r>
-                      <a:r>
-                        <a:rPr lang="en-US" sz="1400" dirty="0">
-                          <a:latin typeface="Consolas" panose="020B0609020204030204" pitchFamily="49" charset="0"/>
-                          <a:cs typeface="Consolas" panose="020B0609020204030204" pitchFamily="49" charset="0"/>
-                        </a:rPr>
-                        <a:t>,</a:t>
-                      </a:r>
-                    </a:p>
-                    <a:p>
-                      <a:r>
-                        <a:rPr lang="en-US" sz="1800" dirty="0">
-                          <a:solidFill>
-                            <a:srgbClr val="FF0000"/>
-                          </a:solidFill>
-                          <a:latin typeface="Consolas" panose="020B0609020204030204" pitchFamily="49" charset="0"/>
-                          <a:cs typeface="Consolas" panose="020B0609020204030204" pitchFamily="49" charset="0"/>
-                        </a:rPr>
-                        <a:t>  _</a:t>
-                      </a:r>
-                      <a:r>
-                        <a:rPr lang="en-US" sz="1800" dirty="0" err="1">
-                          <a:solidFill>
-                            <a:srgbClr val="FF0000"/>
-                          </a:solidFill>
-                          <a:latin typeface="Consolas" panose="020B0609020204030204" pitchFamily="49" charset="0"/>
-                          <a:cs typeface="Consolas" panose="020B0609020204030204" pitchFamily="49" charset="0"/>
-                        </a:rPr>
-                        <a:t>Inout_opt</a:t>
-                      </a:r>
-                      <a:r>
-                        <a:rPr lang="en-US" sz="1800" dirty="0">
-                          <a:solidFill>
-                            <a:srgbClr val="FF0000"/>
-                          </a:solidFill>
-                          <a:latin typeface="Consolas" panose="020B0609020204030204" pitchFamily="49" charset="0"/>
-                          <a:cs typeface="Consolas" panose="020B0609020204030204" pitchFamily="49" charset="0"/>
-                        </a:rPr>
-                        <a:t>_ LPOVERLAPPED    </a:t>
-                      </a:r>
-                      <a:r>
-                        <a:rPr lang="en-US" sz="1800" dirty="0" err="1">
-                          <a:solidFill>
-                            <a:srgbClr val="FF0000"/>
-                          </a:solidFill>
-                          <a:latin typeface="Consolas" panose="020B0609020204030204" pitchFamily="49" charset="0"/>
-                          <a:cs typeface="Consolas" panose="020B0609020204030204" pitchFamily="49" charset="0"/>
-                        </a:rPr>
-                        <a:t>lpOverlapped</a:t>
-                      </a:r>
-                      <a:endParaRPr lang="en-US" sz="1800" dirty="0">
-                        <a:solidFill>
-                          <a:srgbClr val="FF0000"/>
-                        </a:solidFill>
-                        <a:latin typeface="Consolas" panose="020B0609020204030204" pitchFamily="49" charset="0"/>
-                        <a:cs typeface="Consolas" panose="020B0609020204030204" pitchFamily="49" charset="0"/>
-                      </a:endParaRPr>
-                    </a:p>
-                    <a:p>
-                      <a:r>
-                        <a:rPr lang="en-US" sz="1400" dirty="0">
-                          <a:latin typeface="Consolas" panose="020B0609020204030204" pitchFamily="49" charset="0"/>
-                          <a:cs typeface="Consolas" panose="020B0609020204030204" pitchFamily="49" charset="0"/>
-                        </a:rPr>
-                        <a:t>);</a:t>
-                      </a:r>
-                      <a:endParaRPr lang="ru-RU" sz="1400" dirty="0">
-                        <a:latin typeface="Consolas" panose="020B0609020204030204" pitchFamily="49" charset="0"/>
-                        <a:cs typeface="Consolas" panose="020B0609020204030204" pitchFamily="49" charset="0"/>
-                      </a:endParaRPr>
-                    </a:p>
-                  </a:txBody>
-                  <a:tcPr/>
-                </a:tc>
-                <a:extLst>
-                  <a:ext uri="{0D108BD9-81ED-4DB2-BD59-A6C34878D82A}">
-                    <a16:rowId xmlns:a16="http://schemas.microsoft.com/office/drawing/2014/main" val="10002"/>
-                  </a:ext>
-                </a:extLst>
-              </a:tr>
-              <a:tr h="441621">
-                <a:tc>
-                  <a:txBody>
-                    <a:bodyPr/>
-                    <a:lstStyle/>
-                    <a:p>
-                      <a:r>
-                        <a:rPr lang="en-US" sz="1600" dirty="0" err="1">
-                          <a:latin typeface="Consolas" panose="020B0609020204030204" pitchFamily="49" charset="0"/>
-                          <a:cs typeface="Consolas" panose="020B0609020204030204" pitchFamily="49" charset="0"/>
-                        </a:rPr>
-                        <a:t>size_t</a:t>
-                      </a:r>
-                      <a:r>
-                        <a:rPr lang="en-US" sz="1600" dirty="0">
-                          <a:latin typeface="Consolas" panose="020B0609020204030204" pitchFamily="49" charset="0"/>
-                          <a:cs typeface="Consolas" panose="020B0609020204030204" pitchFamily="49" charset="0"/>
-                        </a:rPr>
-                        <a:t> write(int </a:t>
-                      </a:r>
-                      <a:r>
-                        <a:rPr lang="en-US" sz="1600" dirty="0" err="1">
-                          <a:latin typeface="Consolas" panose="020B0609020204030204" pitchFamily="49" charset="0"/>
-                          <a:cs typeface="Consolas" panose="020B0609020204030204" pitchFamily="49" charset="0"/>
-                        </a:rPr>
-                        <a:t>fd</a:t>
-                      </a:r>
-                      <a:r>
-                        <a:rPr lang="en-US" sz="1600" dirty="0">
-                          <a:latin typeface="Consolas" panose="020B0609020204030204" pitchFamily="49" charset="0"/>
-                          <a:cs typeface="Consolas" panose="020B0609020204030204" pitchFamily="49" charset="0"/>
-                        </a:rPr>
-                        <a:t>, const</a:t>
-                      </a:r>
-                      <a:r>
-                        <a:rPr lang="en-US" sz="1600" baseline="0" dirty="0">
-                          <a:latin typeface="Consolas" panose="020B0609020204030204" pitchFamily="49" charset="0"/>
-                          <a:cs typeface="Consolas" panose="020B0609020204030204" pitchFamily="49" charset="0"/>
-                        </a:rPr>
-                        <a:t> void *</a:t>
-                      </a:r>
-                      <a:r>
-                        <a:rPr lang="en-US" sz="1600" baseline="0" dirty="0" err="1">
-                          <a:latin typeface="Consolas" panose="020B0609020204030204" pitchFamily="49" charset="0"/>
-                          <a:cs typeface="Consolas" panose="020B0609020204030204" pitchFamily="49" charset="0"/>
-                        </a:rPr>
-                        <a:t>buf</a:t>
-                      </a:r>
-                      <a:r>
-                        <a:rPr lang="en-US" sz="1600" baseline="0" dirty="0">
-                          <a:latin typeface="Consolas" panose="020B0609020204030204" pitchFamily="49" charset="0"/>
-                          <a:cs typeface="Consolas" panose="020B0609020204030204" pitchFamily="49" charset="0"/>
-                        </a:rPr>
-                        <a:t>, </a:t>
-                      </a:r>
-                      <a:r>
-                        <a:rPr lang="en-US" sz="1600" baseline="0" dirty="0" err="1">
-                          <a:latin typeface="Consolas" panose="020B0609020204030204" pitchFamily="49" charset="0"/>
-                          <a:cs typeface="Consolas" panose="020B0609020204030204" pitchFamily="49" charset="0"/>
-                        </a:rPr>
-                        <a:t>size_t</a:t>
-                      </a:r>
-                      <a:r>
-                        <a:rPr lang="en-US" sz="1600" baseline="0" dirty="0">
-                          <a:latin typeface="Consolas" panose="020B0609020204030204" pitchFamily="49" charset="0"/>
-                          <a:cs typeface="Consolas" panose="020B0609020204030204" pitchFamily="49" charset="0"/>
-                        </a:rPr>
-                        <a:t> count)</a:t>
-                      </a:r>
-                      <a:endParaRPr lang="ru-RU" sz="1600" dirty="0">
-                        <a:latin typeface="Consolas" panose="020B0609020204030204" pitchFamily="49" charset="0"/>
-                        <a:cs typeface="Consolas" panose="020B0609020204030204" pitchFamily="49" charset="0"/>
-                      </a:endParaRPr>
-                    </a:p>
-                  </a:txBody>
-                  <a:tcPr/>
-                </a:tc>
-                <a:tc>
-                  <a:txBody>
-                    <a:bodyPr/>
-                    <a:lstStyle/>
-                    <a:p>
-                      <a:r>
-                        <a:rPr lang="en-US" sz="1400" dirty="0">
-                          <a:latin typeface="Consolas" panose="020B0609020204030204" pitchFamily="49" charset="0"/>
-                          <a:cs typeface="Consolas" panose="020B0609020204030204" pitchFamily="49" charset="0"/>
-                        </a:rPr>
-                        <a:t>BOOL WINAPI </a:t>
-                      </a:r>
-                      <a:r>
-                        <a:rPr lang="en-US" sz="1400" dirty="0" err="1">
-                          <a:latin typeface="Consolas" panose="020B0609020204030204" pitchFamily="49" charset="0"/>
-                          <a:cs typeface="Consolas" panose="020B0609020204030204" pitchFamily="49" charset="0"/>
-                        </a:rPr>
-                        <a:t>WriteFile</a:t>
-                      </a:r>
-                      <a:r>
-                        <a:rPr lang="en-US" sz="1400" dirty="0">
-                          <a:latin typeface="Consolas" panose="020B0609020204030204" pitchFamily="49" charset="0"/>
-                          <a:cs typeface="Consolas" panose="020B0609020204030204" pitchFamily="49" charset="0"/>
-                        </a:rPr>
-                        <a:t>(</a:t>
-                      </a:r>
-                    </a:p>
-                    <a:p>
-                      <a:r>
-                        <a:rPr lang="en-US" sz="1400" dirty="0">
-                          <a:latin typeface="Consolas" panose="020B0609020204030204" pitchFamily="49" charset="0"/>
-                          <a:cs typeface="Consolas" panose="020B0609020204030204" pitchFamily="49" charset="0"/>
-                        </a:rPr>
-                        <a:t>  _In_        HANDLE          </a:t>
-                      </a:r>
-                      <a:r>
-                        <a:rPr lang="en-US" sz="1400" dirty="0" err="1">
-                          <a:latin typeface="Consolas" panose="020B0609020204030204" pitchFamily="49" charset="0"/>
-                          <a:cs typeface="Consolas" panose="020B0609020204030204" pitchFamily="49" charset="0"/>
-                        </a:rPr>
-                        <a:t>hFile</a:t>
-                      </a:r>
-                      <a:r>
-                        <a:rPr lang="en-US" sz="1400" dirty="0">
-                          <a:latin typeface="Consolas" panose="020B0609020204030204" pitchFamily="49" charset="0"/>
-                          <a:cs typeface="Consolas" panose="020B0609020204030204" pitchFamily="49" charset="0"/>
-                        </a:rPr>
-                        <a:t>,</a:t>
-                      </a:r>
-                    </a:p>
-                    <a:p>
-                      <a:r>
-                        <a:rPr lang="en-US" sz="1400" dirty="0">
-                          <a:latin typeface="Consolas" panose="020B0609020204030204" pitchFamily="49" charset="0"/>
-                          <a:cs typeface="Consolas" panose="020B0609020204030204" pitchFamily="49" charset="0"/>
-                        </a:rPr>
-                        <a:t>  _In_        LPCVOID         </a:t>
-                      </a:r>
-                      <a:r>
-                        <a:rPr lang="en-US" sz="1400" dirty="0" err="1">
-                          <a:latin typeface="Consolas" panose="020B0609020204030204" pitchFamily="49" charset="0"/>
-                          <a:cs typeface="Consolas" panose="020B0609020204030204" pitchFamily="49" charset="0"/>
-                        </a:rPr>
-                        <a:t>lpBuffer</a:t>
-                      </a:r>
-                      <a:r>
-                        <a:rPr lang="en-US" sz="1400" dirty="0">
-                          <a:latin typeface="Consolas" panose="020B0609020204030204" pitchFamily="49" charset="0"/>
-                          <a:cs typeface="Consolas" panose="020B0609020204030204" pitchFamily="49" charset="0"/>
-                        </a:rPr>
-                        <a:t>,</a:t>
-                      </a:r>
-                    </a:p>
-                    <a:p>
-                      <a:r>
-                        <a:rPr lang="en-US" sz="1400" dirty="0">
-                          <a:latin typeface="Consolas" panose="020B0609020204030204" pitchFamily="49" charset="0"/>
-                          <a:cs typeface="Consolas" panose="020B0609020204030204" pitchFamily="49" charset="0"/>
-                        </a:rPr>
-                        <a:t>  _In_        DWORD           </a:t>
-                      </a:r>
-                      <a:r>
-                        <a:rPr lang="en-US" sz="1400" dirty="0" err="1">
-                          <a:latin typeface="Consolas" panose="020B0609020204030204" pitchFamily="49" charset="0"/>
-                          <a:cs typeface="Consolas" panose="020B0609020204030204" pitchFamily="49" charset="0"/>
-                        </a:rPr>
-                        <a:t>nNumberOfBytesToWrite</a:t>
-                      </a:r>
-                      <a:r>
-                        <a:rPr lang="en-US" sz="1400" dirty="0">
-                          <a:latin typeface="Consolas" panose="020B0609020204030204" pitchFamily="49" charset="0"/>
-                          <a:cs typeface="Consolas" panose="020B0609020204030204" pitchFamily="49" charset="0"/>
-                        </a:rPr>
-                        <a:t>,</a:t>
-                      </a:r>
-                    </a:p>
-                    <a:p>
-                      <a:r>
-                        <a:rPr lang="en-US" sz="1400" dirty="0">
-                          <a:latin typeface="Consolas" panose="020B0609020204030204" pitchFamily="49" charset="0"/>
-                          <a:cs typeface="Consolas" panose="020B0609020204030204" pitchFamily="49" charset="0"/>
-                        </a:rPr>
-                        <a:t>  _</a:t>
-                      </a:r>
-                      <a:r>
-                        <a:rPr lang="en-US" sz="1400" dirty="0" err="1">
-                          <a:latin typeface="Consolas" panose="020B0609020204030204" pitchFamily="49" charset="0"/>
-                          <a:cs typeface="Consolas" panose="020B0609020204030204" pitchFamily="49" charset="0"/>
-                        </a:rPr>
-                        <a:t>Out_opt</a:t>
-                      </a:r>
-                      <a:r>
-                        <a:rPr lang="en-US" sz="1400" dirty="0">
-                          <a:latin typeface="Consolas" panose="020B0609020204030204" pitchFamily="49" charset="0"/>
-                          <a:cs typeface="Consolas" panose="020B0609020204030204" pitchFamily="49" charset="0"/>
-                        </a:rPr>
-                        <a:t>_   LPDWORD         </a:t>
-                      </a:r>
-                      <a:r>
-                        <a:rPr lang="en-US" sz="1400" dirty="0" err="1">
-                          <a:latin typeface="Consolas" panose="020B0609020204030204" pitchFamily="49" charset="0"/>
-                          <a:cs typeface="Consolas" panose="020B0609020204030204" pitchFamily="49" charset="0"/>
-                        </a:rPr>
-                        <a:t>lpNumberOfBytesWritten</a:t>
-                      </a:r>
-                      <a:r>
-                        <a:rPr lang="en-US" sz="1400" dirty="0">
-                          <a:latin typeface="Consolas" panose="020B0609020204030204" pitchFamily="49" charset="0"/>
-                          <a:cs typeface="Consolas" panose="020B0609020204030204" pitchFamily="49" charset="0"/>
-                        </a:rPr>
-                        <a:t>,</a:t>
-                      </a:r>
-                    </a:p>
-                    <a:p>
-                      <a:r>
-                        <a:rPr lang="en-US" sz="1800" dirty="0">
-                          <a:solidFill>
-                            <a:srgbClr val="FF0000"/>
-                          </a:solidFill>
-                          <a:latin typeface="Consolas" panose="020B0609020204030204" pitchFamily="49" charset="0"/>
-                          <a:cs typeface="Consolas" panose="020B0609020204030204" pitchFamily="49" charset="0"/>
-                        </a:rPr>
-                        <a:t>  _</a:t>
-                      </a:r>
-                      <a:r>
-                        <a:rPr lang="en-US" sz="1800" dirty="0" err="1">
-                          <a:solidFill>
-                            <a:srgbClr val="FF0000"/>
-                          </a:solidFill>
-                          <a:latin typeface="Consolas" panose="020B0609020204030204" pitchFamily="49" charset="0"/>
-                          <a:cs typeface="Consolas" panose="020B0609020204030204" pitchFamily="49" charset="0"/>
-                        </a:rPr>
-                        <a:t>Inout_opt</a:t>
-                      </a:r>
-                      <a:r>
-                        <a:rPr lang="en-US" sz="1800" dirty="0">
-                          <a:solidFill>
-                            <a:srgbClr val="FF0000"/>
-                          </a:solidFill>
-                          <a:latin typeface="Consolas" panose="020B0609020204030204" pitchFamily="49" charset="0"/>
-                          <a:cs typeface="Consolas" panose="020B0609020204030204" pitchFamily="49" charset="0"/>
-                        </a:rPr>
-                        <a:t>_ LPOVERLAPPED    </a:t>
-                      </a:r>
-                      <a:r>
-                        <a:rPr lang="en-US" sz="1800" dirty="0" err="1">
-                          <a:solidFill>
-                            <a:srgbClr val="FF0000"/>
-                          </a:solidFill>
-                          <a:latin typeface="Consolas" panose="020B0609020204030204" pitchFamily="49" charset="0"/>
-                          <a:cs typeface="Consolas" panose="020B0609020204030204" pitchFamily="49" charset="0"/>
-                        </a:rPr>
-                        <a:t>lpOverlapped</a:t>
-                      </a:r>
-                      <a:endParaRPr lang="en-US" sz="1800" dirty="0">
-                        <a:solidFill>
-                          <a:srgbClr val="FF0000"/>
-                        </a:solidFill>
-                        <a:latin typeface="Consolas" panose="020B0609020204030204" pitchFamily="49" charset="0"/>
-                        <a:cs typeface="Consolas" panose="020B0609020204030204" pitchFamily="49" charset="0"/>
-                      </a:endParaRPr>
-                    </a:p>
-                    <a:p>
-                      <a:r>
-                        <a:rPr lang="en-US" sz="1400" dirty="0">
-                          <a:latin typeface="Consolas" panose="020B0609020204030204" pitchFamily="49" charset="0"/>
-                          <a:cs typeface="Consolas" panose="020B0609020204030204" pitchFamily="49" charset="0"/>
-                        </a:rPr>
-                        <a:t>);</a:t>
-                      </a:r>
-                      <a:endParaRPr lang="ru-RU" sz="1400" dirty="0">
-                        <a:latin typeface="Consolas" panose="020B0609020204030204" pitchFamily="49" charset="0"/>
-                        <a:cs typeface="Consolas" panose="020B0609020204030204" pitchFamily="49" charset="0"/>
-                      </a:endParaRPr>
-                    </a:p>
-                  </a:txBody>
-                  <a:tcPr/>
-                </a:tc>
-                <a:extLst>
-                  <a:ext uri="{0D108BD9-81ED-4DB2-BD59-A6C34878D82A}">
-                    <a16:rowId xmlns:a16="http://schemas.microsoft.com/office/drawing/2014/main" val="10003"/>
-                  </a:ext>
-                </a:extLst>
-              </a:tr>
-            </a:tbl>
-          </a:graphicData>
-        </a:graphic>
-      </p:graphicFrame>
-    </p:spTree>
-    <p:extLst>
-      <p:ext uri="{BB962C8B-B14F-4D97-AF65-F5344CB8AC3E}">
-        <p14:creationId xmlns:p14="http://schemas.microsoft.com/office/powerpoint/2010/main" val="3118337614"/>
       </p:ext>
     </p:extLst>
   </p:cSld>
@@ -23741,6 +23785,794 @@
   <p:cSld>
     <p:spTree>
       <p:nvGrpSpPr>
+        <p:cNvPr id="1" name="">
+          <a:extLst>
+            <a:ext uri="{FF2B5EF4-FFF2-40B4-BE49-F238E27FC236}">
+              <a16:creationId xmlns:a16="http://schemas.microsoft.com/office/drawing/2014/main" id="{E92840F4-412D-A71F-35CD-80E260DAA68B}"/>
+            </a:ext>
+          </a:extLst>
+        </p:cNvPr>
+        <p:cNvGrpSpPr/>
+        <p:nvPr/>
+      </p:nvGrpSpPr>
+      <p:grpSpPr>
+        <a:xfrm>
+          <a:off x="0" y="0"/>
+          <a:ext cx="0" cy="0"/>
+          <a:chOff x="0" y="0"/>
+          <a:chExt cx="0" cy="0"/>
+        </a:xfrm>
+      </p:grpSpPr>
+      <p:graphicFrame>
+        <p:nvGraphicFramePr>
+          <p:cNvPr id="5" name="Table 4">
+            <a:extLst>
+              <a:ext uri="{FF2B5EF4-FFF2-40B4-BE49-F238E27FC236}">
+                <a16:creationId xmlns:a16="http://schemas.microsoft.com/office/drawing/2014/main" id="{64B8E5E4-A187-D693-5AEE-8697A942E73B}"/>
+              </a:ext>
+            </a:extLst>
+          </p:cNvPr>
+          <p:cNvGraphicFramePr>
+            <a:graphicFrameLocks noGrp="1"/>
+          </p:cNvGraphicFramePr>
+          <p:nvPr/>
+        </p:nvGraphicFramePr>
+        <p:xfrm>
+          <a:off x="0" y="1"/>
+          <a:ext cx="12192000" cy="365760"/>
+        </p:xfrm>
+        <a:graphic>
+          <a:graphicData uri="http://schemas.openxmlformats.org/drawingml/2006/table">
+            <a:tbl>
+              <a:tblPr firstRow="1" bandRow="1">
+                <a:tableStyleId>{5C22544A-7EE6-4342-B048-85BDC9FD1C3A}</a:tableStyleId>
+              </a:tblPr>
+              <a:tblGrid>
+                <a:gridCol w="12192000">
+                  <a:extLst>
+                    <a:ext uri="{9D8B030D-6E8A-4147-A177-3AD203B41FA5}">
+                      <a16:colId xmlns:a16="http://schemas.microsoft.com/office/drawing/2014/main" val="20000"/>
+                    </a:ext>
+                  </a:extLst>
+                </a:gridCol>
+              </a:tblGrid>
+              <a:tr h="321276">
+                <a:tc>
+                  <a:txBody>
+                    <a:bodyPr/>
+                    <a:lstStyle/>
+                    <a:p>
+                      <a:r>
+                        <a:rPr lang="en-US" sz="1800" dirty="0"/>
+                        <a:t>The basics of file systems</a:t>
+                      </a:r>
+                      <a:endParaRPr lang="ru-RU" dirty="0"/>
+                    </a:p>
+                  </a:txBody>
+                  <a:tcPr/>
+                </a:tc>
+                <a:extLst>
+                  <a:ext uri="{0D108BD9-81ED-4DB2-BD59-A6C34878D82A}">
+                    <a16:rowId xmlns:a16="http://schemas.microsoft.com/office/drawing/2014/main" val="10000"/>
+                  </a:ext>
+                </a:extLst>
+              </a:tr>
+            </a:tbl>
+          </a:graphicData>
+        </a:graphic>
+      </p:graphicFrame>
+      <p:graphicFrame>
+        <p:nvGraphicFramePr>
+          <p:cNvPr id="6" name="Table 5">
+            <a:extLst>
+              <a:ext uri="{FF2B5EF4-FFF2-40B4-BE49-F238E27FC236}">
+                <a16:creationId xmlns:a16="http://schemas.microsoft.com/office/drawing/2014/main" id="{30527680-A395-0614-80B9-BB101906D9ED}"/>
+              </a:ext>
+            </a:extLst>
+          </p:cNvPr>
+          <p:cNvGraphicFramePr>
+            <a:graphicFrameLocks noGrp="1"/>
+          </p:cNvGraphicFramePr>
+          <p:nvPr/>
+        </p:nvGraphicFramePr>
+        <p:xfrm>
+          <a:off x="0" y="6532604"/>
+          <a:ext cx="12192000" cy="365760"/>
+        </p:xfrm>
+        <a:graphic>
+          <a:graphicData uri="http://schemas.openxmlformats.org/drawingml/2006/table">
+            <a:tbl>
+              <a:tblPr firstRow="1" bandRow="1">
+                <a:tableStyleId>{5C22544A-7EE6-4342-B048-85BDC9FD1C3A}</a:tableStyleId>
+              </a:tblPr>
+              <a:tblGrid>
+                <a:gridCol w="12192000">
+                  <a:extLst>
+                    <a:ext uri="{9D8B030D-6E8A-4147-A177-3AD203B41FA5}">
+                      <a16:colId xmlns:a16="http://schemas.microsoft.com/office/drawing/2014/main" val="20000"/>
+                    </a:ext>
+                  </a:extLst>
+                </a:gridCol>
+              </a:tblGrid>
+              <a:tr h="308094">
+                <a:tc>
+                  <a:txBody>
+                    <a:bodyPr/>
+                    <a:lstStyle/>
+                    <a:p>
+                      <a:endParaRPr lang="ru-RU" dirty="0"/>
+                    </a:p>
+                  </a:txBody>
+                  <a:tcPr/>
+                </a:tc>
+                <a:extLst>
+                  <a:ext uri="{0D108BD9-81ED-4DB2-BD59-A6C34878D82A}">
+                    <a16:rowId xmlns:a16="http://schemas.microsoft.com/office/drawing/2014/main" val="10000"/>
+                  </a:ext>
+                </a:extLst>
+              </a:tr>
+            </a:tbl>
+          </a:graphicData>
+        </a:graphic>
+      </p:graphicFrame>
+      <p:graphicFrame>
+        <p:nvGraphicFramePr>
+          <p:cNvPr id="2" name="Table 1">
+            <a:extLst>
+              <a:ext uri="{FF2B5EF4-FFF2-40B4-BE49-F238E27FC236}">
+                <a16:creationId xmlns:a16="http://schemas.microsoft.com/office/drawing/2014/main" id="{AA4DDA63-0F37-9963-11F7-C8A6F906703C}"/>
+              </a:ext>
+            </a:extLst>
+          </p:cNvPr>
+          <p:cNvGraphicFramePr>
+            <a:graphicFrameLocks noGrp="1"/>
+          </p:cNvGraphicFramePr>
+          <p:nvPr>
+            <p:extLst>
+              <p:ext uri="{D42A27DB-BD31-4B8C-83A1-F6EECF244321}">
+                <p14:modId xmlns:p14="http://schemas.microsoft.com/office/powerpoint/2010/main" val="402608981"/>
+              </p:ext>
+            </p:extLst>
+          </p:nvPr>
+        </p:nvGraphicFramePr>
+        <p:xfrm>
+          <a:off x="-2" y="365761"/>
+          <a:ext cx="12192002" cy="3733461"/>
+        </p:xfrm>
+        <a:graphic>
+          <a:graphicData uri="http://schemas.openxmlformats.org/drawingml/2006/table">
+            <a:tbl>
+              <a:tblPr firstRow="1" bandRow="1">
+                <a:tableStyleId>{3B4B98B0-60AC-42C2-AFA5-B58CD77FA1E5}</a:tableStyleId>
+              </a:tblPr>
+              <a:tblGrid>
+                <a:gridCol w="6096001">
+                  <a:extLst>
+                    <a:ext uri="{9D8B030D-6E8A-4147-A177-3AD203B41FA5}">
+                      <a16:colId xmlns:a16="http://schemas.microsoft.com/office/drawing/2014/main" val="20000"/>
+                    </a:ext>
+                  </a:extLst>
+                </a:gridCol>
+                <a:gridCol w="6096001">
+                  <a:extLst>
+                    <a:ext uri="{9D8B030D-6E8A-4147-A177-3AD203B41FA5}">
+                      <a16:colId xmlns:a16="http://schemas.microsoft.com/office/drawing/2014/main" val="20001"/>
+                    </a:ext>
+                  </a:extLst>
+                </a:gridCol>
+              </a:tblGrid>
+              <a:tr h="441621">
+                <a:tc>
+                  <a:txBody>
+                    <a:bodyPr/>
+                    <a:lstStyle/>
+                    <a:p>
+                      <a:r>
+                        <a:rPr lang="en-US" dirty="0"/>
+                        <a:t>POSIX API</a:t>
+                      </a:r>
+                      <a:endParaRPr lang="ru-RU" dirty="0"/>
+                    </a:p>
+                  </a:txBody>
+                  <a:tcPr/>
+                </a:tc>
+                <a:tc>
+                  <a:txBody>
+                    <a:bodyPr/>
+                    <a:lstStyle/>
+                    <a:p>
+                      <a:r>
+                        <a:rPr lang="en-US" dirty="0"/>
+                        <a:t>Windows API</a:t>
+                      </a:r>
+                      <a:endParaRPr lang="ru-RU" dirty="0"/>
+                    </a:p>
+                  </a:txBody>
+                  <a:tcPr/>
+                </a:tc>
+                <a:extLst>
+                  <a:ext uri="{0D108BD9-81ED-4DB2-BD59-A6C34878D82A}">
+                    <a16:rowId xmlns:a16="http://schemas.microsoft.com/office/drawing/2014/main" val="10000"/>
+                  </a:ext>
+                </a:extLst>
+              </a:tr>
+              <a:tr h="441621">
+                <a:tc>
+                  <a:txBody>
+                    <a:bodyPr/>
+                    <a:lstStyle/>
+                    <a:p>
+                      <a:r>
+                        <a:rPr lang="en-US" sz="1600" dirty="0" err="1">
+                          <a:latin typeface="Consolas" panose="020B0609020204030204" pitchFamily="49" charset="0"/>
+                          <a:cs typeface="Consolas" panose="020B0609020204030204" pitchFamily="49" charset="0"/>
+                        </a:rPr>
+                        <a:t>size_t</a:t>
+                      </a:r>
+                      <a:r>
+                        <a:rPr lang="en-US" sz="1600" dirty="0">
+                          <a:latin typeface="Consolas" panose="020B0609020204030204" pitchFamily="49" charset="0"/>
+                          <a:cs typeface="Consolas" panose="020B0609020204030204" pitchFamily="49" charset="0"/>
+                        </a:rPr>
+                        <a:t> read(int </a:t>
+                      </a:r>
+                      <a:r>
+                        <a:rPr lang="en-US" sz="1600" dirty="0" err="1">
+                          <a:latin typeface="Consolas" panose="020B0609020204030204" pitchFamily="49" charset="0"/>
+                          <a:cs typeface="Consolas" panose="020B0609020204030204" pitchFamily="49" charset="0"/>
+                        </a:rPr>
+                        <a:t>fd</a:t>
+                      </a:r>
+                      <a:r>
+                        <a:rPr lang="en-US" sz="1600" dirty="0">
+                          <a:latin typeface="Consolas" panose="020B0609020204030204" pitchFamily="49" charset="0"/>
+                          <a:cs typeface="Consolas" panose="020B0609020204030204" pitchFamily="49" charset="0"/>
+                        </a:rPr>
+                        <a:t>, void *</a:t>
+                      </a:r>
+                      <a:r>
+                        <a:rPr lang="en-US" sz="1600" dirty="0" err="1">
+                          <a:latin typeface="Consolas" panose="020B0609020204030204" pitchFamily="49" charset="0"/>
+                          <a:cs typeface="Consolas" panose="020B0609020204030204" pitchFamily="49" charset="0"/>
+                        </a:rPr>
+                        <a:t>buf</a:t>
+                      </a:r>
+                      <a:r>
+                        <a:rPr lang="en-US" sz="1600" dirty="0">
+                          <a:latin typeface="Consolas" panose="020B0609020204030204" pitchFamily="49" charset="0"/>
+                          <a:cs typeface="Consolas" panose="020B0609020204030204" pitchFamily="49" charset="0"/>
+                        </a:rPr>
+                        <a:t>, </a:t>
+                      </a:r>
+                      <a:r>
+                        <a:rPr lang="en-US" sz="1600" dirty="0" err="1">
+                          <a:latin typeface="Consolas" panose="020B0609020204030204" pitchFamily="49" charset="0"/>
+                          <a:cs typeface="Consolas" panose="020B0609020204030204" pitchFamily="49" charset="0"/>
+                        </a:rPr>
+                        <a:t>size_t</a:t>
+                      </a:r>
+                      <a:r>
+                        <a:rPr lang="en-US" sz="1600" dirty="0">
+                          <a:latin typeface="Consolas" panose="020B0609020204030204" pitchFamily="49" charset="0"/>
+                          <a:cs typeface="Consolas" panose="020B0609020204030204" pitchFamily="49" charset="0"/>
+                        </a:rPr>
+                        <a:t> count);</a:t>
+                      </a:r>
+                      <a:endParaRPr lang="ru-RU" sz="1600" dirty="0">
+                        <a:latin typeface="Consolas" panose="020B0609020204030204" pitchFamily="49" charset="0"/>
+                        <a:cs typeface="Consolas" panose="020B0609020204030204" pitchFamily="49" charset="0"/>
+                      </a:endParaRPr>
+                    </a:p>
+                  </a:txBody>
+                  <a:tcPr/>
+                </a:tc>
+                <a:tc>
+                  <a:txBody>
+                    <a:bodyPr/>
+                    <a:lstStyle/>
+                    <a:p>
+                      <a:r>
+                        <a:rPr lang="en-US" sz="1400" dirty="0">
+                          <a:latin typeface="Consolas" panose="020B0609020204030204" pitchFamily="49" charset="0"/>
+                          <a:cs typeface="Consolas" panose="020B0609020204030204" pitchFamily="49" charset="0"/>
+                        </a:rPr>
+                        <a:t>BOOL WINAPI </a:t>
+                      </a:r>
+                      <a:r>
+                        <a:rPr lang="en-US" sz="1400" dirty="0" err="1">
+                          <a:latin typeface="Consolas" panose="020B0609020204030204" pitchFamily="49" charset="0"/>
+                          <a:cs typeface="Consolas" panose="020B0609020204030204" pitchFamily="49" charset="0"/>
+                        </a:rPr>
+                        <a:t>ReadFile</a:t>
+                      </a:r>
+                      <a:r>
+                        <a:rPr lang="en-US" sz="1400" dirty="0">
+                          <a:latin typeface="Consolas" panose="020B0609020204030204" pitchFamily="49" charset="0"/>
+                          <a:cs typeface="Consolas" panose="020B0609020204030204" pitchFamily="49" charset="0"/>
+                        </a:rPr>
+                        <a:t>(</a:t>
+                      </a:r>
+                    </a:p>
+                    <a:p>
+                      <a:r>
+                        <a:rPr lang="en-US" sz="1400" dirty="0">
+                          <a:latin typeface="Consolas" panose="020B0609020204030204" pitchFamily="49" charset="0"/>
+                          <a:cs typeface="Consolas" panose="020B0609020204030204" pitchFamily="49" charset="0"/>
+                        </a:rPr>
+                        <a:t>  _In_        HANDLE          </a:t>
+                      </a:r>
+                      <a:r>
+                        <a:rPr lang="en-US" sz="1400" dirty="0" err="1">
+                          <a:latin typeface="Consolas" panose="020B0609020204030204" pitchFamily="49" charset="0"/>
+                          <a:cs typeface="Consolas" panose="020B0609020204030204" pitchFamily="49" charset="0"/>
+                        </a:rPr>
+                        <a:t>hFile</a:t>
+                      </a:r>
+                      <a:r>
+                        <a:rPr lang="en-US" sz="1400" dirty="0">
+                          <a:latin typeface="Consolas" panose="020B0609020204030204" pitchFamily="49" charset="0"/>
+                          <a:cs typeface="Consolas" panose="020B0609020204030204" pitchFamily="49" charset="0"/>
+                        </a:rPr>
+                        <a:t>,</a:t>
+                      </a:r>
+                    </a:p>
+                    <a:p>
+                      <a:r>
+                        <a:rPr lang="en-US" sz="1400" dirty="0">
+                          <a:latin typeface="Consolas" panose="020B0609020204030204" pitchFamily="49" charset="0"/>
+                          <a:cs typeface="Consolas" panose="020B0609020204030204" pitchFamily="49" charset="0"/>
+                        </a:rPr>
+                        <a:t>  _Out_       LPVOID          </a:t>
+                      </a:r>
+                      <a:r>
+                        <a:rPr lang="en-US" sz="1400" dirty="0" err="1">
+                          <a:latin typeface="Consolas" panose="020B0609020204030204" pitchFamily="49" charset="0"/>
+                          <a:cs typeface="Consolas" panose="020B0609020204030204" pitchFamily="49" charset="0"/>
+                        </a:rPr>
+                        <a:t>lpBuffer</a:t>
+                      </a:r>
+                      <a:r>
+                        <a:rPr lang="en-US" sz="1400" dirty="0">
+                          <a:latin typeface="Consolas" panose="020B0609020204030204" pitchFamily="49" charset="0"/>
+                          <a:cs typeface="Consolas" panose="020B0609020204030204" pitchFamily="49" charset="0"/>
+                        </a:rPr>
+                        <a:t>,</a:t>
+                      </a:r>
+                    </a:p>
+                    <a:p>
+                      <a:r>
+                        <a:rPr lang="en-US" sz="1400" dirty="0">
+                          <a:latin typeface="Consolas" panose="020B0609020204030204" pitchFamily="49" charset="0"/>
+                          <a:cs typeface="Consolas" panose="020B0609020204030204" pitchFamily="49" charset="0"/>
+                        </a:rPr>
+                        <a:t>  _In_        DWORD           </a:t>
+                      </a:r>
+                      <a:r>
+                        <a:rPr lang="en-US" sz="1400" dirty="0" err="1">
+                          <a:latin typeface="Consolas" panose="020B0609020204030204" pitchFamily="49" charset="0"/>
+                          <a:cs typeface="Consolas" panose="020B0609020204030204" pitchFamily="49" charset="0"/>
+                        </a:rPr>
+                        <a:t>nNumberOfBytesToRead</a:t>
+                      </a:r>
+                      <a:r>
+                        <a:rPr lang="en-US" sz="1400" dirty="0">
+                          <a:latin typeface="Consolas" panose="020B0609020204030204" pitchFamily="49" charset="0"/>
+                          <a:cs typeface="Consolas" panose="020B0609020204030204" pitchFamily="49" charset="0"/>
+                        </a:rPr>
+                        <a:t>,</a:t>
+                      </a:r>
+                    </a:p>
+                    <a:p>
+                      <a:r>
+                        <a:rPr lang="en-US" sz="1400" dirty="0">
+                          <a:latin typeface="Consolas" panose="020B0609020204030204" pitchFamily="49" charset="0"/>
+                          <a:cs typeface="Consolas" panose="020B0609020204030204" pitchFamily="49" charset="0"/>
+                        </a:rPr>
+                        <a:t>  _</a:t>
+                      </a:r>
+                      <a:r>
+                        <a:rPr lang="en-US" sz="1400" dirty="0" err="1">
+                          <a:latin typeface="Consolas" panose="020B0609020204030204" pitchFamily="49" charset="0"/>
+                          <a:cs typeface="Consolas" panose="020B0609020204030204" pitchFamily="49" charset="0"/>
+                        </a:rPr>
+                        <a:t>Out_opt</a:t>
+                      </a:r>
+                      <a:r>
+                        <a:rPr lang="en-US" sz="1400" dirty="0">
+                          <a:latin typeface="Consolas" panose="020B0609020204030204" pitchFamily="49" charset="0"/>
+                          <a:cs typeface="Consolas" panose="020B0609020204030204" pitchFamily="49" charset="0"/>
+                        </a:rPr>
+                        <a:t>_   LPDWORD         </a:t>
+                      </a:r>
+                      <a:r>
+                        <a:rPr lang="en-US" sz="1400" dirty="0" err="1">
+                          <a:latin typeface="Consolas" panose="020B0609020204030204" pitchFamily="49" charset="0"/>
+                          <a:cs typeface="Consolas" panose="020B0609020204030204" pitchFamily="49" charset="0"/>
+                        </a:rPr>
+                        <a:t>lpNumberOfBytesRead</a:t>
+                      </a:r>
+                      <a:r>
+                        <a:rPr lang="en-US" sz="1400" dirty="0">
+                          <a:latin typeface="Consolas" panose="020B0609020204030204" pitchFamily="49" charset="0"/>
+                          <a:cs typeface="Consolas" panose="020B0609020204030204" pitchFamily="49" charset="0"/>
+                        </a:rPr>
+                        <a:t>,</a:t>
+                      </a:r>
+                    </a:p>
+                    <a:p>
+                      <a:r>
+                        <a:rPr lang="en-US" sz="1800" dirty="0">
+                          <a:solidFill>
+                            <a:srgbClr val="FF0000"/>
+                          </a:solidFill>
+                          <a:latin typeface="Consolas" panose="020B0609020204030204" pitchFamily="49" charset="0"/>
+                          <a:cs typeface="Consolas" panose="020B0609020204030204" pitchFamily="49" charset="0"/>
+                        </a:rPr>
+                        <a:t>  _</a:t>
+                      </a:r>
+                      <a:r>
+                        <a:rPr lang="en-US" sz="1800" dirty="0" err="1">
+                          <a:solidFill>
+                            <a:srgbClr val="FF0000"/>
+                          </a:solidFill>
+                          <a:latin typeface="Consolas" panose="020B0609020204030204" pitchFamily="49" charset="0"/>
+                          <a:cs typeface="Consolas" panose="020B0609020204030204" pitchFamily="49" charset="0"/>
+                        </a:rPr>
+                        <a:t>Inout_opt</a:t>
+                      </a:r>
+                      <a:r>
+                        <a:rPr lang="en-US" sz="1800" dirty="0">
+                          <a:solidFill>
+                            <a:srgbClr val="FF0000"/>
+                          </a:solidFill>
+                          <a:latin typeface="Consolas" panose="020B0609020204030204" pitchFamily="49" charset="0"/>
+                          <a:cs typeface="Consolas" panose="020B0609020204030204" pitchFamily="49" charset="0"/>
+                        </a:rPr>
+                        <a:t>_ LPOVERLAPPED    </a:t>
+                      </a:r>
+                      <a:r>
+                        <a:rPr lang="en-US" sz="1800" dirty="0" err="1">
+                          <a:solidFill>
+                            <a:srgbClr val="FF0000"/>
+                          </a:solidFill>
+                          <a:latin typeface="Consolas" panose="020B0609020204030204" pitchFamily="49" charset="0"/>
+                          <a:cs typeface="Consolas" panose="020B0609020204030204" pitchFamily="49" charset="0"/>
+                        </a:rPr>
+                        <a:t>lpOverlapped</a:t>
+                      </a:r>
+                      <a:endParaRPr lang="en-US" sz="1800" dirty="0">
+                        <a:solidFill>
+                          <a:srgbClr val="FF0000"/>
+                        </a:solidFill>
+                        <a:latin typeface="Consolas" panose="020B0609020204030204" pitchFamily="49" charset="0"/>
+                        <a:cs typeface="Consolas" panose="020B0609020204030204" pitchFamily="49" charset="0"/>
+                      </a:endParaRPr>
+                    </a:p>
+                    <a:p>
+                      <a:r>
+                        <a:rPr lang="en-US" sz="1400" dirty="0">
+                          <a:latin typeface="Consolas" panose="020B0609020204030204" pitchFamily="49" charset="0"/>
+                          <a:cs typeface="Consolas" panose="020B0609020204030204" pitchFamily="49" charset="0"/>
+                        </a:rPr>
+                        <a:t>);</a:t>
+                      </a:r>
+                      <a:endParaRPr lang="ru-RU" sz="1400" dirty="0">
+                        <a:latin typeface="Consolas" panose="020B0609020204030204" pitchFamily="49" charset="0"/>
+                        <a:cs typeface="Consolas" panose="020B0609020204030204" pitchFamily="49" charset="0"/>
+                      </a:endParaRPr>
+                    </a:p>
+                  </a:txBody>
+                  <a:tcPr/>
+                </a:tc>
+                <a:extLst>
+                  <a:ext uri="{0D108BD9-81ED-4DB2-BD59-A6C34878D82A}">
+                    <a16:rowId xmlns:a16="http://schemas.microsoft.com/office/drawing/2014/main" val="10002"/>
+                  </a:ext>
+                </a:extLst>
+              </a:tr>
+              <a:tr h="441621">
+                <a:tc>
+                  <a:txBody>
+                    <a:bodyPr/>
+                    <a:lstStyle/>
+                    <a:p>
+                      <a:r>
+                        <a:rPr lang="en-US" sz="1600" dirty="0" err="1">
+                          <a:latin typeface="Consolas" panose="020B0609020204030204" pitchFamily="49" charset="0"/>
+                          <a:cs typeface="Consolas" panose="020B0609020204030204" pitchFamily="49" charset="0"/>
+                        </a:rPr>
+                        <a:t>size_t</a:t>
+                      </a:r>
+                      <a:r>
+                        <a:rPr lang="en-US" sz="1600" dirty="0">
+                          <a:latin typeface="Consolas" panose="020B0609020204030204" pitchFamily="49" charset="0"/>
+                          <a:cs typeface="Consolas" panose="020B0609020204030204" pitchFamily="49" charset="0"/>
+                        </a:rPr>
+                        <a:t> write(int </a:t>
+                      </a:r>
+                      <a:r>
+                        <a:rPr lang="en-US" sz="1600" dirty="0" err="1">
+                          <a:latin typeface="Consolas" panose="020B0609020204030204" pitchFamily="49" charset="0"/>
+                          <a:cs typeface="Consolas" panose="020B0609020204030204" pitchFamily="49" charset="0"/>
+                        </a:rPr>
+                        <a:t>fd</a:t>
+                      </a:r>
+                      <a:r>
+                        <a:rPr lang="en-US" sz="1600" dirty="0">
+                          <a:latin typeface="Consolas" panose="020B0609020204030204" pitchFamily="49" charset="0"/>
+                          <a:cs typeface="Consolas" panose="020B0609020204030204" pitchFamily="49" charset="0"/>
+                        </a:rPr>
+                        <a:t>, const</a:t>
+                      </a:r>
+                      <a:r>
+                        <a:rPr lang="en-US" sz="1600" baseline="0" dirty="0">
+                          <a:latin typeface="Consolas" panose="020B0609020204030204" pitchFamily="49" charset="0"/>
+                          <a:cs typeface="Consolas" panose="020B0609020204030204" pitchFamily="49" charset="0"/>
+                        </a:rPr>
+                        <a:t> void *</a:t>
+                      </a:r>
+                      <a:r>
+                        <a:rPr lang="en-US" sz="1600" baseline="0" dirty="0" err="1">
+                          <a:latin typeface="Consolas" panose="020B0609020204030204" pitchFamily="49" charset="0"/>
+                          <a:cs typeface="Consolas" panose="020B0609020204030204" pitchFamily="49" charset="0"/>
+                        </a:rPr>
+                        <a:t>buf</a:t>
+                      </a:r>
+                      <a:r>
+                        <a:rPr lang="en-US" sz="1600" baseline="0" dirty="0">
+                          <a:latin typeface="Consolas" panose="020B0609020204030204" pitchFamily="49" charset="0"/>
+                          <a:cs typeface="Consolas" panose="020B0609020204030204" pitchFamily="49" charset="0"/>
+                        </a:rPr>
+                        <a:t>, </a:t>
+                      </a:r>
+                      <a:r>
+                        <a:rPr lang="en-US" sz="1600" baseline="0" dirty="0" err="1">
+                          <a:latin typeface="Consolas" panose="020B0609020204030204" pitchFamily="49" charset="0"/>
+                          <a:cs typeface="Consolas" panose="020B0609020204030204" pitchFamily="49" charset="0"/>
+                        </a:rPr>
+                        <a:t>size_t</a:t>
+                      </a:r>
+                      <a:r>
+                        <a:rPr lang="en-US" sz="1600" baseline="0" dirty="0">
+                          <a:latin typeface="Consolas" panose="020B0609020204030204" pitchFamily="49" charset="0"/>
+                          <a:cs typeface="Consolas" panose="020B0609020204030204" pitchFamily="49" charset="0"/>
+                        </a:rPr>
+                        <a:t> count);</a:t>
+                      </a:r>
+                      <a:endParaRPr lang="ru-RU" sz="1600" dirty="0">
+                        <a:latin typeface="Consolas" panose="020B0609020204030204" pitchFamily="49" charset="0"/>
+                        <a:cs typeface="Consolas" panose="020B0609020204030204" pitchFamily="49" charset="0"/>
+                      </a:endParaRPr>
+                    </a:p>
+                  </a:txBody>
+                  <a:tcPr/>
+                </a:tc>
+                <a:tc>
+                  <a:txBody>
+                    <a:bodyPr/>
+                    <a:lstStyle/>
+                    <a:p>
+                      <a:r>
+                        <a:rPr lang="en-US" sz="1400" dirty="0">
+                          <a:latin typeface="Consolas" panose="020B0609020204030204" pitchFamily="49" charset="0"/>
+                          <a:cs typeface="Consolas" panose="020B0609020204030204" pitchFamily="49" charset="0"/>
+                        </a:rPr>
+                        <a:t>BOOL WINAPI </a:t>
+                      </a:r>
+                      <a:r>
+                        <a:rPr lang="en-US" sz="1400" dirty="0" err="1">
+                          <a:latin typeface="Consolas" panose="020B0609020204030204" pitchFamily="49" charset="0"/>
+                          <a:cs typeface="Consolas" panose="020B0609020204030204" pitchFamily="49" charset="0"/>
+                        </a:rPr>
+                        <a:t>WriteFile</a:t>
+                      </a:r>
+                      <a:r>
+                        <a:rPr lang="en-US" sz="1400" dirty="0">
+                          <a:latin typeface="Consolas" panose="020B0609020204030204" pitchFamily="49" charset="0"/>
+                          <a:cs typeface="Consolas" panose="020B0609020204030204" pitchFamily="49" charset="0"/>
+                        </a:rPr>
+                        <a:t>(</a:t>
+                      </a:r>
+                    </a:p>
+                    <a:p>
+                      <a:r>
+                        <a:rPr lang="en-US" sz="1400" dirty="0">
+                          <a:latin typeface="Consolas" panose="020B0609020204030204" pitchFamily="49" charset="0"/>
+                          <a:cs typeface="Consolas" panose="020B0609020204030204" pitchFamily="49" charset="0"/>
+                        </a:rPr>
+                        <a:t>  _In_        HANDLE          </a:t>
+                      </a:r>
+                      <a:r>
+                        <a:rPr lang="en-US" sz="1400" dirty="0" err="1">
+                          <a:latin typeface="Consolas" panose="020B0609020204030204" pitchFamily="49" charset="0"/>
+                          <a:cs typeface="Consolas" panose="020B0609020204030204" pitchFamily="49" charset="0"/>
+                        </a:rPr>
+                        <a:t>hFile</a:t>
+                      </a:r>
+                      <a:r>
+                        <a:rPr lang="en-US" sz="1400" dirty="0">
+                          <a:latin typeface="Consolas" panose="020B0609020204030204" pitchFamily="49" charset="0"/>
+                          <a:cs typeface="Consolas" panose="020B0609020204030204" pitchFamily="49" charset="0"/>
+                        </a:rPr>
+                        <a:t>,</a:t>
+                      </a:r>
+                    </a:p>
+                    <a:p>
+                      <a:r>
+                        <a:rPr lang="en-US" sz="1400" dirty="0">
+                          <a:latin typeface="Consolas" panose="020B0609020204030204" pitchFamily="49" charset="0"/>
+                          <a:cs typeface="Consolas" panose="020B0609020204030204" pitchFamily="49" charset="0"/>
+                        </a:rPr>
+                        <a:t>  _In_        LPCVOID         </a:t>
+                      </a:r>
+                      <a:r>
+                        <a:rPr lang="en-US" sz="1400" dirty="0" err="1">
+                          <a:latin typeface="Consolas" panose="020B0609020204030204" pitchFamily="49" charset="0"/>
+                          <a:cs typeface="Consolas" panose="020B0609020204030204" pitchFamily="49" charset="0"/>
+                        </a:rPr>
+                        <a:t>lpBuffer</a:t>
+                      </a:r>
+                      <a:r>
+                        <a:rPr lang="en-US" sz="1400" dirty="0">
+                          <a:latin typeface="Consolas" panose="020B0609020204030204" pitchFamily="49" charset="0"/>
+                          <a:cs typeface="Consolas" panose="020B0609020204030204" pitchFamily="49" charset="0"/>
+                        </a:rPr>
+                        <a:t>,</a:t>
+                      </a:r>
+                    </a:p>
+                    <a:p>
+                      <a:r>
+                        <a:rPr lang="en-US" sz="1400" dirty="0">
+                          <a:latin typeface="Consolas" panose="020B0609020204030204" pitchFamily="49" charset="0"/>
+                          <a:cs typeface="Consolas" panose="020B0609020204030204" pitchFamily="49" charset="0"/>
+                        </a:rPr>
+                        <a:t>  _In_        DWORD           </a:t>
+                      </a:r>
+                      <a:r>
+                        <a:rPr lang="en-US" sz="1400" dirty="0" err="1">
+                          <a:latin typeface="Consolas" panose="020B0609020204030204" pitchFamily="49" charset="0"/>
+                          <a:cs typeface="Consolas" panose="020B0609020204030204" pitchFamily="49" charset="0"/>
+                        </a:rPr>
+                        <a:t>nNumberOfBytesToWrite</a:t>
+                      </a:r>
+                      <a:r>
+                        <a:rPr lang="en-US" sz="1400" dirty="0">
+                          <a:latin typeface="Consolas" panose="020B0609020204030204" pitchFamily="49" charset="0"/>
+                          <a:cs typeface="Consolas" panose="020B0609020204030204" pitchFamily="49" charset="0"/>
+                        </a:rPr>
+                        <a:t>,</a:t>
+                      </a:r>
+                    </a:p>
+                    <a:p>
+                      <a:r>
+                        <a:rPr lang="en-US" sz="1400" dirty="0">
+                          <a:latin typeface="Consolas" panose="020B0609020204030204" pitchFamily="49" charset="0"/>
+                          <a:cs typeface="Consolas" panose="020B0609020204030204" pitchFamily="49" charset="0"/>
+                        </a:rPr>
+                        <a:t>  _</a:t>
+                      </a:r>
+                      <a:r>
+                        <a:rPr lang="en-US" sz="1400" dirty="0" err="1">
+                          <a:latin typeface="Consolas" panose="020B0609020204030204" pitchFamily="49" charset="0"/>
+                          <a:cs typeface="Consolas" panose="020B0609020204030204" pitchFamily="49" charset="0"/>
+                        </a:rPr>
+                        <a:t>Out_opt</a:t>
+                      </a:r>
+                      <a:r>
+                        <a:rPr lang="en-US" sz="1400" dirty="0">
+                          <a:latin typeface="Consolas" panose="020B0609020204030204" pitchFamily="49" charset="0"/>
+                          <a:cs typeface="Consolas" panose="020B0609020204030204" pitchFamily="49" charset="0"/>
+                        </a:rPr>
+                        <a:t>_   LPDWORD         </a:t>
+                      </a:r>
+                      <a:r>
+                        <a:rPr lang="en-US" sz="1400" dirty="0" err="1">
+                          <a:latin typeface="Consolas" panose="020B0609020204030204" pitchFamily="49" charset="0"/>
+                          <a:cs typeface="Consolas" panose="020B0609020204030204" pitchFamily="49" charset="0"/>
+                        </a:rPr>
+                        <a:t>lpNumberOfBytesWritten</a:t>
+                      </a:r>
+                      <a:r>
+                        <a:rPr lang="en-US" sz="1400" dirty="0">
+                          <a:latin typeface="Consolas" panose="020B0609020204030204" pitchFamily="49" charset="0"/>
+                          <a:cs typeface="Consolas" panose="020B0609020204030204" pitchFamily="49" charset="0"/>
+                        </a:rPr>
+                        <a:t>,</a:t>
+                      </a:r>
+                    </a:p>
+                    <a:p>
+                      <a:r>
+                        <a:rPr lang="en-US" sz="1800" dirty="0">
+                          <a:solidFill>
+                            <a:srgbClr val="FF0000"/>
+                          </a:solidFill>
+                          <a:latin typeface="Consolas" panose="020B0609020204030204" pitchFamily="49" charset="0"/>
+                          <a:cs typeface="Consolas" panose="020B0609020204030204" pitchFamily="49" charset="0"/>
+                        </a:rPr>
+                        <a:t>  _</a:t>
+                      </a:r>
+                      <a:r>
+                        <a:rPr lang="en-US" sz="1800" dirty="0" err="1">
+                          <a:solidFill>
+                            <a:srgbClr val="FF0000"/>
+                          </a:solidFill>
+                          <a:latin typeface="Consolas" panose="020B0609020204030204" pitchFamily="49" charset="0"/>
+                          <a:cs typeface="Consolas" panose="020B0609020204030204" pitchFamily="49" charset="0"/>
+                        </a:rPr>
+                        <a:t>Inout_opt</a:t>
+                      </a:r>
+                      <a:r>
+                        <a:rPr lang="en-US" sz="1800" dirty="0">
+                          <a:solidFill>
+                            <a:srgbClr val="FF0000"/>
+                          </a:solidFill>
+                          <a:latin typeface="Consolas" panose="020B0609020204030204" pitchFamily="49" charset="0"/>
+                          <a:cs typeface="Consolas" panose="020B0609020204030204" pitchFamily="49" charset="0"/>
+                        </a:rPr>
+                        <a:t>_ LPOVERLAPPED    </a:t>
+                      </a:r>
+                      <a:r>
+                        <a:rPr lang="en-US" sz="1800" dirty="0" err="1">
+                          <a:solidFill>
+                            <a:srgbClr val="FF0000"/>
+                          </a:solidFill>
+                          <a:latin typeface="Consolas" panose="020B0609020204030204" pitchFamily="49" charset="0"/>
+                          <a:cs typeface="Consolas" panose="020B0609020204030204" pitchFamily="49" charset="0"/>
+                        </a:rPr>
+                        <a:t>lpOverlapped</a:t>
+                      </a:r>
+                      <a:endParaRPr lang="en-US" sz="1800" dirty="0">
+                        <a:solidFill>
+                          <a:srgbClr val="FF0000"/>
+                        </a:solidFill>
+                        <a:latin typeface="Consolas" panose="020B0609020204030204" pitchFamily="49" charset="0"/>
+                        <a:cs typeface="Consolas" panose="020B0609020204030204" pitchFamily="49" charset="0"/>
+                      </a:endParaRPr>
+                    </a:p>
+                    <a:p>
+                      <a:r>
+                        <a:rPr lang="en-US" sz="1400" dirty="0">
+                          <a:latin typeface="Consolas" panose="020B0609020204030204" pitchFamily="49" charset="0"/>
+                          <a:cs typeface="Consolas" panose="020B0609020204030204" pitchFamily="49" charset="0"/>
+                        </a:rPr>
+                        <a:t>);</a:t>
+                      </a:r>
+                      <a:endParaRPr lang="ru-RU" sz="1400" dirty="0">
+                        <a:latin typeface="Consolas" panose="020B0609020204030204" pitchFamily="49" charset="0"/>
+                        <a:cs typeface="Consolas" panose="020B0609020204030204" pitchFamily="49" charset="0"/>
+                      </a:endParaRPr>
+                    </a:p>
+                  </a:txBody>
+                  <a:tcPr/>
+                </a:tc>
+                <a:extLst>
+                  <a:ext uri="{0D108BD9-81ED-4DB2-BD59-A6C34878D82A}">
+                    <a16:rowId xmlns:a16="http://schemas.microsoft.com/office/drawing/2014/main" val="10003"/>
+                  </a:ext>
+                </a:extLst>
+              </a:tr>
+            </a:tbl>
+          </a:graphicData>
+        </a:graphic>
+      </p:graphicFrame>
+    </p:spTree>
+    <p:extLst>
+      <p:ext uri="{BB962C8B-B14F-4D97-AF65-F5344CB8AC3E}">
+        <p14:creationId xmlns:p14="http://schemas.microsoft.com/office/powerpoint/2010/main" val="3118337614"/>
+      </p:ext>
+    </p:extLst>
+  </p:cSld>
+  <p:clrMapOvr>
+    <a:masterClrMapping/>
+  </p:clrMapOvr>
+</p:sld>
+</file>
+
+<file path=ppt/slides/slide31.xml><?xml version="1.0" encoding="utf-8"?>
+<p:sld xmlns:a="http://schemas.openxmlformats.org/drawingml/2006/main" xmlns:r="http://schemas.openxmlformats.org/officeDocument/2006/relationships" xmlns:p="http://schemas.openxmlformats.org/presentationml/2006/main">
+  <p:cSld>
+    <p:spTree>
+      <p:nvGrpSpPr>
         <p:cNvPr id="1" name=""/>
         <p:cNvGrpSpPr/>
         <p:nvPr/>
@@ -24166,7 +24998,7 @@
 </p:sld>
 </file>
 
-<file path=ppt/slides/slide31.xml><?xml version="1.0" encoding="utf-8"?>
+<file path=ppt/slides/slide32.xml><?xml version="1.0" encoding="utf-8"?>
 <p:sld xmlns:a="http://schemas.openxmlformats.org/drawingml/2006/main" xmlns:r="http://schemas.openxmlformats.org/officeDocument/2006/relationships" xmlns:p="http://schemas.openxmlformats.org/presentationml/2006/main">
   <p:cSld>
     <p:spTree>
@@ -25850,7 +26682,7 @@
 </p:sld>
 </file>
 
-<file path=ppt/slides/slide32.xml><?xml version="1.0" encoding="utf-8"?>
+<file path=ppt/slides/slide33.xml><?xml version="1.0" encoding="utf-8"?>
 <p:sld xmlns:a="http://schemas.openxmlformats.org/drawingml/2006/main" xmlns:r="http://schemas.openxmlformats.org/officeDocument/2006/relationships" xmlns:p="http://schemas.openxmlformats.org/presentationml/2006/main">
   <p:cSld>
     <p:spTree>
@@ -27723,7 +28555,7 @@
 </p:sld>
 </file>
 
-<file path=ppt/slides/slide33.xml><?xml version="1.0" encoding="utf-8"?>
+<file path=ppt/slides/slide34.xml><?xml version="1.0" encoding="utf-8"?>
 <p:sld xmlns:a="http://schemas.openxmlformats.org/drawingml/2006/main" xmlns:r="http://schemas.openxmlformats.org/officeDocument/2006/relationships" xmlns:p="http://schemas.openxmlformats.org/presentationml/2006/main">
   <p:cSld>
     <p:spTree>
@@ -27861,7 +28693,7 @@
           <p:nvPr>
             <p:extLst>
               <p:ext uri="{D42A27DB-BD31-4B8C-83A1-F6EECF244321}">
-                <p14:modId xmlns:p14="http://schemas.microsoft.com/office/powerpoint/2010/main" val="1256139193"/>
+                <p14:modId xmlns:p14="http://schemas.microsoft.com/office/powerpoint/2010/main" val="601366649"/>
               </p:ext>
             </p:extLst>
           </p:nvPr>
@@ -27922,7 +28754,7 @@
                     <a:p>
                       <a:r>
                         <a:rPr lang="en-US" dirty="0"/>
-                        <a:t>Typically, the problem is even worse.</a:t>
+                        <a:t>Usually, the problem is even worse.</a:t>
                       </a:r>
                       <a:r>
                         <a:rPr lang="ru-RU" dirty="0"/>
@@ -27930,7 +28762,7 @@
                       </a:r>
                       <a:r>
                         <a:rPr lang="en-US" dirty="0"/>
-                        <a:t>If the FS is networked, or the FS is located on a fast</a:t>
+                        <a:t>If the FS is networked, or located on a fast</a:t>
                       </a:r>
                       <a:r>
                         <a:rPr lang="ru-RU" dirty="0"/>
@@ -27950,7 +28782,7 @@
                       </a:r>
                       <a:r>
                         <a:rPr lang="en-US" dirty="0"/>
-                        <a:t>then the timeline is going to look this way</a:t>
+                        <a:t>then the timeline will look this way</a:t>
                       </a:r>
                       <a:r>
                         <a:rPr lang="ru-RU" dirty="0"/>
@@ -28107,6 +28939,8 @@
                         </a:rPr>
                         <a:t>}</a:t>
                       </a:r>
+                    </a:p>
+                    <a:p>
                       <a:endParaRPr lang="en-US" dirty="0"/>
                     </a:p>
                     <a:p>
@@ -28785,7 +29619,7 @@
 </p:sld>
 </file>
 
-<file path=ppt/slides/slide34.xml><?xml version="1.0" encoding="utf-8"?>
+<file path=ppt/slides/slide35.xml><?xml version="1.0" encoding="utf-8"?>
 <p:sld xmlns:a="http://schemas.openxmlformats.org/drawingml/2006/main" xmlns:r="http://schemas.openxmlformats.org/officeDocument/2006/relationships" xmlns:p="http://schemas.openxmlformats.org/presentationml/2006/main">
   <p:cSld>
     <p:spTree>
@@ -30523,7 +31357,7 @@
 </p:sld>
 </file>
 
-<file path=ppt/slides/slide35.xml><?xml version="1.0" encoding="utf-8"?>
+<file path=ppt/slides/slide36.xml><?xml version="1.0" encoding="utf-8"?>
 <p:sld xmlns:a="http://schemas.openxmlformats.org/drawingml/2006/main" xmlns:r="http://schemas.openxmlformats.org/officeDocument/2006/relationships" xmlns:p="http://schemas.openxmlformats.org/presentationml/2006/main">
   <p:cSld>
     <p:spTree>
@@ -30837,7 +31671,15 @@
           <a:p>
             <a:r>
               <a:rPr lang="en-CY" i="1" dirty="0"/>
-              <a:t>* Yet, HTTP 1 has no pipeling. Why?</a:t>
+              <a:t>* Yet, HTTP 1 has no pipeli</a:t>
+            </a:r>
+            <a:r>
+              <a:rPr lang="en-US" i="1" dirty="0" err="1"/>
+              <a:t>ni</a:t>
+            </a:r>
+            <a:r>
+              <a:rPr lang="en-CY" i="1" dirty="0"/>
+              <a:t>ng. Why?</a:t>
             </a:r>
           </a:p>
         </p:txBody>
@@ -30855,7 +31697,7 @@
 </p:sld>
 </file>
 
-<file path=ppt/slides/slide36.xml><?xml version="1.0" encoding="utf-8"?>
+<file path=ppt/slides/slide37.xml><?xml version="1.0" encoding="utf-8"?>
 <p:sld xmlns:a="http://schemas.openxmlformats.org/drawingml/2006/main" xmlns:r="http://schemas.openxmlformats.org/officeDocument/2006/relationships" xmlns:p="http://schemas.openxmlformats.org/presentationml/2006/main">
   <p:cSld>
     <p:spTree>
@@ -31240,7 +32082,7 @@
 </p:sld>
 </file>
 
-<file path=ppt/slides/slide37.xml><?xml version="1.0" encoding="utf-8"?>
+<file path=ppt/slides/slide38.xml><?xml version="1.0" encoding="utf-8"?>
 <p:sld xmlns:a="http://schemas.openxmlformats.org/drawingml/2006/main" xmlns:r="http://schemas.openxmlformats.org/officeDocument/2006/relationships" xmlns:p="http://schemas.openxmlformats.org/presentationml/2006/main">
   <p:cSld>
     <p:spTree>
@@ -31678,7 +32520,7 @@
 </p:sld>
 </file>
 
-<file path=ppt/slides/slide38.xml><?xml version="1.0" encoding="utf-8"?>
+<file path=ppt/slides/slide39.xml><?xml version="1.0" encoding="utf-8"?>
 <p:sld xmlns:a="http://schemas.openxmlformats.org/drawingml/2006/main" xmlns:r="http://schemas.openxmlformats.org/officeDocument/2006/relationships" xmlns:p="http://schemas.openxmlformats.org/presentationml/2006/main">
   <p:cSld>
     <p:spTree>
@@ -32923,7 +33765,382 @@
 </p:sld>
 </file>
 
-<file path=ppt/slides/slide39.xml><?xml version="1.0" encoding="utf-8"?>
+<file path=ppt/slides/slide4.xml><?xml version="1.0" encoding="utf-8"?>
+<p:sld xmlns:a="http://schemas.openxmlformats.org/drawingml/2006/main" xmlns:r="http://schemas.openxmlformats.org/officeDocument/2006/relationships" xmlns:p="http://schemas.openxmlformats.org/presentationml/2006/main">
+  <p:cSld>
+    <p:spTree>
+      <p:nvGrpSpPr>
+        <p:cNvPr id="1" name=""/>
+        <p:cNvGrpSpPr/>
+        <p:nvPr/>
+      </p:nvGrpSpPr>
+      <p:grpSpPr>
+        <a:xfrm>
+          <a:off x="0" y="0"/>
+          <a:ext cx="0" cy="0"/>
+          <a:chOff x="0" y="0"/>
+          <a:chExt cx="0" cy="0"/>
+        </a:xfrm>
+      </p:grpSpPr>
+      <p:graphicFrame>
+        <p:nvGraphicFramePr>
+          <p:cNvPr id="5" name="Table 4"/>
+          <p:cNvGraphicFramePr>
+            <a:graphicFrameLocks noGrp="1"/>
+          </p:cNvGraphicFramePr>
+          <p:nvPr>
+            <p:extLst>
+              <p:ext uri="{D42A27DB-BD31-4B8C-83A1-F6EECF244321}">
+                <p14:modId xmlns:p14="http://schemas.microsoft.com/office/powerpoint/2010/main" val="4259302632"/>
+              </p:ext>
+            </p:extLst>
+          </p:nvPr>
+        </p:nvGraphicFramePr>
+        <p:xfrm>
+          <a:off x="0" y="1"/>
+          <a:ext cx="12192000" cy="365760"/>
+        </p:xfrm>
+        <a:graphic>
+          <a:graphicData uri="http://schemas.openxmlformats.org/drawingml/2006/table">
+            <a:tbl>
+              <a:tblPr firstRow="1" bandRow="1">
+                <a:tableStyleId>{5C22544A-7EE6-4342-B048-85BDC9FD1C3A}</a:tableStyleId>
+              </a:tblPr>
+              <a:tblGrid>
+                <a:gridCol w="12192000">
+                  <a:extLst>
+                    <a:ext uri="{9D8B030D-6E8A-4147-A177-3AD203B41FA5}">
+                      <a16:colId xmlns:a16="http://schemas.microsoft.com/office/drawing/2014/main" val="20000"/>
+                    </a:ext>
+                  </a:extLst>
+                </a:gridCol>
+              </a:tblGrid>
+              <a:tr h="321276">
+                <a:tc>
+                  <a:txBody>
+                    <a:bodyPr/>
+                    <a:lstStyle/>
+                    <a:p>
+                      <a:r>
+                        <a:rPr lang="en-US" sz="1800" dirty="0"/>
+                        <a:t>The basics of file systems</a:t>
+                      </a:r>
+                      <a:endParaRPr lang="ru-RU" sz="1800" dirty="0"/>
+                    </a:p>
+                  </a:txBody>
+                  <a:tcPr/>
+                </a:tc>
+                <a:extLst>
+                  <a:ext uri="{0D108BD9-81ED-4DB2-BD59-A6C34878D82A}">
+                    <a16:rowId xmlns:a16="http://schemas.microsoft.com/office/drawing/2014/main" val="10000"/>
+                  </a:ext>
+                </a:extLst>
+              </a:tr>
+            </a:tbl>
+          </a:graphicData>
+        </a:graphic>
+      </p:graphicFrame>
+      <p:graphicFrame>
+        <p:nvGraphicFramePr>
+          <p:cNvPr id="6" name="Table 5"/>
+          <p:cNvGraphicFramePr>
+            <a:graphicFrameLocks noGrp="1"/>
+          </p:cNvGraphicFramePr>
+          <p:nvPr>
+            <p:extLst>
+              <p:ext uri="{D42A27DB-BD31-4B8C-83A1-F6EECF244321}">
+                <p14:modId xmlns:p14="http://schemas.microsoft.com/office/powerpoint/2010/main" val="2738830479"/>
+              </p:ext>
+            </p:extLst>
+          </p:nvPr>
+        </p:nvGraphicFramePr>
+        <p:xfrm>
+          <a:off x="0" y="6532604"/>
+          <a:ext cx="12192000" cy="365760"/>
+        </p:xfrm>
+        <a:graphic>
+          <a:graphicData uri="http://schemas.openxmlformats.org/drawingml/2006/table">
+            <a:tbl>
+              <a:tblPr firstRow="1" bandRow="1">
+                <a:tableStyleId>{5C22544A-7EE6-4342-B048-85BDC9FD1C3A}</a:tableStyleId>
+              </a:tblPr>
+              <a:tblGrid>
+                <a:gridCol w="12192000">
+                  <a:extLst>
+                    <a:ext uri="{9D8B030D-6E8A-4147-A177-3AD203B41FA5}">
+                      <a16:colId xmlns:a16="http://schemas.microsoft.com/office/drawing/2014/main" val="20000"/>
+                    </a:ext>
+                  </a:extLst>
+                </a:gridCol>
+              </a:tblGrid>
+              <a:tr h="308094">
+                <a:tc>
+                  <a:txBody>
+                    <a:bodyPr/>
+                    <a:lstStyle/>
+                    <a:p>
+                      <a:endParaRPr lang="ru-RU" dirty="0"/>
+                    </a:p>
+                  </a:txBody>
+                  <a:tcPr/>
+                </a:tc>
+                <a:extLst>
+                  <a:ext uri="{0D108BD9-81ED-4DB2-BD59-A6C34878D82A}">
+                    <a16:rowId xmlns:a16="http://schemas.microsoft.com/office/drawing/2014/main" val="10000"/>
+                  </a:ext>
+                </a:extLst>
+              </a:tr>
+            </a:tbl>
+          </a:graphicData>
+        </a:graphic>
+      </p:graphicFrame>
+      <p:graphicFrame>
+        <p:nvGraphicFramePr>
+          <p:cNvPr id="2" name="Table 1"/>
+          <p:cNvGraphicFramePr>
+            <a:graphicFrameLocks noGrp="1"/>
+          </p:cNvGraphicFramePr>
+          <p:nvPr>
+            <p:extLst>
+              <p:ext uri="{D42A27DB-BD31-4B8C-83A1-F6EECF244321}">
+                <p14:modId xmlns:p14="http://schemas.microsoft.com/office/powerpoint/2010/main" val="2852661041"/>
+              </p:ext>
+            </p:extLst>
+          </p:nvPr>
+        </p:nvGraphicFramePr>
+        <p:xfrm>
+          <a:off x="0" y="365760"/>
+          <a:ext cx="12192000" cy="3840480"/>
+        </p:xfrm>
+        <a:graphic>
+          <a:graphicData uri="http://schemas.openxmlformats.org/drawingml/2006/table">
+            <a:tbl>
+              <a:tblPr firstRow="1" bandRow="1">
+                <a:tableStyleId>{3B4B98B0-60AC-42C2-AFA5-B58CD77FA1E5}</a:tableStyleId>
+              </a:tblPr>
+              <a:tblGrid>
+                <a:gridCol w="12192000">
+                  <a:extLst>
+                    <a:ext uri="{9D8B030D-6E8A-4147-A177-3AD203B41FA5}">
+                      <a16:colId xmlns:a16="http://schemas.microsoft.com/office/drawing/2014/main" val="20000"/>
+                    </a:ext>
+                  </a:extLst>
+                </a:gridCol>
+              </a:tblGrid>
+              <a:tr h="216655">
+                <a:tc>
+                  <a:txBody>
+                    <a:bodyPr/>
+                    <a:lstStyle/>
+                    <a:p>
+                      <a:r>
+                        <a:rPr lang="en-US" dirty="0"/>
+                        <a:t>Virtual memory: why do we need it</a:t>
+                      </a:r>
+                      <a:r>
+                        <a:rPr lang="ru-RU" baseline="0" dirty="0"/>
+                        <a:t>?</a:t>
+                      </a:r>
+                      <a:endParaRPr lang="ru-RU" dirty="0"/>
+                    </a:p>
+                  </a:txBody>
+                  <a:tcPr/>
+                </a:tc>
+                <a:extLst>
+                  <a:ext uri="{0D108BD9-81ED-4DB2-BD59-A6C34878D82A}">
+                    <a16:rowId xmlns:a16="http://schemas.microsoft.com/office/drawing/2014/main" val="10000"/>
+                  </a:ext>
+                </a:extLst>
+              </a:tr>
+              <a:tr h="216655">
+                <a:tc>
+                  <a:txBody>
+                    <a:bodyPr/>
+                    <a:lstStyle/>
+                    <a:p>
+                      <a:pPr marL="342900" marR="0" lvl="0" indent="-342900" algn="l" defTabSz="914400" rtl="0" eaLnBrk="1" fontAlgn="auto" latinLnBrk="0" hangingPunct="1">
+                        <a:lnSpc>
+                          <a:spcPct val="100000"/>
+                        </a:lnSpc>
+                        <a:spcBef>
+                          <a:spcPts val="0"/>
+                        </a:spcBef>
+                        <a:spcAft>
+                          <a:spcPts val="0"/>
+                        </a:spcAft>
+                        <a:buClrTx/>
+                        <a:buSzTx/>
+                        <a:buFont typeface="+mj-lt"/>
+                        <a:buNone/>
+                        <a:tabLst/>
+                        <a:defRPr/>
+                      </a:pPr>
+                      <a:r>
+                        <a:rPr lang="en-US" baseline="0" dirty="0"/>
+                        <a:t>Processes have no direct access to the physical RAM in a computer.</a:t>
+                      </a:r>
+                      <a:endParaRPr lang="ru-RU" baseline="0" dirty="0"/>
+                    </a:p>
+                    <a:p>
+                      <a:pPr marL="342900" marR="0" lvl="0" indent="-342900" algn="l" defTabSz="914400" rtl="0" eaLnBrk="1" fontAlgn="auto" latinLnBrk="0" hangingPunct="1">
+                        <a:lnSpc>
+                          <a:spcPct val="100000"/>
+                        </a:lnSpc>
+                        <a:spcBef>
+                          <a:spcPts val="0"/>
+                        </a:spcBef>
+                        <a:spcAft>
+                          <a:spcPts val="0"/>
+                        </a:spcAft>
+                        <a:buClrTx/>
+                        <a:buSzTx/>
+                        <a:buFont typeface="+mj-lt"/>
+                        <a:buNone/>
+                        <a:tabLst/>
+                        <a:defRPr/>
+                      </a:pPr>
+                      <a:endParaRPr lang="ru-RU" baseline="0" dirty="0"/>
+                    </a:p>
+                    <a:p>
+                      <a:pPr marL="0" marR="0" lvl="0" indent="0" algn="l" defTabSz="914400" rtl="0" eaLnBrk="1" fontAlgn="auto" latinLnBrk="0" hangingPunct="1">
+                        <a:lnSpc>
+                          <a:spcPct val="100000"/>
+                        </a:lnSpc>
+                        <a:spcBef>
+                          <a:spcPts val="0"/>
+                        </a:spcBef>
+                        <a:spcAft>
+                          <a:spcPts val="0"/>
+                        </a:spcAft>
+                        <a:buClrTx/>
+                        <a:buSzTx/>
+                        <a:buFont typeface="+mj-lt"/>
+                        <a:buNone/>
+                        <a:tabLst/>
+                        <a:defRPr/>
+                      </a:pPr>
+                      <a:r>
+                        <a:rPr lang="en-US" baseline="0" dirty="0"/>
+                        <a:t>Instead, the OS supplies them with a virtual address space. Parts of the virtual address space are mapped to the physical memory in a way that is most convenient for the OS</a:t>
+                      </a:r>
+                      <a:r>
+                        <a:rPr lang="ru-RU" baseline="0" dirty="0"/>
+                        <a:t>.</a:t>
+                      </a:r>
+                    </a:p>
+                  </a:txBody>
+                  <a:tcPr/>
+                </a:tc>
+                <a:extLst>
+                  <a:ext uri="{0D108BD9-81ED-4DB2-BD59-A6C34878D82A}">
+                    <a16:rowId xmlns:a16="http://schemas.microsoft.com/office/drawing/2014/main" val="10001"/>
+                  </a:ext>
+                </a:extLst>
+              </a:tr>
+              <a:tr h="216655">
+                <a:tc>
+                  <a:txBody>
+                    <a:bodyPr/>
+                    <a:lstStyle/>
+                    <a:p>
+                      <a:pPr marL="0" indent="0">
+                        <a:buFont typeface="Arial" charset="0"/>
+                        <a:buNone/>
+                      </a:pPr>
+                      <a:r>
+                        <a:rPr lang="en-US" dirty="0"/>
+                        <a:t>What are the benefits of virtual address spaces:</a:t>
+                      </a:r>
+                      <a:endParaRPr lang="en-US" baseline="0" dirty="0"/>
+                    </a:p>
+                    <a:p>
+                      <a:pPr marL="0" indent="0">
+                        <a:buFont typeface="Arial" charset="0"/>
+                        <a:buNone/>
+                      </a:pPr>
+                      <a:endParaRPr lang="ru-RU" dirty="0"/>
+                    </a:p>
+                    <a:p>
+                      <a:pPr marL="342900" indent="-342900">
+                        <a:buFont typeface="+mj-lt"/>
+                        <a:buAutoNum type="arabicPeriod"/>
+                      </a:pPr>
+                      <a:r>
+                        <a:rPr lang="en-US" dirty="0"/>
+                        <a:t>The address space of a process is very simple, and every process has the same address space. Essentially, a process believes it can use all addresses in the range</a:t>
+                      </a:r>
+                      <a:r>
+                        <a:rPr lang="ru-RU" baseline="0" dirty="0"/>
+                        <a:t> </a:t>
+                      </a:r>
+                      <a:r>
+                        <a:rPr lang="en-US" baseline="0" dirty="0">
+                          <a:latin typeface="Consolas" panose="020B0609020204030204" pitchFamily="49" charset="0"/>
+                          <a:cs typeface="Consolas" panose="020B0609020204030204" pitchFamily="49" charset="0"/>
+                        </a:rPr>
+                        <a:t>[0, MAX_ADDR).</a:t>
+                      </a:r>
+                      <a:endParaRPr lang="en-US" baseline="0" dirty="0"/>
+                    </a:p>
+                    <a:p>
+                      <a:pPr marL="342900" indent="-342900">
+                        <a:buFont typeface="+mj-lt"/>
+                        <a:buAutoNum type="arabicPeriod"/>
+                      </a:pPr>
+                      <a:r>
+                        <a:rPr lang="en-US" baseline="0" dirty="0"/>
+                        <a:t>Processes are isolated one from another.</a:t>
+                      </a:r>
+                      <a:endParaRPr lang="ru-RU" baseline="0" dirty="0"/>
+                    </a:p>
+                    <a:p>
+                      <a:pPr marL="342900" indent="-342900">
+                        <a:buFont typeface="+mj-lt"/>
+                        <a:buAutoNum type="arabicPeriod"/>
+                      </a:pPr>
+                      <a:r>
+                        <a:rPr lang="en-US" baseline="0" dirty="0"/>
+                        <a:t>Processes can share memory without even knowing that. For example, it suffices to load shared libraries into the memory only once, and then share them between processes.</a:t>
+                      </a:r>
+                    </a:p>
+                    <a:p>
+                      <a:pPr marL="342900" indent="-342900">
+                        <a:buFont typeface="+mj-lt"/>
+                        <a:buAutoNum type="arabicPeriod"/>
+                      </a:pPr>
+                      <a:r>
+                        <a:rPr lang="en-US" baseline="0" dirty="0"/>
+                        <a:t>The memory of a process can be partially swapped out in a way that is transparent to the process.</a:t>
+                      </a:r>
+                      <a:endParaRPr lang="ru-RU" baseline="0" dirty="0"/>
+                    </a:p>
+                  </a:txBody>
+                  <a:tcPr/>
+                </a:tc>
+                <a:extLst>
+                  <a:ext uri="{0D108BD9-81ED-4DB2-BD59-A6C34878D82A}">
+                    <a16:rowId xmlns:a16="http://schemas.microsoft.com/office/drawing/2014/main" val="10002"/>
+                  </a:ext>
+                </a:extLst>
+              </a:tr>
+            </a:tbl>
+          </a:graphicData>
+        </a:graphic>
+      </p:graphicFrame>
+    </p:spTree>
+    <p:extLst>
+      <p:ext uri="{BB962C8B-B14F-4D97-AF65-F5344CB8AC3E}">
+        <p14:creationId xmlns:p14="http://schemas.microsoft.com/office/powerpoint/2010/main" val="651436505"/>
+      </p:ext>
+    </p:extLst>
+  </p:cSld>
+  <p:clrMapOvr>
+    <a:masterClrMapping/>
+  </p:clrMapOvr>
+</p:sld>
+</file>
+
+<file path=ppt/slides/slide40.xml><?xml version="1.0" encoding="utf-8"?>
 <p:sld xmlns:a="http://schemas.openxmlformats.org/drawingml/2006/main" xmlns:r="http://schemas.openxmlformats.org/officeDocument/2006/relationships" xmlns:p="http://schemas.openxmlformats.org/presentationml/2006/main">
   <p:cSld>
     <p:spTree>
@@ -34264,382 +35481,7 @@
 </p:sld>
 </file>
 
-<file path=ppt/slides/slide4.xml><?xml version="1.0" encoding="utf-8"?>
-<p:sld xmlns:a="http://schemas.openxmlformats.org/drawingml/2006/main" xmlns:r="http://schemas.openxmlformats.org/officeDocument/2006/relationships" xmlns:p="http://schemas.openxmlformats.org/presentationml/2006/main">
-  <p:cSld>
-    <p:spTree>
-      <p:nvGrpSpPr>
-        <p:cNvPr id="1" name=""/>
-        <p:cNvGrpSpPr/>
-        <p:nvPr/>
-      </p:nvGrpSpPr>
-      <p:grpSpPr>
-        <a:xfrm>
-          <a:off x="0" y="0"/>
-          <a:ext cx="0" cy="0"/>
-          <a:chOff x="0" y="0"/>
-          <a:chExt cx="0" cy="0"/>
-        </a:xfrm>
-      </p:grpSpPr>
-      <p:graphicFrame>
-        <p:nvGraphicFramePr>
-          <p:cNvPr id="5" name="Table 4"/>
-          <p:cNvGraphicFramePr>
-            <a:graphicFrameLocks noGrp="1"/>
-          </p:cNvGraphicFramePr>
-          <p:nvPr>
-            <p:extLst>
-              <p:ext uri="{D42A27DB-BD31-4B8C-83A1-F6EECF244321}">
-                <p14:modId xmlns:p14="http://schemas.microsoft.com/office/powerpoint/2010/main" val="4259302632"/>
-              </p:ext>
-            </p:extLst>
-          </p:nvPr>
-        </p:nvGraphicFramePr>
-        <p:xfrm>
-          <a:off x="0" y="1"/>
-          <a:ext cx="12192000" cy="365760"/>
-        </p:xfrm>
-        <a:graphic>
-          <a:graphicData uri="http://schemas.openxmlformats.org/drawingml/2006/table">
-            <a:tbl>
-              <a:tblPr firstRow="1" bandRow="1">
-                <a:tableStyleId>{5C22544A-7EE6-4342-B048-85BDC9FD1C3A}</a:tableStyleId>
-              </a:tblPr>
-              <a:tblGrid>
-                <a:gridCol w="12192000">
-                  <a:extLst>
-                    <a:ext uri="{9D8B030D-6E8A-4147-A177-3AD203B41FA5}">
-                      <a16:colId xmlns:a16="http://schemas.microsoft.com/office/drawing/2014/main" val="20000"/>
-                    </a:ext>
-                  </a:extLst>
-                </a:gridCol>
-              </a:tblGrid>
-              <a:tr h="321276">
-                <a:tc>
-                  <a:txBody>
-                    <a:bodyPr/>
-                    <a:lstStyle/>
-                    <a:p>
-                      <a:r>
-                        <a:rPr lang="en-US" sz="1800" dirty="0"/>
-                        <a:t>The basics of file systems</a:t>
-                      </a:r>
-                      <a:endParaRPr lang="ru-RU" sz="1800" dirty="0"/>
-                    </a:p>
-                  </a:txBody>
-                  <a:tcPr/>
-                </a:tc>
-                <a:extLst>
-                  <a:ext uri="{0D108BD9-81ED-4DB2-BD59-A6C34878D82A}">
-                    <a16:rowId xmlns:a16="http://schemas.microsoft.com/office/drawing/2014/main" val="10000"/>
-                  </a:ext>
-                </a:extLst>
-              </a:tr>
-            </a:tbl>
-          </a:graphicData>
-        </a:graphic>
-      </p:graphicFrame>
-      <p:graphicFrame>
-        <p:nvGraphicFramePr>
-          <p:cNvPr id="6" name="Table 5"/>
-          <p:cNvGraphicFramePr>
-            <a:graphicFrameLocks noGrp="1"/>
-          </p:cNvGraphicFramePr>
-          <p:nvPr>
-            <p:extLst>
-              <p:ext uri="{D42A27DB-BD31-4B8C-83A1-F6EECF244321}">
-                <p14:modId xmlns:p14="http://schemas.microsoft.com/office/powerpoint/2010/main" val="2738830479"/>
-              </p:ext>
-            </p:extLst>
-          </p:nvPr>
-        </p:nvGraphicFramePr>
-        <p:xfrm>
-          <a:off x="0" y="6532604"/>
-          <a:ext cx="12192000" cy="365760"/>
-        </p:xfrm>
-        <a:graphic>
-          <a:graphicData uri="http://schemas.openxmlformats.org/drawingml/2006/table">
-            <a:tbl>
-              <a:tblPr firstRow="1" bandRow="1">
-                <a:tableStyleId>{5C22544A-7EE6-4342-B048-85BDC9FD1C3A}</a:tableStyleId>
-              </a:tblPr>
-              <a:tblGrid>
-                <a:gridCol w="12192000">
-                  <a:extLst>
-                    <a:ext uri="{9D8B030D-6E8A-4147-A177-3AD203B41FA5}">
-                      <a16:colId xmlns:a16="http://schemas.microsoft.com/office/drawing/2014/main" val="20000"/>
-                    </a:ext>
-                  </a:extLst>
-                </a:gridCol>
-              </a:tblGrid>
-              <a:tr h="308094">
-                <a:tc>
-                  <a:txBody>
-                    <a:bodyPr/>
-                    <a:lstStyle/>
-                    <a:p>
-                      <a:endParaRPr lang="ru-RU" dirty="0"/>
-                    </a:p>
-                  </a:txBody>
-                  <a:tcPr/>
-                </a:tc>
-                <a:extLst>
-                  <a:ext uri="{0D108BD9-81ED-4DB2-BD59-A6C34878D82A}">
-                    <a16:rowId xmlns:a16="http://schemas.microsoft.com/office/drawing/2014/main" val="10000"/>
-                  </a:ext>
-                </a:extLst>
-              </a:tr>
-            </a:tbl>
-          </a:graphicData>
-        </a:graphic>
-      </p:graphicFrame>
-      <p:graphicFrame>
-        <p:nvGraphicFramePr>
-          <p:cNvPr id="2" name="Table 1"/>
-          <p:cNvGraphicFramePr>
-            <a:graphicFrameLocks noGrp="1"/>
-          </p:cNvGraphicFramePr>
-          <p:nvPr>
-            <p:extLst>
-              <p:ext uri="{D42A27DB-BD31-4B8C-83A1-F6EECF244321}">
-                <p14:modId xmlns:p14="http://schemas.microsoft.com/office/powerpoint/2010/main" val="2852661041"/>
-              </p:ext>
-            </p:extLst>
-          </p:nvPr>
-        </p:nvGraphicFramePr>
-        <p:xfrm>
-          <a:off x="0" y="365760"/>
-          <a:ext cx="12192000" cy="3840480"/>
-        </p:xfrm>
-        <a:graphic>
-          <a:graphicData uri="http://schemas.openxmlformats.org/drawingml/2006/table">
-            <a:tbl>
-              <a:tblPr firstRow="1" bandRow="1">
-                <a:tableStyleId>{3B4B98B0-60AC-42C2-AFA5-B58CD77FA1E5}</a:tableStyleId>
-              </a:tblPr>
-              <a:tblGrid>
-                <a:gridCol w="12192000">
-                  <a:extLst>
-                    <a:ext uri="{9D8B030D-6E8A-4147-A177-3AD203B41FA5}">
-                      <a16:colId xmlns:a16="http://schemas.microsoft.com/office/drawing/2014/main" val="20000"/>
-                    </a:ext>
-                  </a:extLst>
-                </a:gridCol>
-              </a:tblGrid>
-              <a:tr h="216655">
-                <a:tc>
-                  <a:txBody>
-                    <a:bodyPr/>
-                    <a:lstStyle/>
-                    <a:p>
-                      <a:r>
-                        <a:rPr lang="en-US" dirty="0"/>
-                        <a:t>Virtual memory: why do we need it</a:t>
-                      </a:r>
-                      <a:r>
-                        <a:rPr lang="ru-RU" baseline="0" dirty="0"/>
-                        <a:t>?</a:t>
-                      </a:r>
-                      <a:endParaRPr lang="ru-RU" dirty="0"/>
-                    </a:p>
-                  </a:txBody>
-                  <a:tcPr/>
-                </a:tc>
-                <a:extLst>
-                  <a:ext uri="{0D108BD9-81ED-4DB2-BD59-A6C34878D82A}">
-                    <a16:rowId xmlns:a16="http://schemas.microsoft.com/office/drawing/2014/main" val="10000"/>
-                  </a:ext>
-                </a:extLst>
-              </a:tr>
-              <a:tr h="216655">
-                <a:tc>
-                  <a:txBody>
-                    <a:bodyPr/>
-                    <a:lstStyle/>
-                    <a:p>
-                      <a:pPr marL="342900" marR="0" lvl="0" indent="-342900" algn="l" defTabSz="914400" rtl="0" eaLnBrk="1" fontAlgn="auto" latinLnBrk="0" hangingPunct="1">
-                        <a:lnSpc>
-                          <a:spcPct val="100000"/>
-                        </a:lnSpc>
-                        <a:spcBef>
-                          <a:spcPts val="0"/>
-                        </a:spcBef>
-                        <a:spcAft>
-                          <a:spcPts val="0"/>
-                        </a:spcAft>
-                        <a:buClrTx/>
-                        <a:buSzTx/>
-                        <a:buFont typeface="+mj-lt"/>
-                        <a:buNone/>
-                        <a:tabLst/>
-                        <a:defRPr/>
-                      </a:pPr>
-                      <a:r>
-                        <a:rPr lang="en-US" baseline="0" dirty="0"/>
-                        <a:t>Processes have no direct access to the physical RAM in a computer.</a:t>
-                      </a:r>
-                      <a:endParaRPr lang="ru-RU" baseline="0" dirty="0"/>
-                    </a:p>
-                    <a:p>
-                      <a:pPr marL="342900" marR="0" lvl="0" indent="-342900" algn="l" defTabSz="914400" rtl="0" eaLnBrk="1" fontAlgn="auto" latinLnBrk="0" hangingPunct="1">
-                        <a:lnSpc>
-                          <a:spcPct val="100000"/>
-                        </a:lnSpc>
-                        <a:spcBef>
-                          <a:spcPts val="0"/>
-                        </a:spcBef>
-                        <a:spcAft>
-                          <a:spcPts val="0"/>
-                        </a:spcAft>
-                        <a:buClrTx/>
-                        <a:buSzTx/>
-                        <a:buFont typeface="+mj-lt"/>
-                        <a:buNone/>
-                        <a:tabLst/>
-                        <a:defRPr/>
-                      </a:pPr>
-                      <a:endParaRPr lang="ru-RU" baseline="0" dirty="0"/>
-                    </a:p>
-                    <a:p>
-                      <a:pPr marL="0" marR="0" lvl="0" indent="0" algn="l" defTabSz="914400" rtl="0" eaLnBrk="1" fontAlgn="auto" latinLnBrk="0" hangingPunct="1">
-                        <a:lnSpc>
-                          <a:spcPct val="100000"/>
-                        </a:lnSpc>
-                        <a:spcBef>
-                          <a:spcPts val="0"/>
-                        </a:spcBef>
-                        <a:spcAft>
-                          <a:spcPts val="0"/>
-                        </a:spcAft>
-                        <a:buClrTx/>
-                        <a:buSzTx/>
-                        <a:buFont typeface="+mj-lt"/>
-                        <a:buNone/>
-                        <a:tabLst/>
-                        <a:defRPr/>
-                      </a:pPr>
-                      <a:r>
-                        <a:rPr lang="en-US" baseline="0" dirty="0"/>
-                        <a:t>Instead, the OS supplies them with a virtual address space. Parts of the virtual address space are mapped to the physical memory in a way that is most convenient for the OS</a:t>
-                      </a:r>
-                      <a:r>
-                        <a:rPr lang="ru-RU" baseline="0" dirty="0"/>
-                        <a:t>.</a:t>
-                      </a:r>
-                    </a:p>
-                  </a:txBody>
-                  <a:tcPr/>
-                </a:tc>
-                <a:extLst>
-                  <a:ext uri="{0D108BD9-81ED-4DB2-BD59-A6C34878D82A}">
-                    <a16:rowId xmlns:a16="http://schemas.microsoft.com/office/drawing/2014/main" val="10001"/>
-                  </a:ext>
-                </a:extLst>
-              </a:tr>
-              <a:tr h="216655">
-                <a:tc>
-                  <a:txBody>
-                    <a:bodyPr/>
-                    <a:lstStyle/>
-                    <a:p>
-                      <a:pPr marL="0" indent="0">
-                        <a:buFont typeface="Arial" charset="0"/>
-                        <a:buNone/>
-                      </a:pPr>
-                      <a:r>
-                        <a:rPr lang="en-US" dirty="0"/>
-                        <a:t>What are the benefits of virtual address spaces:</a:t>
-                      </a:r>
-                      <a:endParaRPr lang="en-US" baseline="0" dirty="0"/>
-                    </a:p>
-                    <a:p>
-                      <a:pPr marL="0" indent="0">
-                        <a:buFont typeface="Arial" charset="0"/>
-                        <a:buNone/>
-                      </a:pPr>
-                      <a:endParaRPr lang="ru-RU" dirty="0"/>
-                    </a:p>
-                    <a:p>
-                      <a:pPr marL="342900" indent="-342900">
-                        <a:buFont typeface="+mj-lt"/>
-                        <a:buAutoNum type="arabicPeriod"/>
-                      </a:pPr>
-                      <a:r>
-                        <a:rPr lang="en-US" dirty="0"/>
-                        <a:t>The address space of a process is very simple, and every process has the same address space. Essentially, a process believes it can use all addresses in the range</a:t>
-                      </a:r>
-                      <a:r>
-                        <a:rPr lang="ru-RU" baseline="0" dirty="0"/>
-                        <a:t> </a:t>
-                      </a:r>
-                      <a:r>
-                        <a:rPr lang="en-US" baseline="0" dirty="0">
-                          <a:latin typeface="Consolas" panose="020B0609020204030204" pitchFamily="49" charset="0"/>
-                          <a:cs typeface="Consolas" panose="020B0609020204030204" pitchFamily="49" charset="0"/>
-                        </a:rPr>
-                        <a:t>[0, MAX_ADDR).</a:t>
-                      </a:r>
-                      <a:endParaRPr lang="en-US" baseline="0" dirty="0"/>
-                    </a:p>
-                    <a:p>
-                      <a:pPr marL="342900" indent="-342900">
-                        <a:buFont typeface="+mj-lt"/>
-                        <a:buAutoNum type="arabicPeriod"/>
-                      </a:pPr>
-                      <a:r>
-                        <a:rPr lang="en-US" baseline="0" dirty="0"/>
-                        <a:t>Processes are isolated one from another.</a:t>
-                      </a:r>
-                      <a:endParaRPr lang="ru-RU" baseline="0" dirty="0"/>
-                    </a:p>
-                    <a:p>
-                      <a:pPr marL="342900" indent="-342900">
-                        <a:buFont typeface="+mj-lt"/>
-                        <a:buAutoNum type="arabicPeriod"/>
-                      </a:pPr>
-                      <a:r>
-                        <a:rPr lang="en-US" baseline="0" dirty="0"/>
-                        <a:t>Processes can share memory without even knowing that. For example, it suffices to load shared libraries into the memory only once, and then share them between processes.</a:t>
-                      </a:r>
-                    </a:p>
-                    <a:p>
-                      <a:pPr marL="342900" indent="-342900">
-                        <a:buFont typeface="+mj-lt"/>
-                        <a:buAutoNum type="arabicPeriod"/>
-                      </a:pPr>
-                      <a:r>
-                        <a:rPr lang="en-US" baseline="0" dirty="0"/>
-                        <a:t>The memory of a process can be partially swapped out in a way that is transparent to the process.</a:t>
-                      </a:r>
-                      <a:endParaRPr lang="ru-RU" baseline="0" dirty="0"/>
-                    </a:p>
-                  </a:txBody>
-                  <a:tcPr/>
-                </a:tc>
-                <a:extLst>
-                  <a:ext uri="{0D108BD9-81ED-4DB2-BD59-A6C34878D82A}">
-                    <a16:rowId xmlns:a16="http://schemas.microsoft.com/office/drawing/2014/main" val="10002"/>
-                  </a:ext>
-                </a:extLst>
-              </a:tr>
-            </a:tbl>
-          </a:graphicData>
-        </a:graphic>
-      </p:graphicFrame>
-    </p:spTree>
-    <p:extLst>
-      <p:ext uri="{BB962C8B-B14F-4D97-AF65-F5344CB8AC3E}">
-        <p14:creationId xmlns:p14="http://schemas.microsoft.com/office/powerpoint/2010/main" val="651436505"/>
-      </p:ext>
-    </p:extLst>
-  </p:cSld>
-  <p:clrMapOvr>
-    <a:masterClrMapping/>
-  </p:clrMapOvr>
-</p:sld>
-</file>
-
-<file path=ppt/slides/slide40.xml><?xml version="1.0" encoding="utf-8"?>
+<file path=ppt/slides/slide41.xml><?xml version="1.0" encoding="utf-8"?>
 <p:sld xmlns:a="http://schemas.openxmlformats.org/drawingml/2006/main" xmlns:r="http://schemas.openxmlformats.org/officeDocument/2006/relationships" xmlns:p="http://schemas.openxmlformats.org/presentationml/2006/main">
   <p:cSld>
     <p:spTree>
@@ -36311,7 +37153,7 @@
 </p:sld>
 </file>
 
-<file path=ppt/slides/slide41.xml><?xml version="1.0" encoding="utf-8"?>
+<file path=ppt/slides/slide42.xml><?xml version="1.0" encoding="utf-8"?>
 <p:sld xmlns:a="http://schemas.openxmlformats.org/drawingml/2006/main" xmlns:r="http://schemas.openxmlformats.org/officeDocument/2006/relationships" xmlns:p="http://schemas.openxmlformats.org/presentationml/2006/main">
   <p:cSld>
     <p:spTree>
@@ -36449,7 +37291,7 @@
           <p:nvPr>
             <p:extLst>
               <p:ext uri="{D42A27DB-BD31-4B8C-83A1-F6EECF244321}">
-                <p14:modId xmlns:p14="http://schemas.microsoft.com/office/powerpoint/2010/main" val="1799311732"/>
+                <p14:modId xmlns:p14="http://schemas.microsoft.com/office/powerpoint/2010/main" val="664160127"/>
               </p:ext>
             </p:extLst>
           </p:nvPr>
@@ -36774,7 +37616,7 @@
                       </a:r>
                       <a:r>
                         <a:rPr lang="en-US" dirty="0"/>
-                        <a:t>issue a write request</a:t>
+                        <a:t>issue one more write request</a:t>
                       </a:r>
                       <a:r>
                         <a:rPr lang="ru-RU" dirty="0"/>

</xml_diff>